<commit_message>
Added more Form designs
</commit_message>
<xml_diff>
--- a/docs/ConsultIT_Design.pptx
+++ b/docs/ConsultIT_Design.pptx
@@ -4,9 +4,15 @@
   <p:sldMasterIdLst>
     <p:sldMasterId id="2147483648" r:id="rId1"/>
   </p:sldMasterIdLst>
+  <p:notesMasterIdLst>
+    <p:notesMasterId r:id="rId7"/>
+  </p:notesMasterIdLst>
   <p:sldIdLst>
     <p:sldId id="256" r:id="rId2"/>
     <p:sldId id="257" r:id="rId3"/>
+    <p:sldId id="258" r:id="rId4"/>
+    <p:sldId id="259" r:id="rId5"/>
+    <p:sldId id="260" r:id="rId6"/>
   </p:sldIdLst>
   <p:sldSz cx="12192000" cy="6858000"/>
   <p:notesSz cx="6858000" cy="9144000"/>
@@ -105,7 +111,362 @@
       </a:defRPr>
     </a:lvl9pPr>
   </p:defaultTextStyle>
+  <p:extLst>
+    <p:ext uri="{EFAFB233-063F-42B5-8137-9DF3F51BA10A}">
+      <p15:sldGuideLst xmlns:p15="http://schemas.microsoft.com/office/powerpoint/2012/main"/>
+    </p:ext>
+  </p:extLst>
 </p:presentation>
+</file>
+
+<file path=ppt/notesMasters/notesMaster1.xml><?xml version="1.0" encoding="utf-8"?>
+<p:notesMaster xmlns:a="http://schemas.openxmlformats.org/drawingml/2006/main" xmlns:r="http://schemas.openxmlformats.org/officeDocument/2006/relationships" xmlns:p="http://schemas.openxmlformats.org/presentationml/2006/main">
+  <p:cSld>
+    <p:bg>
+      <p:bgRef idx="1001">
+        <a:schemeClr val="bg1"/>
+      </p:bgRef>
+    </p:bg>
+    <p:spTree>
+      <p:nvGrpSpPr>
+        <p:cNvPr id="1" name=""/>
+        <p:cNvGrpSpPr/>
+        <p:nvPr/>
+      </p:nvGrpSpPr>
+      <p:grpSpPr>
+        <a:xfrm>
+          <a:off x="0" y="0"/>
+          <a:ext cx="0" cy="0"/>
+          <a:chOff x="0" y="0"/>
+          <a:chExt cx="0" cy="0"/>
+        </a:xfrm>
+      </p:grpSpPr>
+      <p:sp>
+        <p:nvSpPr>
+          <p:cNvPr id="2" name="Header Placeholder 1"/>
+          <p:cNvSpPr>
+            <a:spLocks noGrp="1"/>
+          </p:cNvSpPr>
+          <p:nvPr>
+            <p:ph type="hdr" sz="quarter"/>
+          </p:nvPr>
+        </p:nvSpPr>
+        <p:spPr>
+          <a:xfrm>
+            <a:off x="0" y="0"/>
+            <a:ext cx="2971800" cy="458788"/>
+          </a:xfrm>
+          <a:prstGeom prst="rect">
+            <a:avLst/>
+          </a:prstGeom>
+        </p:spPr>
+        <p:txBody>
+          <a:bodyPr vert="horz" lIns="91440" tIns="45720" rIns="91440" bIns="45720" rtlCol="0"/>
+          <a:lstStyle>
+            <a:lvl1pPr algn="l">
+              <a:defRPr sz="1200"/>
+            </a:lvl1pPr>
+          </a:lstStyle>
+          <a:p>
+            <a:endParaRPr lang="en-US"/>
+          </a:p>
+        </p:txBody>
+      </p:sp>
+      <p:sp>
+        <p:nvSpPr>
+          <p:cNvPr id="3" name="Date Placeholder 2"/>
+          <p:cNvSpPr>
+            <a:spLocks noGrp="1"/>
+          </p:cNvSpPr>
+          <p:nvPr>
+            <p:ph type="dt" idx="1"/>
+          </p:nvPr>
+        </p:nvSpPr>
+        <p:spPr>
+          <a:xfrm>
+            <a:off x="3884613" y="0"/>
+            <a:ext cx="2971800" cy="458788"/>
+          </a:xfrm>
+          <a:prstGeom prst="rect">
+            <a:avLst/>
+          </a:prstGeom>
+        </p:spPr>
+        <p:txBody>
+          <a:bodyPr vert="horz" lIns="91440" tIns="45720" rIns="91440" bIns="45720" rtlCol="0"/>
+          <a:lstStyle>
+            <a:lvl1pPr algn="r">
+              <a:defRPr sz="1200"/>
+            </a:lvl1pPr>
+          </a:lstStyle>
+          <a:p>
+            <a:fld id="{EC9F1B14-44F9-3D40-9367-CFF318082B84}" type="datetimeFigureOut">
+              <a:rPr lang="en-US" smtClean="0"/>
+              <a:t>4/17/17</a:t>
+            </a:fld>
+            <a:endParaRPr lang="en-US"/>
+          </a:p>
+        </p:txBody>
+      </p:sp>
+      <p:sp>
+        <p:nvSpPr>
+          <p:cNvPr id="4" name="Slide Image Placeholder 3"/>
+          <p:cNvSpPr>
+            <a:spLocks noGrp="1" noRot="1" noChangeAspect="1"/>
+          </p:cNvSpPr>
+          <p:nvPr>
+            <p:ph type="sldImg" idx="2"/>
+          </p:nvPr>
+        </p:nvSpPr>
+        <p:spPr>
+          <a:xfrm>
+            <a:off x="685800" y="1143000"/>
+            <a:ext cx="5486400" cy="3086100"/>
+          </a:xfrm>
+          <a:prstGeom prst="rect">
+            <a:avLst/>
+          </a:prstGeom>
+          <a:noFill/>
+          <a:ln w="12700">
+            <a:solidFill>
+              <a:prstClr val="black"/>
+            </a:solidFill>
+          </a:ln>
+        </p:spPr>
+        <p:txBody>
+          <a:bodyPr vert="horz" lIns="91440" tIns="45720" rIns="91440" bIns="45720" rtlCol="0" anchor="ctr"/>
+          <a:lstStyle/>
+          <a:p>
+            <a:endParaRPr lang="en-US"/>
+          </a:p>
+        </p:txBody>
+      </p:sp>
+      <p:sp>
+        <p:nvSpPr>
+          <p:cNvPr id="5" name="Notes Placeholder 4"/>
+          <p:cNvSpPr>
+            <a:spLocks noGrp="1"/>
+          </p:cNvSpPr>
+          <p:nvPr>
+            <p:ph type="body" sz="quarter" idx="3"/>
+          </p:nvPr>
+        </p:nvSpPr>
+        <p:spPr>
+          <a:xfrm>
+            <a:off x="685800" y="4400550"/>
+            <a:ext cx="5486400" cy="3600450"/>
+          </a:xfrm>
+          <a:prstGeom prst="rect">
+            <a:avLst/>
+          </a:prstGeom>
+        </p:spPr>
+        <p:txBody>
+          <a:bodyPr vert="horz" lIns="91440" tIns="45720" rIns="91440" bIns="45720" rtlCol="0"/>
+          <a:lstStyle/>
+          <a:p>
+            <a:pPr lvl="0"/>
+            <a:r>
+              <a:rPr lang="en-US" smtClean="0"/>
+              <a:t>Click to edit Master text styles</a:t>
+            </a:r>
+          </a:p>
+          <a:p>
+            <a:pPr lvl="1"/>
+            <a:r>
+              <a:rPr lang="en-US" smtClean="0"/>
+              <a:t>Second level</a:t>
+            </a:r>
+          </a:p>
+          <a:p>
+            <a:pPr lvl="2"/>
+            <a:r>
+              <a:rPr lang="en-US" smtClean="0"/>
+              <a:t>Third level</a:t>
+            </a:r>
+          </a:p>
+          <a:p>
+            <a:pPr lvl="3"/>
+            <a:r>
+              <a:rPr lang="en-US" smtClean="0"/>
+              <a:t>Fourth level</a:t>
+            </a:r>
+          </a:p>
+          <a:p>
+            <a:pPr lvl="4"/>
+            <a:r>
+              <a:rPr lang="en-US" smtClean="0"/>
+              <a:t>Fifth level</a:t>
+            </a:r>
+            <a:endParaRPr lang="en-US"/>
+          </a:p>
+        </p:txBody>
+      </p:sp>
+      <p:sp>
+        <p:nvSpPr>
+          <p:cNvPr id="6" name="Footer Placeholder 5"/>
+          <p:cNvSpPr>
+            <a:spLocks noGrp="1"/>
+          </p:cNvSpPr>
+          <p:nvPr>
+            <p:ph type="ftr" sz="quarter" idx="4"/>
+          </p:nvPr>
+        </p:nvSpPr>
+        <p:spPr>
+          <a:xfrm>
+            <a:off x="0" y="8685213"/>
+            <a:ext cx="2971800" cy="458787"/>
+          </a:xfrm>
+          <a:prstGeom prst="rect">
+            <a:avLst/>
+          </a:prstGeom>
+        </p:spPr>
+        <p:txBody>
+          <a:bodyPr vert="horz" lIns="91440" tIns="45720" rIns="91440" bIns="45720" rtlCol="0" anchor="b"/>
+          <a:lstStyle>
+            <a:lvl1pPr algn="l">
+              <a:defRPr sz="1200"/>
+            </a:lvl1pPr>
+          </a:lstStyle>
+          <a:p>
+            <a:endParaRPr lang="en-US"/>
+          </a:p>
+        </p:txBody>
+      </p:sp>
+      <p:sp>
+        <p:nvSpPr>
+          <p:cNvPr id="7" name="Slide Number Placeholder 6"/>
+          <p:cNvSpPr>
+            <a:spLocks noGrp="1"/>
+          </p:cNvSpPr>
+          <p:nvPr>
+            <p:ph type="sldNum" sz="quarter" idx="5"/>
+          </p:nvPr>
+        </p:nvSpPr>
+        <p:spPr>
+          <a:xfrm>
+            <a:off x="3884613" y="8685213"/>
+            <a:ext cx="2971800" cy="458787"/>
+          </a:xfrm>
+          <a:prstGeom prst="rect">
+            <a:avLst/>
+          </a:prstGeom>
+        </p:spPr>
+        <p:txBody>
+          <a:bodyPr vert="horz" lIns="91440" tIns="45720" rIns="91440" bIns="45720" rtlCol="0" anchor="b"/>
+          <a:lstStyle>
+            <a:lvl1pPr algn="r">
+              <a:defRPr sz="1200"/>
+            </a:lvl1pPr>
+          </a:lstStyle>
+          <a:p>
+            <a:fld id="{184EF0CD-D548-524B-8ABE-D09CFCF1F990}" type="slidenum">
+              <a:rPr lang="en-US" smtClean="0"/>
+              <a:t>‹#›</a:t>
+            </a:fld>
+            <a:endParaRPr lang="en-US"/>
+          </a:p>
+        </p:txBody>
+      </p:sp>
+    </p:spTree>
+    <p:extLst>
+      <p:ext uri="{BB962C8B-B14F-4D97-AF65-F5344CB8AC3E}">
+        <p14:creationId xmlns:p14="http://schemas.microsoft.com/office/powerpoint/2010/main" val="1811010709"/>
+      </p:ext>
+    </p:extLst>
+  </p:cSld>
+  <p:clrMap bg1="lt1" tx1="dk1" bg2="lt2" tx2="dk2" accent1="accent1" accent2="accent2" accent3="accent3" accent4="accent4" accent5="accent5" accent6="accent6" hlink="hlink" folHlink="folHlink"/>
+  <p:notesStyle>
+    <a:lvl1pPr marL="0" algn="l" defTabSz="914400" rtl="0" eaLnBrk="1" latinLnBrk="0" hangingPunct="1">
+      <a:defRPr sz="1200" kern="1200">
+        <a:solidFill>
+          <a:schemeClr val="tx1"/>
+        </a:solidFill>
+        <a:latin typeface="+mn-lt"/>
+        <a:ea typeface="+mn-ea"/>
+        <a:cs typeface="+mn-cs"/>
+      </a:defRPr>
+    </a:lvl1pPr>
+    <a:lvl2pPr marL="457200" algn="l" defTabSz="914400" rtl="0" eaLnBrk="1" latinLnBrk="0" hangingPunct="1">
+      <a:defRPr sz="1200" kern="1200">
+        <a:solidFill>
+          <a:schemeClr val="tx1"/>
+        </a:solidFill>
+        <a:latin typeface="+mn-lt"/>
+        <a:ea typeface="+mn-ea"/>
+        <a:cs typeface="+mn-cs"/>
+      </a:defRPr>
+    </a:lvl2pPr>
+    <a:lvl3pPr marL="914400" algn="l" defTabSz="914400" rtl="0" eaLnBrk="1" latinLnBrk="0" hangingPunct="1">
+      <a:defRPr sz="1200" kern="1200">
+        <a:solidFill>
+          <a:schemeClr val="tx1"/>
+        </a:solidFill>
+        <a:latin typeface="+mn-lt"/>
+        <a:ea typeface="+mn-ea"/>
+        <a:cs typeface="+mn-cs"/>
+      </a:defRPr>
+    </a:lvl3pPr>
+    <a:lvl4pPr marL="1371600" algn="l" defTabSz="914400" rtl="0" eaLnBrk="1" latinLnBrk="0" hangingPunct="1">
+      <a:defRPr sz="1200" kern="1200">
+        <a:solidFill>
+          <a:schemeClr val="tx1"/>
+        </a:solidFill>
+        <a:latin typeface="+mn-lt"/>
+        <a:ea typeface="+mn-ea"/>
+        <a:cs typeface="+mn-cs"/>
+      </a:defRPr>
+    </a:lvl4pPr>
+    <a:lvl5pPr marL="1828800" algn="l" defTabSz="914400" rtl="0" eaLnBrk="1" latinLnBrk="0" hangingPunct="1">
+      <a:defRPr sz="1200" kern="1200">
+        <a:solidFill>
+          <a:schemeClr val="tx1"/>
+        </a:solidFill>
+        <a:latin typeface="+mn-lt"/>
+        <a:ea typeface="+mn-ea"/>
+        <a:cs typeface="+mn-cs"/>
+      </a:defRPr>
+    </a:lvl5pPr>
+    <a:lvl6pPr marL="2286000" algn="l" defTabSz="914400" rtl="0" eaLnBrk="1" latinLnBrk="0" hangingPunct="1">
+      <a:defRPr sz="1200" kern="1200">
+        <a:solidFill>
+          <a:schemeClr val="tx1"/>
+        </a:solidFill>
+        <a:latin typeface="+mn-lt"/>
+        <a:ea typeface="+mn-ea"/>
+        <a:cs typeface="+mn-cs"/>
+      </a:defRPr>
+    </a:lvl6pPr>
+    <a:lvl7pPr marL="2743200" algn="l" defTabSz="914400" rtl="0" eaLnBrk="1" latinLnBrk="0" hangingPunct="1">
+      <a:defRPr sz="1200" kern="1200">
+        <a:solidFill>
+          <a:schemeClr val="tx1"/>
+        </a:solidFill>
+        <a:latin typeface="+mn-lt"/>
+        <a:ea typeface="+mn-ea"/>
+        <a:cs typeface="+mn-cs"/>
+      </a:defRPr>
+    </a:lvl7pPr>
+    <a:lvl8pPr marL="3200400" algn="l" defTabSz="914400" rtl="0" eaLnBrk="1" latinLnBrk="0" hangingPunct="1">
+      <a:defRPr sz="1200" kern="1200">
+        <a:solidFill>
+          <a:schemeClr val="tx1"/>
+        </a:solidFill>
+        <a:latin typeface="+mn-lt"/>
+        <a:ea typeface="+mn-ea"/>
+        <a:cs typeface="+mn-cs"/>
+      </a:defRPr>
+    </a:lvl8pPr>
+    <a:lvl9pPr marL="3657600" algn="l" defTabSz="914400" rtl="0" eaLnBrk="1" latinLnBrk="0" hangingPunct="1">
+      <a:defRPr sz="1200" kern="1200">
+        <a:solidFill>
+          <a:schemeClr val="tx1"/>
+        </a:solidFill>
+        <a:latin typeface="+mn-lt"/>
+        <a:ea typeface="+mn-ea"/>
+        <a:cs typeface="+mn-cs"/>
+      </a:defRPr>
+    </a:lvl9pPr>
+  </p:notesStyle>
+</p:notesMaster>
 </file>
 
 <file path=ppt/slideLayouts/slideLayout1.xml><?xml version="1.0" encoding="utf-8"?>
@@ -2974,14 +3335,14 @@
           <p:nvPr>
             <p:extLst>
               <p:ext uri="{D42A27DB-BD31-4B8C-83A1-F6EECF244321}">
-                <p14:modId xmlns:p14="http://schemas.microsoft.com/office/powerpoint/2010/main" val="693357627"/>
+                <p14:modId xmlns:p14="http://schemas.microsoft.com/office/powerpoint/2010/main" val="1225554964"/>
               </p:ext>
             </p:extLst>
           </p:nvPr>
         </p:nvGraphicFramePr>
         <p:xfrm>
-          <a:off x="655527" y="2300979"/>
-          <a:ext cx="11093724" cy="3269405"/>
+          <a:off x="655527" y="2300977"/>
+          <a:ext cx="10943439" cy="2422735"/>
         </p:xfrm>
         <a:graphic>
           <a:graphicData uri="http://schemas.openxmlformats.org/drawingml/2006/table">
@@ -2990,16 +3351,16 @@
                 <a:tableStyleId>{5C22544A-7EE6-4342-B048-85BDC9FD1C3A}</a:tableStyleId>
               </a:tblPr>
               <a:tblGrid>
-                <a:gridCol w="1206188"/>
-                <a:gridCol w="1478770"/>
-                <a:gridCol w="1367550"/>
-                <a:gridCol w="1805067"/>
-                <a:gridCol w="1116423"/>
-                <a:gridCol w="1443084"/>
-                <a:gridCol w="1556465"/>
+                <a:gridCol w="724218"/>
+                <a:gridCol w="1431989"/>
+                <a:gridCol w="1394143"/>
+                <a:gridCol w="1840167"/>
+                <a:gridCol w="821055"/>
+                <a:gridCol w="1815275"/>
+                <a:gridCol w="1796415"/>
                 <a:gridCol w="1120177"/>
               </a:tblGrid>
-              <a:tr h="653881">
+              <a:tr h="470798">
                 <a:tc>
                   <a:txBody>
                     <a:bodyPr/>
@@ -3133,7 +3494,7 @@
                   <a:tcPr/>
                 </a:tc>
               </a:tr>
-              <a:tr h="653881">
+              <a:tr h="719135">
                 <a:tc>
                   <a:txBody>
                     <a:bodyPr/>
@@ -3249,7 +3610,7 @@
                   <a:tcPr/>
                 </a:tc>
               </a:tr>
-              <a:tr h="653881">
+              <a:tr h="410934">
                 <a:tc>
                   <a:txBody>
                     <a:bodyPr/>
@@ -3331,7 +3692,7 @@
                   <a:tcPr/>
                 </a:tc>
               </a:tr>
-              <a:tr h="653881">
+              <a:tr h="410934">
                 <a:tc>
                   <a:txBody>
                     <a:bodyPr/>
@@ -3413,7 +3774,7 @@
                   <a:tcPr/>
                 </a:tc>
               </a:tr>
-              <a:tr h="653881">
+              <a:tr h="410934">
                 <a:tc>
                   <a:txBody>
                     <a:bodyPr/>
@@ -3698,12 +4059,15 @@
         </p:nvSpPr>
         <p:spPr>
           <a:xfrm>
-            <a:off x="10097504" y="1658237"/>
+            <a:off x="9821883" y="1658237"/>
             <a:ext cx="1703971" cy="369527"/>
           </a:xfrm>
           <a:prstGeom prst="roundRect">
             <a:avLst/>
           </a:prstGeom>
+          <a:solidFill>
+            <a:schemeClr val="accent3"/>
+          </a:solidFill>
           <a:effectLst>
             <a:outerShdw blurRad="50800" dist="76200" algn="l" rotWithShape="0">
               <a:prstClr val="black">
@@ -3735,8 +4099,13 @@
             <a:pPr algn="ctr"/>
             <a:r>
               <a:rPr lang="en-US" dirty="0" smtClean="0"/>
-              <a:t>Onboard New</a:t>
-            </a:r>
+              <a:t>Onboard </a:t>
+            </a:r>
+            <a:r>
+              <a:rPr lang="en-US" dirty="0" smtClean="0"/>
+              <a:t>New</a:t>
+            </a:r>
+            <a:endParaRPr lang="en-US" dirty="0" smtClean="0"/>
           </a:p>
         </p:txBody>
       </p:sp>
@@ -3748,12 +4117,20 @@
         </p:nvSpPr>
         <p:spPr>
           <a:xfrm>
-            <a:off x="10778103" y="3068132"/>
+            <a:off x="10606655" y="2900188"/>
             <a:ext cx="771396" cy="375761"/>
           </a:xfrm>
           <a:prstGeom prst="roundRect">
             <a:avLst/>
           </a:prstGeom>
+          <a:solidFill>
+            <a:schemeClr val="accent6"/>
+          </a:solidFill>
+          <a:ln>
+            <a:solidFill>
+              <a:srgbClr val="00B0F0"/>
+            </a:solidFill>
+          </a:ln>
           <a:effectLst>
             <a:outerShdw blurRad="50800" dist="76200" algn="l" rotWithShape="0">
               <a:prstClr val="black">
@@ -3874,7 +4251,7 @@
         </p:nvSpPr>
         <p:spPr>
           <a:xfrm>
-            <a:off x="648970" y="5986473"/>
+            <a:off x="655527" y="5003354"/>
             <a:ext cx="2922905" cy="357188"/>
           </a:xfrm>
           <a:prstGeom prst="roundRect">
@@ -4762,6 +5139,3366 @@
     <p:extLst>
       <p:ext uri="{BB962C8B-B14F-4D97-AF65-F5344CB8AC3E}">
         <p14:creationId xmlns:p14="http://schemas.microsoft.com/office/powerpoint/2010/main" val="570629000"/>
+      </p:ext>
+    </p:extLst>
+  </p:cSld>
+  <p:clrMapOvr>
+    <a:masterClrMapping/>
+  </p:clrMapOvr>
+</p:sld>
+</file>
+
+<file path=ppt/slides/slide3.xml><?xml version="1.0" encoding="utf-8"?>
+<p:sld xmlns:a="http://schemas.openxmlformats.org/drawingml/2006/main" xmlns:r="http://schemas.openxmlformats.org/officeDocument/2006/relationships" xmlns:p="http://schemas.openxmlformats.org/presentationml/2006/main">
+  <p:cSld>
+    <p:spTree>
+      <p:nvGrpSpPr>
+        <p:cNvPr id="1" name=""/>
+        <p:cNvGrpSpPr/>
+        <p:nvPr/>
+      </p:nvGrpSpPr>
+      <p:grpSpPr>
+        <a:xfrm>
+          <a:off x="0" y="0"/>
+          <a:ext cx="0" cy="0"/>
+          <a:chOff x="0" y="0"/>
+          <a:chExt cx="0" cy="0"/>
+        </a:xfrm>
+      </p:grpSpPr>
+      <p:sp>
+        <p:nvSpPr>
+          <p:cNvPr id="4" name="Rectangle 3"/>
+          <p:cNvSpPr/>
+          <p:nvPr/>
+        </p:nvSpPr>
+        <p:spPr>
+          <a:xfrm>
+            <a:off x="0" y="0"/>
+            <a:ext cx="12191999" cy="785813"/>
+          </a:xfrm>
+          <a:prstGeom prst="rect">
+            <a:avLst/>
+          </a:prstGeom>
+        </p:spPr>
+        <p:style>
+          <a:lnRef idx="2">
+            <a:schemeClr val="accent1">
+              <a:shade val="50000"/>
+            </a:schemeClr>
+          </a:lnRef>
+          <a:fillRef idx="1">
+            <a:schemeClr val="accent1"/>
+          </a:fillRef>
+          <a:effectRef idx="0">
+            <a:schemeClr val="accent1"/>
+          </a:effectRef>
+          <a:fontRef idx="minor">
+            <a:schemeClr val="lt1"/>
+          </a:fontRef>
+        </p:style>
+        <p:txBody>
+          <a:bodyPr rtlCol="0" anchor="ctr"/>
+          <a:lstStyle/>
+          <a:p>
+            <a:pPr algn="ctr"/>
+            <a:r>
+              <a:rPr lang="en-US" sz="4800" dirty="0" smtClean="0"/>
+              <a:t>Out going Financial Log</a:t>
+            </a:r>
+          </a:p>
+        </p:txBody>
+      </p:sp>
+      <p:graphicFrame>
+        <p:nvGraphicFramePr>
+          <p:cNvPr id="5" name="Table 4"/>
+          <p:cNvGraphicFramePr>
+            <a:graphicFrameLocks noGrp="1"/>
+          </p:cNvGraphicFramePr>
+          <p:nvPr>
+            <p:extLst>
+              <p:ext uri="{D42A27DB-BD31-4B8C-83A1-F6EECF244321}">
+                <p14:modId xmlns:p14="http://schemas.microsoft.com/office/powerpoint/2010/main" val="272565022"/>
+              </p:ext>
+            </p:extLst>
+          </p:nvPr>
+        </p:nvGraphicFramePr>
+        <p:xfrm>
+          <a:off x="331779" y="1981146"/>
+          <a:ext cx="7512059" cy="2048470"/>
+        </p:xfrm>
+        <a:graphic>
+          <a:graphicData uri="http://schemas.openxmlformats.org/drawingml/2006/table">
+            <a:tbl>
+              <a:tblPr firstRow="1" bandRow="1">
+                <a:tableStyleId>{5C22544A-7EE6-4342-B048-85BDC9FD1C3A}</a:tableStyleId>
+              </a:tblPr>
+              <a:tblGrid>
+                <a:gridCol w="523360"/>
+                <a:gridCol w="1436769"/>
+                <a:gridCol w="1504502"/>
+                <a:gridCol w="1671023"/>
+                <a:gridCol w="1583677"/>
+                <a:gridCol w="792728"/>
+              </a:tblGrid>
+              <a:tr h="409694">
+                <a:tc>
+                  <a:txBody>
+                    <a:bodyPr/>
+                    <a:lstStyle/>
+                    <a:p>
+                      <a:r>
+                        <a:rPr lang="en-US" baseline="0" dirty="0" smtClean="0"/>
+                        <a:t>No</a:t>
+                      </a:r>
+                      <a:endParaRPr lang="en-US" dirty="0"/>
+                    </a:p>
+                  </a:txBody>
+                  <a:tcPr/>
+                </a:tc>
+                <a:tc>
+                  <a:txBody>
+                    <a:bodyPr/>
+                    <a:lstStyle/>
+                    <a:p>
+                      <a:r>
+                        <a:rPr lang="en-US" dirty="0" smtClean="0"/>
+                        <a:t>Date</a:t>
+                      </a:r>
+                      <a:endParaRPr lang="en-US" dirty="0"/>
+                    </a:p>
+                  </a:txBody>
+                  <a:tcPr/>
+                </a:tc>
+                <a:tc>
+                  <a:txBody>
+                    <a:bodyPr/>
+                    <a:lstStyle/>
+                    <a:p>
+                      <a:r>
+                        <a:rPr lang="en-US" dirty="0" smtClean="0"/>
+                        <a:t>Category</a:t>
+                      </a:r>
+                      <a:endParaRPr lang="en-US" dirty="0"/>
+                    </a:p>
+                  </a:txBody>
+                  <a:tcPr/>
+                </a:tc>
+                <a:tc>
+                  <a:txBody>
+                    <a:bodyPr/>
+                    <a:lstStyle/>
+                    <a:p>
+                      <a:r>
+                        <a:rPr lang="en-US" dirty="0" smtClean="0"/>
+                        <a:t>Account Name</a:t>
+                      </a:r>
+                      <a:endParaRPr lang="en-US" dirty="0"/>
+                    </a:p>
+                  </a:txBody>
+                  <a:tcPr/>
+                </a:tc>
+                <a:tc>
+                  <a:txBody>
+                    <a:bodyPr/>
+                    <a:lstStyle/>
+                    <a:p>
+                      <a:r>
+                        <a:rPr lang="en-US" dirty="0" smtClean="0"/>
+                        <a:t>Amount (INR)</a:t>
+                      </a:r>
+                      <a:endParaRPr lang="en-US" dirty="0"/>
+                    </a:p>
+                  </a:txBody>
+                  <a:tcPr/>
+                </a:tc>
+                <a:tc>
+                  <a:txBody>
+                    <a:bodyPr/>
+                    <a:lstStyle/>
+                    <a:p>
+                      <a:endParaRPr lang="en-US" dirty="0"/>
+                    </a:p>
+                  </a:txBody>
+                  <a:tcPr/>
+                </a:tc>
+              </a:tr>
+              <a:tr h="409694">
+                <a:tc>
+                  <a:txBody>
+                    <a:bodyPr/>
+                    <a:lstStyle/>
+                    <a:p>
+                      <a:r>
+                        <a:rPr lang="en-US" dirty="0" smtClean="0"/>
+                        <a:t>1</a:t>
+                      </a:r>
+                      <a:endParaRPr lang="en-US" dirty="0"/>
+                    </a:p>
+                  </a:txBody>
+                  <a:tcPr/>
+                </a:tc>
+                <a:tc>
+                  <a:txBody>
+                    <a:bodyPr/>
+                    <a:lstStyle/>
+                    <a:p>
+                      <a:r>
+                        <a:rPr lang="en-US" dirty="0" smtClean="0"/>
+                        <a:t>02-Apr-2017</a:t>
+                      </a:r>
+                      <a:endParaRPr lang="en-US" dirty="0"/>
+                    </a:p>
+                  </a:txBody>
+                  <a:tcPr/>
+                </a:tc>
+                <a:tc>
+                  <a:txBody>
+                    <a:bodyPr/>
+                    <a:lstStyle/>
+                    <a:p>
+                      <a:r>
+                        <a:rPr lang="en-US" dirty="0" smtClean="0"/>
+                        <a:t>Maintenance</a:t>
+                      </a:r>
+                      <a:endParaRPr lang="en-US" dirty="0"/>
+                    </a:p>
+                  </a:txBody>
+                  <a:tcPr/>
+                </a:tc>
+                <a:tc>
+                  <a:txBody>
+                    <a:bodyPr/>
+                    <a:lstStyle/>
+                    <a:p>
+                      <a:r>
+                        <a:rPr lang="en-US" u="sng" dirty="0" smtClean="0"/>
+                        <a:t>Web</a:t>
+                      </a:r>
+                      <a:r>
+                        <a:rPr lang="en-US" u="sng" baseline="0" dirty="0" smtClean="0"/>
+                        <a:t> Site</a:t>
+                      </a:r>
+                      <a:endParaRPr lang="en-US" u="sng" dirty="0"/>
+                    </a:p>
+                  </a:txBody>
+                  <a:tcPr/>
+                </a:tc>
+                <a:tc>
+                  <a:txBody>
+                    <a:bodyPr/>
+                    <a:lstStyle/>
+                    <a:p>
+                      <a:r>
+                        <a:rPr lang="en-US" dirty="0" smtClean="0"/>
+                        <a:t>2,000</a:t>
+                      </a:r>
+                      <a:endParaRPr lang="en-US" dirty="0"/>
+                    </a:p>
+                  </a:txBody>
+                  <a:tcPr/>
+                </a:tc>
+                <a:tc>
+                  <a:txBody>
+                    <a:bodyPr/>
+                    <a:lstStyle/>
+                    <a:p>
+                      <a:endParaRPr lang="en-US" dirty="0"/>
+                    </a:p>
+                  </a:txBody>
+                  <a:tcPr/>
+                </a:tc>
+              </a:tr>
+              <a:tr h="409694">
+                <a:tc>
+                  <a:txBody>
+                    <a:bodyPr/>
+                    <a:lstStyle/>
+                    <a:p>
+                      <a:r>
+                        <a:rPr lang="en-US" dirty="0" smtClean="0"/>
+                        <a:t>2</a:t>
+                      </a:r>
+                      <a:endParaRPr lang="en-US" dirty="0"/>
+                    </a:p>
+                  </a:txBody>
+                  <a:tcPr/>
+                </a:tc>
+                <a:tc>
+                  <a:txBody>
+                    <a:bodyPr/>
+                    <a:lstStyle/>
+                    <a:p>
+                      <a:r>
+                        <a:rPr lang="en-US" dirty="0" smtClean="0"/>
+                        <a:t>03-Apr-2017</a:t>
+                      </a:r>
+                      <a:endParaRPr lang="en-US" dirty="0"/>
+                    </a:p>
+                  </a:txBody>
+                  <a:tcPr/>
+                </a:tc>
+                <a:tc>
+                  <a:txBody>
+                    <a:bodyPr/>
+                    <a:lstStyle/>
+                    <a:p>
+                      <a:r>
+                        <a:rPr lang="en-US" dirty="0" smtClean="0"/>
+                        <a:t>Consultant</a:t>
+                      </a:r>
+                      <a:endParaRPr lang="en-US" dirty="0"/>
+                    </a:p>
+                  </a:txBody>
+                  <a:tcPr/>
+                </a:tc>
+                <a:tc>
+                  <a:txBody>
+                    <a:bodyPr/>
+                    <a:lstStyle/>
+                    <a:p>
+                      <a:r>
+                        <a:rPr lang="en-US" u="sng" dirty="0" smtClean="0"/>
+                        <a:t>Prabhat Jena</a:t>
+                      </a:r>
+                      <a:endParaRPr lang="en-US" u="sng" dirty="0"/>
+                    </a:p>
+                  </a:txBody>
+                  <a:tcPr/>
+                </a:tc>
+                <a:tc>
+                  <a:txBody>
+                    <a:bodyPr/>
+                    <a:lstStyle/>
+                    <a:p>
+                      <a:r>
+                        <a:rPr lang="en-US" dirty="0" smtClean="0"/>
+                        <a:t>8,500</a:t>
+                      </a:r>
+                      <a:endParaRPr lang="en-US" dirty="0"/>
+                    </a:p>
+                  </a:txBody>
+                  <a:tcPr/>
+                </a:tc>
+                <a:tc>
+                  <a:txBody>
+                    <a:bodyPr/>
+                    <a:lstStyle/>
+                    <a:p>
+                      <a:endParaRPr lang="en-US" dirty="0"/>
+                    </a:p>
+                  </a:txBody>
+                  <a:tcPr/>
+                </a:tc>
+              </a:tr>
+              <a:tr h="409694">
+                <a:tc>
+                  <a:txBody>
+                    <a:bodyPr/>
+                    <a:lstStyle/>
+                    <a:p>
+                      <a:r>
+                        <a:rPr lang="en-US" dirty="0" smtClean="0"/>
+                        <a:t>3</a:t>
+                      </a:r>
+                      <a:endParaRPr lang="en-US" dirty="0"/>
+                    </a:p>
+                  </a:txBody>
+                  <a:tcPr/>
+                </a:tc>
+                <a:tc>
+                  <a:txBody>
+                    <a:bodyPr/>
+                    <a:lstStyle/>
+                    <a:p>
+                      <a:r>
+                        <a:rPr lang="en-US" dirty="0" smtClean="0"/>
+                        <a:t>03-Apr-2017</a:t>
+                      </a:r>
+                      <a:endParaRPr lang="en-US" dirty="0"/>
+                    </a:p>
+                  </a:txBody>
+                  <a:tcPr/>
+                </a:tc>
+                <a:tc>
+                  <a:txBody>
+                    <a:bodyPr/>
+                    <a:lstStyle/>
+                    <a:p>
+                      <a:r>
+                        <a:rPr lang="en-US" dirty="0" smtClean="0"/>
+                        <a:t>Consultant</a:t>
+                      </a:r>
+                      <a:endParaRPr lang="en-US" dirty="0"/>
+                    </a:p>
+                  </a:txBody>
+                  <a:tcPr/>
+                </a:tc>
+                <a:tc>
+                  <a:txBody>
+                    <a:bodyPr/>
+                    <a:lstStyle/>
+                    <a:p>
+                      <a:r>
+                        <a:rPr lang="en-US" u="sng" dirty="0" smtClean="0"/>
+                        <a:t>Anil Shaw</a:t>
+                      </a:r>
+                      <a:endParaRPr lang="en-US" u="sng" dirty="0"/>
+                    </a:p>
+                  </a:txBody>
+                  <a:tcPr/>
+                </a:tc>
+                <a:tc>
+                  <a:txBody>
+                    <a:bodyPr/>
+                    <a:lstStyle/>
+                    <a:p>
+                      <a:r>
+                        <a:rPr lang="en-US" dirty="0" smtClean="0"/>
+                        <a:t>5,000</a:t>
+                      </a:r>
+                      <a:endParaRPr lang="en-US" dirty="0"/>
+                    </a:p>
+                  </a:txBody>
+                  <a:tcPr/>
+                </a:tc>
+                <a:tc>
+                  <a:txBody>
+                    <a:bodyPr/>
+                    <a:lstStyle/>
+                    <a:p>
+                      <a:endParaRPr lang="en-US" dirty="0"/>
+                    </a:p>
+                  </a:txBody>
+                  <a:tcPr/>
+                </a:tc>
+              </a:tr>
+              <a:tr h="409694">
+                <a:tc>
+                  <a:txBody>
+                    <a:bodyPr/>
+                    <a:lstStyle/>
+                    <a:p>
+                      <a:r>
+                        <a:rPr lang="en-US" dirty="0" smtClean="0"/>
+                        <a:t>4</a:t>
+                      </a:r>
+                      <a:endParaRPr lang="en-US" dirty="0"/>
+                    </a:p>
+                  </a:txBody>
+                  <a:tcPr/>
+                </a:tc>
+                <a:tc>
+                  <a:txBody>
+                    <a:bodyPr/>
+                    <a:lstStyle/>
+                    <a:p>
+                      <a:r>
+                        <a:rPr lang="en-US" dirty="0" smtClean="0"/>
+                        <a:t>04-Apr-2017</a:t>
+                      </a:r>
+                      <a:endParaRPr lang="en-US" dirty="0"/>
+                    </a:p>
+                  </a:txBody>
+                  <a:tcPr/>
+                </a:tc>
+                <a:tc>
+                  <a:txBody>
+                    <a:bodyPr/>
+                    <a:lstStyle/>
+                    <a:p>
+                      <a:r>
+                        <a:rPr lang="en-US" dirty="0" smtClean="0"/>
+                        <a:t>Maintenance</a:t>
+                      </a:r>
+                      <a:endParaRPr lang="en-US" dirty="0"/>
+                    </a:p>
+                  </a:txBody>
+                  <a:tcPr/>
+                </a:tc>
+                <a:tc>
+                  <a:txBody>
+                    <a:bodyPr/>
+                    <a:lstStyle/>
+                    <a:p>
+                      <a:r>
+                        <a:rPr lang="en-US" u="sng" dirty="0" smtClean="0"/>
+                        <a:t>Go-Daddy</a:t>
+                      </a:r>
+                      <a:endParaRPr lang="en-US" u="sng" dirty="0"/>
+                    </a:p>
+                  </a:txBody>
+                  <a:tcPr/>
+                </a:tc>
+                <a:tc>
+                  <a:txBody>
+                    <a:bodyPr/>
+                    <a:lstStyle/>
+                    <a:p>
+                      <a:r>
+                        <a:rPr lang="en-US" dirty="0" smtClean="0"/>
+                        <a:t>3,000</a:t>
+                      </a:r>
+                      <a:endParaRPr lang="en-US" dirty="0"/>
+                    </a:p>
+                  </a:txBody>
+                  <a:tcPr/>
+                </a:tc>
+                <a:tc>
+                  <a:txBody>
+                    <a:bodyPr/>
+                    <a:lstStyle/>
+                    <a:p>
+                      <a:endParaRPr lang="en-US" dirty="0"/>
+                    </a:p>
+                  </a:txBody>
+                  <a:tcPr/>
+                </a:tc>
+              </a:tr>
+            </a:tbl>
+          </a:graphicData>
+        </a:graphic>
+      </p:graphicFrame>
+      <p:sp>
+        <p:nvSpPr>
+          <p:cNvPr id="8" name="TextBox 7"/>
+          <p:cNvSpPr txBox="1"/>
+          <p:nvPr/>
+        </p:nvSpPr>
+        <p:spPr>
+          <a:xfrm>
+            <a:off x="417508" y="1228725"/>
+            <a:ext cx="1139827" cy="369332"/>
+          </a:xfrm>
+          <a:prstGeom prst="rect">
+            <a:avLst/>
+          </a:prstGeom>
+          <a:noFill/>
+          <a:ln>
+            <a:solidFill>
+              <a:schemeClr val="accent1"/>
+            </a:solidFill>
+          </a:ln>
+        </p:spPr>
+        <p:txBody>
+          <a:bodyPr wrap="square" rtlCol="0">
+            <a:spAutoFit/>
+          </a:bodyPr>
+          <a:lstStyle/>
+          <a:p>
+            <a:r>
+              <a:rPr lang="en-US" smtClean="0"/>
+              <a:t>From date</a:t>
+            </a:r>
+            <a:endParaRPr lang="en-US"/>
+          </a:p>
+        </p:txBody>
+      </p:sp>
+      <p:sp>
+        <p:nvSpPr>
+          <p:cNvPr id="9" name="TextBox 8"/>
+          <p:cNvSpPr txBox="1"/>
+          <p:nvPr/>
+        </p:nvSpPr>
+        <p:spPr>
+          <a:xfrm>
+            <a:off x="1743072" y="1228725"/>
+            <a:ext cx="1139827" cy="369332"/>
+          </a:xfrm>
+          <a:prstGeom prst="rect">
+            <a:avLst/>
+          </a:prstGeom>
+          <a:solidFill>
+            <a:schemeClr val="bg1"/>
+          </a:solidFill>
+          <a:ln>
+            <a:solidFill>
+              <a:schemeClr val="accent1"/>
+            </a:solidFill>
+          </a:ln>
+        </p:spPr>
+        <p:txBody>
+          <a:bodyPr wrap="square" rtlCol="0">
+            <a:spAutoFit/>
+          </a:bodyPr>
+          <a:lstStyle/>
+          <a:p>
+            <a:r>
+              <a:rPr lang="en-US" dirty="0" smtClean="0"/>
+              <a:t>To date</a:t>
+            </a:r>
+            <a:endParaRPr lang="en-US" dirty="0"/>
+          </a:p>
+        </p:txBody>
+      </p:sp>
+      <p:sp>
+        <p:nvSpPr>
+          <p:cNvPr id="10" name="Rounded Rectangle 9"/>
+          <p:cNvSpPr/>
+          <p:nvPr/>
+        </p:nvSpPr>
+        <p:spPr>
+          <a:xfrm>
+            <a:off x="3244847" y="1243012"/>
+            <a:ext cx="942975" cy="375761"/>
+          </a:xfrm>
+          <a:prstGeom prst="roundRect">
+            <a:avLst/>
+          </a:prstGeom>
+          <a:effectLst>
+            <a:outerShdw blurRad="50800" dist="76200" algn="l" rotWithShape="0">
+              <a:prstClr val="black">
+                <a:alpha val="40000"/>
+              </a:prstClr>
+            </a:outerShdw>
+          </a:effectLst>
+        </p:spPr>
+        <p:style>
+          <a:lnRef idx="2">
+            <a:schemeClr val="accent1">
+              <a:shade val="50000"/>
+            </a:schemeClr>
+          </a:lnRef>
+          <a:fillRef idx="1">
+            <a:schemeClr val="accent1"/>
+          </a:fillRef>
+          <a:effectRef idx="0">
+            <a:schemeClr val="accent1"/>
+          </a:effectRef>
+          <a:fontRef idx="minor">
+            <a:schemeClr val="lt1"/>
+          </a:fontRef>
+        </p:style>
+        <p:txBody>
+          <a:bodyPr rtlCol="0" anchor="ctr"/>
+          <a:lstStyle/>
+          <a:p>
+            <a:pPr algn="ctr"/>
+            <a:r>
+              <a:rPr lang="en-US" b="1" dirty="0" smtClean="0"/>
+              <a:t>Search</a:t>
+            </a:r>
+            <a:endParaRPr lang="en-US" b="1" dirty="0"/>
+          </a:p>
+        </p:txBody>
+      </p:sp>
+      <p:sp>
+        <p:nvSpPr>
+          <p:cNvPr id="13" name="Rounded Rectangle 12"/>
+          <p:cNvSpPr/>
+          <p:nvPr/>
+        </p:nvSpPr>
+        <p:spPr>
+          <a:xfrm>
+            <a:off x="431798" y="4234111"/>
+            <a:ext cx="2922905" cy="357188"/>
+          </a:xfrm>
+          <a:prstGeom prst="roundRect">
+            <a:avLst/>
+          </a:prstGeom>
+        </p:spPr>
+        <p:style>
+          <a:lnRef idx="2">
+            <a:schemeClr val="accent1">
+              <a:shade val="50000"/>
+            </a:schemeClr>
+          </a:lnRef>
+          <a:fillRef idx="1">
+            <a:schemeClr val="accent1"/>
+          </a:fillRef>
+          <a:effectRef idx="0">
+            <a:schemeClr val="accent1"/>
+          </a:effectRef>
+          <a:fontRef idx="minor">
+            <a:schemeClr val="lt1"/>
+          </a:fontRef>
+        </p:style>
+        <p:txBody>
+          <a:bodyPr rtlCol="0" anchor="ctr"/>
+          <a:lstStyle/>
+          <a:p>
+            <a:pPr algn="ctr"/>
+            <a:r>
+              <a:rPr lang="en-US" dirty="0" smtClean="0"/>
+              <a:t>|&lt;&lt;     &lt;&lt;   1 of 10    &gt;&gt;    &gt;&gt;|</a:t>
+            </a:r>
+            <a:endParaRPr lang="en-US" dirty="0"/>
+          </a:p>
+        </p:txBody>
+      </p:sp>
+      <p:graphicFrame>
+        <p:nvGraphicFramePr>
+          <p:cNvPr id="14" name="Table 13"/>
+          <p:cNvGraphicFramePr>
+            <a:graphicFrameLocks noGrp="1"/>
+          </p:cNvGraphicFramePr>
+          <p:nvPr>
+            <p:extLst>
+              <p:ext uri="{D42A27DB-BD31-4B8C-83A1-F6EECF244321}">
+                <p14:modId xmlns:p14="http://schemas.microsoft.com/office/powerpoint/2010/main" val="883710422"/>
+              </p:ext>
+            </p:extLst>
+          </p:nvPr>
+        </p:nvGraphicFramePr>
+        <p:xfrm>
+          <a:off x="8043861" y="2003480"/>
+          <a:ext cx="3757614" cy="1229082"/>
+        </p:xfrm>
+        <a:graphic>
+          <a:graphicData uri="http://schemas.openxmlformats.org/drawingml/2006/table">
+            <a:tbl>
+              <a:tblPr firstRow="1" bandRow="1">
+                <a:tableStyleId>{5C22544A-7EE6-4342-B048-85BDC9FD1C3A}</a:tableStyleId>
+              </a:tblPr>
+              <a:tblGrid>
+                <a:gridCol w="1878807"/>
+                <a:gridCol w="1878807"/>
+              </a:tblGrid>
+              <a:tr h="409694">
+                <a:tc>
+                  <a:txBody>
+                    <a:bodyPr/>
+                    <a:lstStyle/>
+                    <a:p>
+                      <a:r>
+                        <a:rPr lang="en-US" dirty="0" smtClean="0"/>
+                        <a:t>Description</a:t>
+                      </a:r>
+                      <a:endParaRPr lang="en-US" dirty="0"/>
+                    </a:p>
+                  </a:txBody>
+                  <a:tcPr/>
+                </a:tc>
+                <a:tc>
+                  <a:txBody>
+                    <a:bodyPr/>
+                    <a:lstStyle/>
+                    <a:p>
+                      <a:r>
+                        <a:rPr lang="en-US" dirty="0" smtClean="0"/>
+                        <a:t>Amount (INR)</a:t>
+                      </a:r>
+                      <a:endParaRPr lang="en-US" dirty="0"/>
+                    </a:p>
+                  </a:txBody>
+                  <a:tcPr/>
+                </a:tc>
+              </a:tr>
+              <a:tr h="409694">
+                <a:tc>
+                  <a:txBody>
+                    <a:bodyPr/>
+                    <a:lstStyle/>
+                    <a:p>
+                      <a:r>
+                        <a:rPr lang="en-US" dirty="0" smtClean="0"/>
+                        <a:t>Total Incoming</a:t>
+                      </a:r>
+                      <a:endParaRPr lang="en-US" dirty="0"/>
+                    </a:p>
+                  </a:txBody>
+                  <a:tcPr/>
+                </a:tc>
+                <a:tc>
+                  <a:txBody>
+                    <a:bodyPr/>
+                    <a:lstStyle/>
+                    <a:p>
+                      <a:r>
+                        <a:rPr lang="en-US" dirty="0" smtClean="0"/>
+                        <a:t>35,000</a:t>
+                      </a:r>
+                      <a:endParaRPr lang="en-US" dirty="0"/>
+                    </a:p>
+                  </a:txBody>
+                  <a:tcPr/>
+                </a:tc>
+              </a:tr>
+              <a:tr h="409694">
+                <a:tc>
+                  <a:txBody>
+                    <a:bodyPr/>
+                    <a:lstStyle/>
+                    <a:p>
+                      <a:r>
+                        <a:rPr lang="en-US" dirty="0" smtClean="0"/>
+                        <a:t>Total Outgoing</a:t>
+                      </a:r>
+                      <a:endParaRPr lang="en-US" dirty="0"/>
+                    </a:p>
+                  </a:txBody>
+                  <a:tcPr/>
+                </a:tc>
+                <a:tc>
+                  <a:txBody>
+                    <a:bodyPr/>
+                    <a:lstStyle/>
+                    <a:p>
+                      <a:r>
+                        <a:rPr lang="en-US" dirty="0" smtClean="0"/>
+                        <a:t>18,500</a:t>
+                      </a:r>
+                      <a:endParaRPr lang="en-US" dirty="0"/>
+                    </a:p>
+                  </a:txBody>
+                  <a:tcPr/>
+                </a:tc>
+              </a:tr>
+            </a:tbl>
+          </a:graphicData>
+        </a:graphic>
+      </p:graphicFrame>
+      <p:sp>
+        <p:nvSpPr>
+          <p:cNvPr id="15" name="Parallelogram 14"/>
+          <p:cNvSpPr/>
+          <p:nvPr/>
+        </p:nvSpPr>
+        <p:spPr>
+          <a:xfrm>
+            <a:off x="8386762" y="1397766"/>
+            <a:ext cx="3071813" cy="428625"/>
+          </a:xfrm>
+          <a:prstGeom prst="parallelogram">
+            <a:avLst/>
+          </a:prstGeom>
+        </p:spPr>
+        <p:style>
+          <a:lnRef idx="2">
+            <a:schemeClr val="accent1">
+              <a:shade val="50000"/>
+            </a:schemeClr>
+          </a:lnRef>
+          <a:fillRef idx="1">
+            <a:schemeClr val="accent1"/>
+          </a:fillRef>
+          <a:effectRef idx="0">
+            <a:schemeClr val="accent1"/>
+          </a:effectRef>
+          <a:fontRef idx="minor">
+            <a:schemeClr val="lt1"/>
+          </a:fontRef>
+        </p:style>
+        <p:txBody>
+          <a:bodyPr rtlCol="0" anchor="ctr"/>
+          <a:lstStyle/>
+          <a:p>
+            <a:pPr algn="ctr"/>
+            <a:r>
+              <a:rPr lang="en-US" b="1" dirty="0" smtClean="0"/>
+              <a:t>Summary </a:t>
+            </a:r>
+            <a:endParaRPr lang="en-US" b="1" dirty="0"/>
+          </a:p>
+        </p:txBody>
+      </p:sp>
+      <p:sp>
+        <p:nvSpPr>
+          <p:cNvPr id="17" name="Rounded Rectangle 16"/>
+          <p:cNvSpPr/>
+          <p:nvPr/>
+        </p:nvSpPr>
+        <p:spPr>
+          <a:xfrm>
+            <a:off x="6364286" y="1270046"/>
+            <a:ext cx="1435106" cy="375761"/>
+          </a:xfrm>
+          <a:prstGeom prst="roundRect">
+            <a:avLst/>
+          </a:prstGeom>
+          <a:solidFill>
+            <a:schemeClr val="accent3"/>
+          </a:solidFill>
+          <a:effectLst>
+            <a:outerShdw blurRad="50800" dist="76200" algn="l" rotWithShape="0">
+              <a:prstClr val="black">
+                <a:alpha val="40000"/>
+              </a:prstClr>
+            </a:outerShdw>
+          </a:effectLst>
+        </p:spPr>
+        <p:style>
+          <a:lnRef idx="2">
+            <a:schemeClr val="accent1">
+              <a:shade val="50000"/>
+            </a:schemeClr>
+          </a:lnRef>
+          <a:fillRef idx="1">
+            <a:schemeClr val="accent1"/>
+          </a:fillRef>
+          <a:effectRef idx="0">
+            <a:schemeClr val="accent1"/>
+          </a:effectRef>
+          <a:fontRef idx="minor">
+            <a:schemeClr val="lt1"/>
+          </a:fontRef>
+        </p:style>
+        <p:txBody>
+          <a:bodyPr rtlCol="0" anchor="ctr"/>
+          <a:lstStyle/>
+          <a:p>
+            <a:pPr algn="ctr"/>
+            <a:r>
+              <a:rPr lang="en-US" b="1" smtClean="0"/>
+              <a:t>Add Expense</a:t>
+            </a:r>
+          </a:p>
+        </p:txBody>
+      </p:sp>
+      <p:sp>
+        <p:nvSpPr>
+          <p:cNvPr id="18" name="Rounded Rectangle 17"/>
+          <p:cNvSpPr/>
+          <p:nvPr/>
+        </p:nvSpPr>
+        <p:spPr>
+          <a:xfrm>
+            <a:off x="7129591" y="2417277"/>
+            <a:ext cx="599947" cy="325923"/>
+          </a:xfrm>
+          <a:prstGeom prst="roundRect">
+            <a:avLst/>
+          </a:prstGeom>
+          <a:solidFill>
+            <a:schemeClr val="accent6"/>
+          </a:solidFill>
+          <a:ln>
+            <a:solidFill>
+              <a:srgbClr val="00B0F0"/>
+            </a:solidFill>
+          </a:ln>
+          <a:effectLst>
+            <a:outerShdw blurRad="50800" dist="76200" algn="l" rotWithShape="0">
+              <a:prstClr val="black">
+                <a:alpha val="40000"/>
+              </a:prstClr>
+            </a:outerShdw>
+          </a:effectLst>
+        </p:spPr>
+        <p:style>
+          <a:lnRef idx="2">
+            <a:schemeClr val="accent1">
+              <a:shade val="50000"/>
+            </a:schemeClr>
+          </a:lnRef>
+          <a:fillRef idx="1">
+            <a:schemeClr val="accent1"/>
+          </a:fillRef>
+          <a:effectRef idx="0">
+            <a:schemeClr val="accent1"/>
+          </a:effectRef>
+          <a:fontRef idx="minor">
+            <a:schemeClr val="lt1"/>
+          </a:fontRef>
+        </p:style>
+        <p:txBody>
+          <a:bodyPr rtlCol="0" anchor="ctr"/>
+          <a:lstStyle/>
+          <a:p>
+            <a:pPr algn="ctr"/>
+            <a:r>
+              <a:rPr lang="en-US" dirty="0" smtClean="0"/>
+              <a:t>Edit</a:t>
+            </a:r>
+            <a:endParaRPr lang="en-US" dirty="0"/>
+          </a:p>
+        </p:txBody>
+      </p:sp>
+      <p:sp>
+        <p:nvSpPr>
+          <p:cNvPr id="19" name="Rounded Rectangle 18"/>
+          <p:cNvSpPr/>
+          <p:nvPr/>
+        </p:nvSpPr>
+        <p:spPr>
+          <a:xfrm>
+            <a:off x="7124828" y="2855428"/>
+            <a:ext cx="599947" cy="325923"/>
+          </a:xfrm>
+          <a:prstGeom prst="roundRect">
+            <a:avLst/>
+          </a:prstGeom>
+          <a:solidFill>
+            <a:schemeClr val="accent6"/>
+          </a:solidFill>
+          <a:ln>
+            <a:solidFill>
+              <a:srgbClr val="00B0F0"/>
+            </a:solidFill>
+          </a:ln>
+          <a:effectLst>
+            <a:outerShdw blurRad="50800" dist="76200" algn="l" rotWithShape="0">
+              <a:prstClr val="black">
+                <a:alpha val="40000"/>
+              </a:prstClr>
+            </a:outerShdw>
+          </a:effectLst>
+        </p:spPr>
+        <p:style>
+          <a:lnRef idx="2">
+            <a:schemeClr val="accent1">
+              <a:shade val="50000"/>
+            </a:schemeClr>
+          </a:lnRef>
+          <a:fillRef idx="1">
+            <a:schemeClr val="accent1"/>
+          </a:fillRef>
+          <a:effectRef idx="0">
+            <a:schemeClr val="accent1"/>
+          </a:effectRef>
+          <a:fontRef idx="minor">
+            <a:schemeClr val="lt1"/>
+          </a:fontRef>
+        </p:style>
+        <p:txBody>
+          <a:bodyPr rtlCol="0" anchor="ctr"/>
+          <a:lstStyle/>
+          <a:p>
+            <a:pPr algn="ctr"/>
+            <a:r>
+              <a:rPr lang="en-US" dirty="0" smtClean="0"/>
+              <a:t>Edit</a:t>
+            </a:r>
+            <a:endParaRPr lang="en-US" dirty="0"/>
+          </a:p>
+        </p:txBody>
+      </p:sp>
+      <p:sp>
+        <p:nvSpPr>
+          <p:cNvPr id="20" name="Rounded Rectangle 19"/>
+          <p:cNvSpPr/>
+          <p:nvPr/>
+        </p:nvSpPr>
+        <p:spPr>
+          <a:xfrm>
+            <a:off x="7124828" y="3253448"/>
+            <a:ext cx="599947" cy="325923"/>
+          </a:xfrm>
+          <a:prstGeom prst="roundRect">
+            <a:avLst/>
+          </a:prstGeom>
+          <a:solidFill>
+            <a:schemeClr val="accent6"/>
+          </a:solidFill>
+          <a:ln>
+            <a:solidFill>
+              <a:srgbClr val="00B0F0"/>
+            </a:solidFill>
+          </a:ln>
+          <a:effectLst>
+            <a:outerShdw blurRad="50800" dist="76200" algn="l" rotWithShape="0">
+              <a:prstClr val="black">
+                <a:alpha val="40000"/>
+              </a:prstClr>
+            </a:outerShdw>
+          </a:effectLst>
+        </p:spPr>
+        <p:style>
+          <a:lnRef idx="2">
+            <a:schemeClr val="accent1">
+              <a:shade val="50000"/>
+            </a:schemeClr>
+          </a:lnRef>
+          <a:fillRef idx="1">
+            <a:schemeClr val="accent1"/>
+          </a:fillRef>
+          <a:effectRef idx="0">
+            <a:schemeClr val="accent1"/>
+          </a:effectRef>
+          <a:fontRef idx="minor">
+            <a:schemeClr val="lt1"/>
+          </a:fontRef>
+        </p:style>
+        <p:txBody>
+          <a:bodyPr rtlCol="0" anchor="ctr"/>
+          <a:lstStyle/>
+          <a:p>
+            <a:pPr algn="ctr"/>
+            <a:r>
+              <a:rPr lang="en-US" dirty="0" smtClean="0"/>
+              <a:t>Edit</a:t>
+            </a:r>
+            <a:endParaRPr lang="en-US" dirty="0"/>
+          </a:p>
+        </p:txBody>
+      </p:sp>
+      <p:sp>
+        <p:nvSpPr>
+          <p:cNvPr id="21" name="Rounded Rectangle 20"/>
+          <p:cNvSpPr/>
+          <p:nvPr/>
+        </p:nvSpPr>
+        <p:spPr>
+          <a:xfrm>
+            <a:off x="7129655" y="3651468"/>
+            <a:ext cx="599947" cy="325923"/>
+          </a:xfrm>
+          <a:prstGeom prst="roundRect">
+            <a:avLst/>
+          </a:prstGeom>
+          <a:solidFill>
+            <a:schemeClr val="accent6"/>
+          </a:solidFill>
+          <a:ln>
+            <a:solidFill>
+              <a:srgbClr val="00B0F0"/>
+            </a:solidFill>
+          </a:ln>
+          <a:effectLst>
+            <a:outerShdw blurRad="50800" dist="76200" algn="l" rotWithShape="0">
+              <a:prstClr val="black">
+                <a:alpha val="40000"/>
+              </a:prstClr>
+            </a:outerShdw>
+          </a:effectLst>
+        </p:spPr>
+        <p:style>
+          <a:lnRef idx="2">
+            <a:schemeClr val="accent1">
+              <a:shade val="50000"/>
+            </a:schemeClr>
+          </a:lnRef>
+          <a:fillRef idx="1">
+            <a:schemeClr val="accent1"/>
+          </a:fillRef>
+          <a:effectRef idx="0">
+            <a:schemeClr val="accent1"/>
+          </a:effectRef>
+          <a:fontRef idx="minor">
+            <a:schemeClr val="lt1"/>
+          </a:fontRef>
+        </p:style>
+        <p:txBody>
+          <a:bodyPr rtlCol="0" anchor="ctr"/>
+          <a:lstStyle/>
+          <a:p>
+            <a:pPr algn="ctr"/>
+            <a:r>
+              <a:rPr lang="en-US" dirty="0" smtClean="0"/>
+              <a:t>Edit</a:t>
+            </a:r>
+            <a:endParaRPr lang="en-US" dirty="0"/>
+          </a:p>
+        </p:txBody>
+      </p:sp>
+    </p:spTree>
+    <p:extLst>
+      <p:ext uri="{BB962C8B-B14F-4D97-AF65-F5344CB8AC3E}">
+        <p14:creationId xmlns:p14="http://schemas.microsoft.com/office/powerpoint/2010/main" val="961234509"/>
+      </p:ext>
+    </p:extLst>
+  </p:cSld>
+  <p:clrMapOvr>
+    <a:masterClrMapping/>
+  </p:clrMapOvr>
+</p:sld>
+</file>
+
+<file path=ppt/slides/slide4.xml><?xml version="1.0" encoding="utf-8"?>
+<p:sld xmlns:a="http://schemas.openxmlformats.org/drawingml/2006/main" xmlns:r="http://schemas.openxmlformats.org/officeDocument/2006/relationships" xmlns:p="http://schemas.openxmlformats.org/presentationml/2006/main">
+  <p:cSld>
+    <p:spTree>
+      <p:nvGrpSpPr>
+        <p:cNvPr id="1" name=""/>
+        <p:cNvGrpSpPr/>
+        <p:nvPr/>
+      </p:nvGrpSpPr>
+      <p:grpSpPr>
+        <a:xfrm>
+          <a:off x="0" y="0"/>
+          <a:ext cx="0" cy="0"/>
+          <a:chOff x="0" y="0"/>
+          <a:chExt cx="0" cy="0"/>
+        </a:xfrm>
+      </p:grpSpPr>
+      <p:sp>
+        <p:nvSpPr>
+          <p:cNvPr id="4" name="Rectangle 3"/>
+          <p:cNvSpPr/>
+          <p:nvPr/>
+        </p:nvSpPr>
+        <p:spPr>
+          <a:xfrm>
+            <a:off x="0" y="0"/>
+            <a:ext cx="12191999" cy="785813"/>
+          </a:xfrm>
+          <a:prstGeom prst="rect">
+            <a:avLst/>
+          </a:prstGeom>
+        </p:spPr>
+        <p:style>
+          <a:lnRef idx="2">
+            <a:schemeClr val="accent1">
+              <a:shade val="50000"/>
+            </a:schemeClr>
+          </a:lnRef>
+          <a:fillRef idx="1">
+            <a:schemeClr val="accent1"/>
+          </a:fillRef>
+          <a:effectRef idx="0">
+            <a:schemeClr val="accent1"/>
+          </a:effectRef>
+          <a:fontRef idx="minor">
+            <a:schemeClr val="lt1"/>
+          </a:fontRef>
+        </p:style>
+        <p:txBody>
+          <a:bodyPr rtlCol="0" anchor="ctr"/>
+          <a:lstStyle/>
+          <a:p>
+            <a:pPr algn="ctr"/>
+            <a:r>
+              <a:rPr lang="en-US" sz="4800" dirty="0" smtClean="0"/>
+              <a:t>In Coming Financial Log</a:t>
+            </a:r>
+          </a:p>
+        </p:txBody>
+      </p:sp>
+      <p:graphicFrame>
+        <p:nvGraphicFramePr>
+          <p:cNvPr id="5" name="Table 4"/>
+          <p:cNvGraphicFramePr>
+            <a:graphicFrameLocks noGrp="1"/>
+          </p:cNvGraphicFramePr>
+          <p:nvPr>
+            <p:extLst>
+              <p:ext uri="{D42A27DB-BD31-4B8C-83A1-F6EECF244321}">
+                <p14:modId xmlns:p14="http://schemas.microsoft.com/office/powerpoint/2010/main" val="1319357068"/>
+              </p:ext>
+            </p:extLst>
+          </p:nvPr>
+        </p:nvGraphicFramePr>
+        <p:xfrm>
+          <a:off x="431798" y="1981146"/>
+          <a:ext cx="6154740" cy="2048470"/>
+        </p:xfrm>
+        <a:graphic>
+          <a:graphicData uri="http://schemas.openxmlformats.org/drawingml/2006/table">
+            <a:tbl>
+              <a:tblPr firstRow="1" bandRow="1">
+                <a:tableStyleId>{5C22544A-7EE6-4342-B048-85BDC9FD1C3A}</a:tableStyleId>
+              </a:tblPr>
+              <a:tblGrid>
+                <a:gridCol w="724218"/>
+                <a:gridCol w="1395476"/>
+                <a:gridCol w="1622997"/>
+                <a:gridCol w="1538161"/>
+                <a:gridCol w="873888"/>
+              </a:tblGrid>
+              <a:tr h="409694">
+                <a:tc>
+                  <a:txBody>
+                    <a:bodyPr/>
+                    <a:lstStyle/>
+                    <a:p>
+                      <a:r>
+                        <a:rPr lang="en-US" dirty="0" err="1" smtClean="0"/>
+                        <a:t>Sl</a:t>
+                      </a:r>
+                      <a:r>
+                        <a:rPr lang="en-US" baseline="0" dirty="0" smtClean="0"/>
+                        <a:t> No</a:t>
+                      </a:r>
+                      <a:endParaRPr lang="en-US" dirty="0"/>
+                    </a:p>
+                  </a:txBody>
+                  <a:tcPr/>
+                </a:tc>
+                <a:tc>
+                  <a:txBody>
+                    <a:bodyPr/>
+                    <a:lstStyle/>
+                    <a:p>
+                      <a:r>
+                        <a:rPr lang="en-US" dirty="0" smtClean="0"/>
+                        <a:t>Date</a:t>
+                      </a:r>
+                      <a:endParaRPr lang="en-US" dirty="0"/>
+                    </a:p>
+                  </a:txBody>
+                  <a:tcPr/>
+                </a:tc>
+                <a:tc>
+                  <a:txBody>
+                    <a:bodyPr/>
+                    <a:lstStyle/>
+                    <a:p>
+                      <a:r>
+                        <a:rPr lang="en-US" smtClean="0"/>
+                        <a:t>Account Name</a:t>
+                      </a:r>
+                      <a:endParaRPr lang="en-US" dirty="0"/>
+                    </a:p>
+                  </a:txBody>
+                  <a:tcPr/>
+                </a:tc>
+                <a:tc>
+                  <a:txBody>
+                    <a:bodyPr/>
+                    <a:lstStyle/>
+                    <a:p>
+                      <a:r>
+                        <a:rPr lang="en-US" dirty="0" smtClean="0"/>
+                        <a:t>Amount (INR)</a:t>
+                      </a:r>
+                      <a:endParaRPr lang="en-US" dirty="0"/>
+                    </a:p>
+                  </a:txBody>
+                  <a:tcPr/>
+                </a:tc>
+                <a:tc>
+                  <a:txBody>
+                    <a:bodyPr/>
+                    <a:lstStyle/>
+                    <a:p>
+                      <a:endParaRPr lang="en-US" dirty="0"/>
+                    </a:p>
+                  </a:txBody>
+                  <a:tcPr/>
+                </a:tc>
+              </a:tr>
+              <a:tr h="409694">
+                <a:tc>
+                  <a:txBody>
+                    <a:bodyPr/>
+                    <a:lstStyle/>
+                    <a:p>
+                      <a:r>
+                        <a:rPr lang="en-US" dirty="0" smtClean="0"/>
+                        <a:t>1</a:t>
+                      </a:r>
+                      <a:endParaRPr lang="en-US" dirty="0"/>
+                    </a:p>
+                  </a:txBody>
+                  <a:tcPr/>
+                </a:tc>
+                <a:tc>
+                  <a:txBody>
+                    <a:bodyPr/>
+                    <a:lstStyle/>
+                    <a:p>
+                      <a:r>
+                        <a:rPr lang="en-US" dirty="0" smtClean="0"/>
+                        <a:t>02-Apr-2017</a:t>
+                      </a:r>
+                      <a:endParaRPr lang="en-US" dirty="0"/>
+                    </a:p>
+                  </a:txBody>
+                  <a:tcPr/>
+                </a:tc>
+                <a:tc>
+                  <a:txBody>
+                    <a:bodyPr/>
+                    <a:lstStyle/>
+                    <a:p>
+                      <a:r>
+                        <a:rPr lang="en-US" u="sng" dirty="0" smtClean="0"/>
+                        <a:t>Dheeraj</a:t>
+                      </a:r>
+                      <a:endParaRPr lang="en-US" u="sng" dirty="0"/>
+                    </a:p>
+                  </a:txBody>
+                  <a:tcPr/>
+                </a:tc>
+                <a:tc>
+                  <a:txBody>
+                    <a:bodyPr/>
+                    <a:lstStyle/>
+                    <a:p>
+                      <a:r>
+                        <a:rPr lang="en-US" dirty="0" smtClean="0"/>
+                        <a:t>35,000</a:t>
+                      </a:r>
+                      <a:endParaRPr lang="en-US" dirty="0"/>
+                    </a:p>
+                  </a:txBody>
+                  <a:tcPr/>
+                </a:tc>
+                <a:tc>
+                  <a:txBody>
+                    <a:bodyPr/>
+                    <a:lstStyle/>
+                    <a:p>
+                      <a:endParaRPr lang="en-US" dirty="0"/>
+                    </a:p>
+                  </a:txBody>
+                  <a:tcPr/>
+                </a:tc>
+              </a:tr>
+              <a:tr h="409694">
+                <a:tc>
+                  <a:txBody>
+                    <a:bodyPr/>
+                    <a:lstStyle/>
+                    <a:p>
+                      <a:r>
+                        <a:rPr lang="en-US" dirty="0" smtClean="0"/>
+                        <a:t>2</a:t>
+                      </a:r>
+                      <a:endParaRPr lang="en-US" dirty="0"/>
+                    </a:p>
+                  </a:txBody>
+                  <a:tcPr/>
+                </a:tc>
+                <a:tc>
+                  <a:txBody>
+                    <a:bodyPr/>
+                    <a:lstStyle/>
+                    <a:p>
+                      <a:r>
+                        <a:rPr lang="en-US" dirty="0" smtClean="0"/>
+                        <a:t>03-Apr-2017</a:t>
+                      </a:r>
+                      <a:endParaRPr lang="en-US" dirty="0"/>
+                    </a:p>
+                  </a:txBody>
+                  <a:tcPr/>
+                </a:tc>
+                <a:tc>
+                  <a:txBody>
+                    <a:bodyPr/>
+                    <a:lstStyle/>
+                    <a:p>
+                      <a:r>
+                        <a:rPr lang="en-US" u="sng" dirty="0" smtClean="0"/>
+                        <a:t>Ganesh</a:t>
+                      </a:r>
+                      <a:endParaRPr lang="en-US" u="sng" dirty="0"/>
+                    </a:p>
+                  </a:txBody>
+                  <a:tcPr/>
+                </a:tc>
+                <a:tc>
+                  <a:txBody>
+                    <a:bodyPr/>
+                    <a:lstStyle/>
+                    <a:p>
+                      <a:r>
+                        <a:rPr lang="en-US" dirty="0" smtClean="0"/>
+                        <a:t>18,500</a:t>
+                      </a:r>
+                      <a:endParaRPr lang="en-US" dirty="0"/>
+                    </a:p>
+                  </a:txBody>
+                  <a:tcPr/>
+                </a:tc>
+                <a:tc>
+                  <a:txBody>
+                    <a:bodyPr/>
+                    <a:lstStyle/>
+                    <a:p>
+                      <a:endParaRPr lang="en-US" dirty="0"/>
+                    </a:p>
+                  </a:txBody>
+                  <a:tcPr/>
+                </a:tc>
+              </a:tr>
+              <a:tr h="409694">
+                <a:tc>
+                  <a:txBody>
+                    <a:bodyPr/>
+                    <a:lstStyle/>
+                    <a:p>
+                      <a:endParaRPr lang="en-US" dirty="0"/>
+                    </a:p>
+                  </a:txBody>
+                  <a:tcPr/>
+                </a:tc>
+                <a:tc>
+                  <a:txBody>
+                    <a:bodyPr/>
+                    <a:lstStyle/>
+                    <a:p>
+                      <a:endParaRPr lang="en-US" dirty="0"/>
+                    </a:p>
+                  </a:txBody>
+                  <a:tcPr/>
+                </a:tc>
+                <a:tc>
+                  <a:txBody>
+                    <a:bodyPr/>
+                    <a:lstStyle/>
+                    <a:p>
+                      <a:endParaRPr lang="en-US" dirty="0"/>
+                    </a:p>
+                  </a:txBody>
+                  <a:tcPr/>
+                </a:tc>
+                <a:tc>
+                  <a:txBody>
+                    <a:bodyPr/>
+                    <a:lstStyle/>
+                    <a:p>
+                      <a:endParaRPr lang="en-US" dirty="0"/>
+                    </a:p>
+                  </a:txBody>
+                  <a:tcPr/>
+                </a:tc>
+                <a:tc>
+                  <a:txBody>
+                    <a:bodyPr/>
+                    <a:lstStyle/>
+                    <a:p>
+                      <a:endParaRPr lang="en-US" dirty="0"/>
+                    </a:p>
+                  </a:txBody>
+                  <a:tcPr/>
+                </a:tc>
+              </a:tr>
+              <a:tr h="409694">
+                <a:tc>
+                  <a:txBody>
+                    <a:bodyPr/>
+                    <a:lstStyle/>
+                    <a:p>
+                      <a:endParaRPr lang="en-US" dirty="0"/>
+                    </a:p>
+                  </a:txBody>
+                  <a:tcPr/>
+                </a:tc>
+                <a:tc>
+                  <a:txBody>
+                    <a:bodyPr/>
+                    <a:lstStyle/>
+                    <a:p>
+                      <a:endParaRPr lang="en-US" dirty="0"/>
+                    </a:p>
+                  </a:txBody>
+                  <a:tcPr/>
+                </a:tc>
+                <a:tc>
+                  <a:txBody>
+                    <a:bodyPr/>
+                    <a:lstStyle/>
+                    <a:p>
+                      <a:endParaRPr lang="en-US" dirty="0"/>
+                    </a:p>
+                  </a:txBody>
+                  <a:tcPr/>
+                </a:tc>
+                <a:tc>
+                  <a:txBody>
+                    <a:bodyPr/>
+                    <a:lstStyle/>
+                    <a:p>
+                      <a:endParaRPr lang="en-US" dirty="0"/>
+                    </a:p>
+                  </a:txBody>
+                  <a:tcPr/>
+                </a:tc>
+                <a:tc>
+                  <a:txBody>
+                    <a:bodyPr/>
+                    <a:lstStyle/>
+                    <a:p>
+                      <a:endParaRPr lang="en-US" dirty="0"/>
+                    </a:p>
+                  </a:txBody>
+                  <a:tcPr/>
+                </a:tc>
+              </a:tr>
+            </a:tbl>
+          </a:graphicData>
+        </a:graphic>
+      </p:graphicFrame>
+      <p:sp>
+        <p:nvSpPr>
+          <p:cNvPr id="8" name="TextBox 7"/>
+          <p:cNvSpPr txBox="1"/>
+          <p:nvPr/>
+        </p:nvSpPr>
+        <p:spPr>
+          <a:xfrm>
+            <a:off x="417508" y="1228725"/>
+            <a:ext cx="1139827" cy="369332"/>
+          </a:xfrm>
+          <a:prstGeom prst="rect">
+            <a:avLst/>
+          </a:prstGeom>
+          <a:noFill/>
+          <a:ln>
+            <a:solidFill>
+              <a:schemeClr val="accent1"/>
+            </a:solidFill>
+          </a:ln>
+        </p:spPr>
+        <p:txBody>
+          <a:bodyPr wrap="square" rtlCol="0">
+            <a:spAutoFit/>
+          </a:bodyPr>
+          <a:lstStyle/>
+          <a:p>
+            <a:r>
+              <a:rPr lang="en-US" smtClean="0"/>
+              <a:t>From date</a:t>
+            </a:r>
+            <a:endParaRPr lang="en-US"/>
+          </a:p>
+        </p:txBody>
+      </p:sp>
+      <p:sp>
+        <p:nvSpPr>
+          <p:cNvPr id="9" name="TextBox 8"/>
+          <p:cNvSpPr txBox="1"/>
+          <p:nvPr/>
+        </p:nvSpPr>
+        <p:spPr>
+          <a:xfrm>
+            <a:off x="1743072" y="1228725"/>
+            <a:ext cx="1139827" cy="369332"/>
+          </a:xfrm>
+          <a:prstGeom prst="rect">
+            <a:avLst/>
+          </a:prstGeom>
+          <a:solidFill>
+            <a:schemeClr val="bg1"/>
+          </a:solidFill>
+          <a:ln>
+            <a:solidFill>
+              <a:schemeClr val="accent1"/>
+            </a:solidFill>
+          </a:ln>
+        </p:spPr>
+        <p:txBody>
+          <a:bodyPr wrap="square" rtlCol="0">
+            <a:spAutoFit/>
+          </a:bodyPr>
+          <a:lstStyle/>
+          <a:p>
+            <a:r>
+              <a:rPr lang="en-US" dirty="0" smtClean="0"/>
+              <a:t>To date</a:t>
+            </a:r>
+            <a:endParaRPr lang="en-US" dirty="0"/>
+          </a:p>
+        </p:txBody>
+      </p:sp>
+      <p:sp>
+        <p:nvSpPr>
+          <p:cNvPr id="10" name="Rounded Rectangle 9"/>
+          <p:cNvSpPr/>
+          <p:nvPr/>
+        </p:nvSpPr>
+        <p:spPr>
+          <a:xfrm>
+            <a:off x="3214335" y="1228725"/>
+            <a:ext cx="942975" cy="375761"/>
+          </a:xfrm>
+          <a:prstGeom prst="roundRect">
+            <a:avLst/>
+          </a:prstGeom>
+          <a:effectLst>
+            <a:outerShdw blurRad="50800" dist="76200" algn="l" rotWithShape="0">
+              <a:prstClr val="black">
+                <a:alpha val="40000"/>
+              </a:prstClr>
+            </a:outerShdw>
+          </a:effectLst>
+        </p:spPr>
+        <p:style>
+          <a:lnRef idx="2">
+            <a:schemeClr val="accent1">
+              <a:shade val="50000"/>
+            </a:schemeClr>
+          </a:lnRef>
+          <a:fillRef idx="1">
+            <a:schemeClr val="accent1"/>
+          </a:fillRef>
+          <a:effectRef idx="0">
+            <a:schemeClr val="accent1"/>
+          </a:effectRef>
+          <a:fontRef idx="minor">
+            <a:schemeClr val="lt1"/>
+          </a:fontRef>
+        </p:style>
+        <p:txBody>
+          <a:bodyPr rtlCol="0" anchor="ctr"/>
+          <a:lstStyle/>
+          <a:p>
+            <a:pPr algn="ctr"/>
+            <a:r>
+              <a:rPr lang="en-US" dirty="0" smtClean="0"/>
+              <a:t>Search</a:t>
+            </a:r>
+            <a:endParaRPr lang="en-US" dirty="0"/>
+          </a:p>
+        </p:txBody>
+      </p:sp>
+      <p:sp>
+        <p:nvSpPr>
+          <p:cNvPr id="13" name="Rounded Rectangle 12"/>
+          <p:cNvSpPr/>
+          <p:nvPr/>
+        </p:nvSpPr>
+        <p:spPr>
+          <a:xfrm>
+            <a:off x="431798" y="4234111"/>
+            <a:ext cx="2922905" cy="357188"/>
+          </a:xfrm>
+          <a:prstGeom prst="roundRect">
+            <a:avLst/>
+          </a:prstGeom>
+        </p:spPr>
+        <p:style>
+          <a:lnRef idx="2">
+            <a:schemeClr val="accent1">
+              <a:shade val="50000"/>
+            </a:schemeClr>
+          </a:lnRef>
+          <a:fillRef idx="1">
+            <a:schemeClr val="accent1"/>
+          </a:fillRef>
+          <a:effectRef idx="0">
+            <a:schemeClr val="accent1"/>
+          </a:effectRef>
+          <a:fontRef idx="minor">
+            <a:schemeClr val="lt1"/>
+          </a:fontRef>
+        </p:style>
+        <p:txBody>
+          <a:bodyPr rtlCol="0" anchor="ctr"/>
+          <a:lstStyle/>
+          <a:p>
+            <a:pPr algn="ctr"/>
+            <a:r>
+              <a:rPr lang="en-US" dirty="0" smtClean="0"/>
+              <a:t>|&lt;&lt;     &lt;&lt;   1 of 10    &gt;&gt;    &gt;&gt;|</a:t>
+            </a:r>
+            <a:endParaRPr lang="en-US" dirty="0"/>
+          </a:p>
+        </p:txBody>
+      </p:sp>
+      <p:graphicFrame>
+        <p:nvGraphicFramePr>
+          <p:cNvPr id="14" name="Table 13"/>
+          <p:cNvGraphicFramePr>
+            <a:graphicFrameLocks noGrp="1"/>
+          </p:cNvGraphicFramePr>
+          <p:nvPr>
+            <p:extLst>
+              <p:ext uri="{D42A27DB-BD31-4B8C-83A1-F6EECF244321}">
+                <p14:modId xmlns:p14="http://schemas.microsoft.com/office/powerpoint/2010/main" val="1075089286"/>
+              </p:ext>
+            </p:extLst>
+          </p:nvPr>
+        </p:nvGraphicFramePr>
+        <p:xfrm>
+          <a:off x="7743824" y="1981146"/>
+          <a:ext cx="3757614" cy="1229082"/>
+        </p:xfrm>
+        <a:graphic>
+          <a:graphicData uri="http://schemas.openxmlformats.org/drawingml/2006/table">
+            <a:tbl>
+              <a:tblPr firstRow="1" bandRow="1">
+                <a:tableStyleId>{5C22544A-7EE6-4342-B048-85BDC9FD1C3A}</a:tableStyleId>
+              </a:tblPr>
+              <a:tblGrid>
+                <a:gridCol w="1878807"/>
+                <a:gridCol w="1878807"/>
+              </a:tblGrid>
+              <a:tr h="409694">
+                <a:tc>
+                  <a:txBody>
+                    <a:bodyPr/>
+                    <a:lstStyle/>
+                    <a:p>
+                      <a:r>
+                        <a:rPr lang="en-US" dirty="0" smtClean="0"/>
+                        <a:t>Description</a:t>
+                      </a:r>
+                      <a:endParaRPr lang="en-US" dirty="0"/>
+                    </a:p>
+                  </a:txBody>
+                  <a:tcPr/>
+                </a:tc>
+                <a:tc>
+                  <a:txBody>
+                    <a:bodyPr/>
+                    <a:lstStyle/>
+                    <a:p>
+                      <a:r>
+                        <a:rPr lang="en-US" dirty="0" smtClean="0"/>
+                        <a:t>Amount (INR)</a:t>
+                      </a:r>
+                      <a:endParaRPr lang="en-US" dirty="0"/>
+                    </a:p>
+                  </a:txBody>
+                  <a:tcPr/>
+                </a:tc>
+              </a:tr>
+              <a:tr h="409694">
+                <a:tc>
+                  <a:txBody>
+                    <a:bodyPr/>
+                    <a:lstStyle/>
+                    <a:p>
+                      <a:r>
+                        <a:rPr lang="en-US" dirty="0" smtClean="0"/>
+                        <a:t>Total Incoming</a:t>
+                      </a:r>
+                      <a:endParaRPr lang="en-US" dirty="0"/>
+                    </a:p>
+                  </a:txBody>
+                  <a:tcPr/>
+                </a:tc>
+                <a:tc>
+                  <a:txBody>
+                    <a:bodyPr/>
+                    <a:lstStyle/>
+                    <a:p>
+                      <a:r>
+                        <a:rPr lang="en-US" dirty="0" smtClean="0"/>
+                        <a:t>53,500</a:t>
+                      </a:r>
+                      <a:endParaRPr lang="en-US" dirty="0"/>
+                    </a:p>
+                  </a:txBody>
+                  <a:tcPr/>
+                </a:tc>
+              </a:tr>
+              <a:tr h="409694">
+                <a:tc>
+                  <a:txBody>
+                    <a:bodyPr/>
+                    <a:lstStyle/>
+                    <a:p>
+                      <a:r>
+                        <a:rPr lang="en-US" dirty="0" smtClean="0"/>
+                        <a:t>Total Outgoing</a:t>
+                      </a:r>
+                      <a:endParaRPr lang="en-US" dirty="0"/>
+                    </a:p>
+                  </a:txBody>
+                  <a:tcPr/>
+                </a:tc>
+                <a:tc>
+                  <a:txBody>
+                    <a:bodyPr/>
+                    <a:lstStyle/>
+                    <a:p>
+                      <a:r>
+                        <a:rPr lang="en-US" dirty="0" smtClean="0"/>
+                        <a:t>18,500</a:t>
+                      </a:r>
+                      <a:endParaRPr lang="en-US" dirty="0"/>
+                    </a:p>
+                  </a:txBody>
+                  <a:tcPr/>
+                </a:tc>
+              </a:tr>
+            </a:tbl>
+          </a:graphicData>
+        </a:graphic>
+      </p:graphicFrame>
+      <p:sp>
+        <p:nvSpPr>
+          <p:cNvPr id="15" name="Parallelogram 14"/>
+          <p:cNvSpPr/>
+          <p:nvPr/>
+        </p:nvSpPr>
+        <p:spPr>
+          <a:xfrm>
+            <a:off x="8143875" y="1383744"/>
+            <a:ext cx="3071813" cy="428625"/>
+          </a:xfrm>
+          <a:prstGeom prst="parallelogram">
+            <a:avLst/>
+          </a:prstGeom>
+        </p:spPr>
+        <p:style>
+          <a:lnRef idx="2">
+            <a:schemeClr val="accent1">
+              <a:shade val="50000"/>
+            </a:schemeClr>
+          </a:lnRef>
+          <a:fillRef idx="1">
+            <a:schemeClr val="accent1"/>
+          </a:fillRef>
+          <a:effectRef idx="0">
+            <a:schemeClr val="accent1"/>
+          </a:effectRef>
+          <a:fontRef idx="minor">
+            <a:schemeClr val="lt1"/>
+          </a:fontRef>
+        </p:style>
+        <p:txBody>
+          <a:bodyPr rtlCol="0" anchor="ctr"/>
+          <a:lstStyle/>
+          <a:p>
+            <a:pPr algn="ctr"/>
+            <a:r>
+              <a:rPr lang="en-US" b="1" dirty="0" smtClean="0"/>
+              <a:t>Summary </a:t>
+            </a:r>
+            <a:endParaRPr lang="en-US" b="1" dirty="0"/>
+          </a:p>
+        </p:txBody>
+      </p:sp>
+      <p:sp>
+        <p:nvSpPr>
+          <p:cNvPr id="12" name="Rounded Rectangle 11"/>
+          <p:cNvSpPr/>
+          <p:nvPr/>
+        </p:nvSpPr>
+        <p:spPr>
+          <a:xfrm>
+            <a:off x="5796025" y="2432725"/>
+            <a:ext cx="599947" cy="325923"/>
+          </a:xfrm>
+          <a:prstGeom prst="roundRect">
+            <a:avLst/>
+          </a:prstGeom>
+          <a:solidFill>
+            <a:schemeClr val="accent6"/>
+          </a:solidFill>
+          <a:ln>
+            <a:solidFill>
+              <a:srgbClr val="00B0F0"/>
+            </a:solidFill>
+          </a:ln>
+          <a:effectLst>
+            <a:outerShdw blurRad="50800" dist="76200" algn="l" rotWithShape="0">
+              <a:prstClr val="black">
+                <a:alpha val="40000"/>
+              </a:prstClr>
+            </a:outerShdw>
+          </a:effectLst>
+        </p:spPr>
+        <p:style>
+          <a:lnRef idx="2">
+            <a:schemeClr val="accent1">
+              <a:shade val="50000"/>
+            </a:schemeClr>
+          </a:lnRef>
+          <a:fillRef idx="1">
+            <a:schemeClr val="accent1"/>
+          </a:fillRef>
+          <a:effectRef idx="0">
+            <a:schemeClr val="accent1"/>
+          </a:effectRef>
+          <a:fontRef idx="minor">
+            <a:schemeClr val="lt1"/>
+          </a:fontRef>
+        </p:style>
+        <p:txBody>
+          <a:bodyPr rtlCol="0" anchor="ctr"/>
+          <a:lstStyle/>
+          <a:p>
+            <a:pPr algn="ctr"/>
+            <a:r>
+              <a:rPr lang="en-US" dirty="0" smtClean="0"/>
+              <a:t>Edit</a:t>
+            </a:r>
+            <a:endParaRPr lang="en-US" dirty="0"/>
+          </a:p>
+        </p:txBody>
+      </p:sp>
+      <p:sp>
+        <p:nvSpPr>
+          <p:cNvPr id="16" name="Rounded Rectangle 15"/>
+          <p:cNvSpPr/>
+          <p:nvPr/>
+        </p:nvSpPr>
+        <p:spPr>
+          <a:xfrm>
+            <a:off x="5796024" y="2842419"/>
+            <a:ext cx="599947" cy="325923"/>
+          </a:xfrm>
+          <a:prstGeom prst="roundRect">
+            <a:avLst/>
+          </a:prstGeom>
+          <a:solidFill>
+            <a:schemeClr val="accent6"/>
+          </a:solidFill>
+          <a:ln>
+            <a:solidFill>
+              <a:srgbClr val="00B0F0"/>
+            </a:solidFill>
+          </a:ln>
+          <a:effectLst>
+            <a:outerShdw blurRad="50800" dist="76200" algn="l" rotWithShape="0">
+              <a:prstClr val="black">
+                <a:alpha val="40000"/>
+              </a:prstClr>
+            </a:outerShdw>
+          </a:effectLst>
+        </p:spPr>
+        <p:style>
+          <a:lnRef idx="2">
+            <a:schemeClr val="accent1">
+              <a:shade val="50000"/>
+            </a:schemeClr>
+          </a:lnRef>
+          <a:fillRef idx="1">
+            <a:schemeClr val="accent1"/>
+          </a:fillRef>
+          <a:effectRef idx="0">
+            <a:schemeClr val="accent1"/>
+          </a:effectRef>
+          <a:fontRef idx="minor">
+            <a:schemeClr val="lt1"/>
+          </a:fontRef>
+        </p:style>
+        <p:txBody>
+          <a:bodyPr rtlCol="0" anchor="ctr"/>
+          <a:lstStyle/>
+          <a:p>
+            <a:pPr algn="ctr"/>
+            <a:r>
+              <a:rPr lang="en-US" dirty="0" smtClean="0"/>
+              <a:t>Edit</a:t>
+            </a:r>
+            <a:endParaRPr lang="en-US" dirty="0"/>
+          </a:p>
+        </p:txBody>
+      </p:sp>
+      <p:sp>
+        <p:nvSpPr>
+          <p:cNvPr id="17" name="Rounded Rectangle 16"/>
+          <p:cNvSpPr/>
+          <p:nvPr/>
+        </p:nvSpPr>
+        <p:spPr>
+          <a:xfrm>
+            <a:off x="5096757" y="1222295"/>
+            <a:ext cx="1435106" cy="375761"/>
+          </a:xfrm>
+          <a:prstGeom prst="roundRect">
+            <a:avLst/>
+          </a:prstGeom>
+          <a:solidFill>
+            <a:schemeClr val="accent3"/>
+          </a:solidFill>
+          <a:effectLst>
+            <a:outerShdw blurRad="50800" dist="76200" algn="l" rotWithShape="0">
+              <a:prstClr val="black">
+                <a:alpha val="40000"/>
+              </a:prstClr>
+            </a:outerShdw>
+          </a:effectLst>
+        </p:spPr>
+        <p:style>
+          <a:lnRef idx="2">
+            <a:schemeClr val="accent1">
+              <a:shade val="50000"/>
+            </a:schemeClr>
+          </a:lnRef>
+          <a:fillRef idx="1">
+            <a:schemeClr val="accent1"/>
+          </a:fillRef>
+          <a:effectRef idx="0">
+            <a:schemeClr val="accent1"/>
+          </a:effectRef>
+          <a:fontRef idx="minor">
+            <a:schemeClr val="lt1"/>
+          </a:fontRef>
+        </p:style>
+        <p:txBody>
+          <a:bodyPr rtlCol="0" anchor="ctr"/>
+          <a:lstStyle/>
+          <a:p>
+            <a:pPr algn="ctr"/>
+            <a:r>
+              <a:rPr lang="en-US" b="1" dirty="0" smtClean="0"/>
+              <a:t>Add Income</a:t>
+            </a:r>
+          </a:p>
+        </p:txBody>
+      </p:sp>
+    </p:spTree>
+    <p:extLst>
+      <p:ext uri="{BB962C8B-B14F-4D97-AF65-F5344CB8AC3E}">
+        <p14:creationId xmlns:p14="http://schemas.microsoft.com/office/powerpoint/2010/main" val="585405247"/>
+      </p:ext>
+    </p:extLst>
+  </p:cSld>
+  <p:clrMapOvr>
+    <a:masterClrMapping/>
+  </p:clrMapOvr>
+</p:sld>
+</file>
+
+<file path=ppt/slides/slide5.xml><?xml version="1.0" encoding="utf-8"?>
+<p:sld xmlns:a="http://schemas.openxmlformats.org/drawingml/2006/main" xmlns:r="http://schemas.openxmlformats.org/officeDocument/2006/relationships" xmlns:p="http://schemas.openxmlformats.org/presentationml/2006/main">
+  <p:cSld>
+    <p:spTree>
+      <p:nvGrpSpPr>
+        <p:cNvPr id="1" name=""/>
+        <p:cNvGrpSpPr/>
+        <p:nvPr/>
+      </p:nvGrpSpPr>
+      <p:grpSpPr>
+        <a:xfrm>
+          <a:off x="0" y="0"/>
+          <a:ext cx="0" cy="0"/>
+          <a:chOff x="0" y="0"/>
+          <a:chExt cx="0" cy="0"/>
+        </a:xfrm>
+      </p:grpSpPr>
+      <p:sp>
+        <p:nvSpPr>
+          <p:cNvPr id="4" name="Rectangle 3"/>
+          <p:cNvSpPr/>
+          <p:nvPr/>
+        </p:nvSpPr>
+        <p:spPr>
+          <a:xfrm>
+            <a:off x="0" y="0"/>
+            <a:ext cx="12191999" cy="785813"/>
+          </a:xfrm>
+          <a:prstGeom prst="rect">
+            <a:avLst/>
+          </a:prstGeom>
+        </p:spPr>
+        <p:style>
+          <a:lnRef idx="2">
+            <a:schemeClr val="accent1">
+              <a:shade val="50000"/>
+            </a:schemeClr>
+          </a:lnRef>
+          <a:fillRef idx="1">
+            <a:schemeClr val="accent1"/>
+          </a:fillRef>
+          <a:effectRef idx="0">
+            <a:schemeClr val="accent1"/>
+          </a:effectRef>
+          <a:fontRef idx="minor">
+            <a:schemeClr val="lt1"/>
+          </a:fontRef>
+        </p:style>
+        <p:txBody>
+          <a:bodyPr rtlCol="0" anchor="ctr"/>
+          <a:lstStyle/>
+          <a:p>
+            <a:pPr algn="ctr"/>
+            <a:r>
+              <a:rPr lang="en-US" sz="4800" dirty="0" smtClean="0"/>
+              <a:t>Balance Sheet</a:t>
+            </a:r>
+          </a:p>
+        </p:txBody>
+      </p:sp>
+      <p:graphicFrame>
+        <p:nvGraphicFramePr>
+          <p:cNvPr id="5" name="Table 4"/>
+          <p:cNvGraphicFramePr>
+            <a:graphicFrameLocks noGrp="1"/>
+          </p:cNvGraphicFramePr>
+          <p:nvPr>
+            <p:extLst>
+              <p:ext uri="{D42A27DB-BD31-4B8C-83A1-F6EECF244321}">
+                <p14:modId xmlns:p14="http://schemas.microsoft.com/office/powerpoint/2010/main" val="87860515"/>
+              </p:ext>
+            </p:extLst>
+          </p:nvPr>
+        </p:nvGraphicFramePr>
+        <p:xfrm>
+          <a:off x="160621" y="2341340"/>
+          <a:ext cx="7835267" cy="2595880"/>
+        </p:xfrm>
+        <a:graphic>
+          <a:graphicData uri="http://schemas.openxmlformats.org/drawingml/2006/table">
+            <a:tbl>
+              <a:tblPr firstRow="1" bandRow="1">
+                <a:tableStyleId>{5C22544A-7EE6-4342-B048-85BDC9FD1C3A}</a:tableStyleId>
+              </a:tblPr>
+              <a:tblGrid>
+                <a:gridCol w="508318"/>
+                <a:gridCol w="1373505"/>
+                <a:gridCol w="1622997"/>
+                <a:gridCol w="1420178"/>
+                <a:gridCol w="1538161"/>
+                <a:gridCol w="1372108"/>
+              </a:tblGrid>
+              <a:tr h="370840">
+                <a:tc>
+                  <a:txBody>
+                    <a:bodyPr/>
+                    <a:lstStyle/>
+                    <a:p>
+                      <a:r>
+                        <a:rPr lang="en-US" dirty="0" smtClean="0"/>
+                        <a:t>No</a:t>
+                      </a:r>
+                      <a:endParaRPr lang="en-US" dirty="0"/>
+                    </a:p>
+                  </a:txBody>
+                  <a:tcPr/>
+                </a:tc>
+                <a:tc>
+                  <a:txBody>
+                    <a:bodyPr/>
+                    <a:lstStyle/>
+                    <a:p>
+                      <a:r>
+                        <a:rPr lang="en-US" dirty="0" smtClean="0"/>
+                        <a:t>Date</a:t>
+                      </a:r>
+                      <a:endParaRPr lang="en-US" dirty="0"/>
+                    </a:p>
+                  </a:txBody>
+                  <a:tcPr/>
+                </a:tc>
+                <a:tc>
+                  <a:txBody>
+                    <a:bodyPr/>
+                    <a:lstStyle/>
+                    <a:p>
+                      <a:r>
+                        <a:rPr lang="en-US" dirty="0" smtClean="0"/>
+                        <a:t>Account</a:t>
+                      </a:r>
+                      <a:r>
+                        <a:rPr lang="en-US" baseline="0" dirty="0" smtClean="0"/>
+                        <a:t> Name</a:t>
+                      </a:r>
+                      <a:endParaRPr lang="en-US" dirty="0"/>
+                    </a:p>
+                  </a:txBody>
+                  <a:tcPr/>
+                </a:tc>
+                <a:tc>
+                  <a:txBody>
+                    <a:bodyPr/>
+                    <a:lstStyle/>
+                    <a:p>
+                      <a:r>
+                        <a:rPr lang="en-US" dirty="0" smtClean="0"/>
+                        <a:t>Credit/Debit</a:t>
+                      </a:r>
+                      <a:endParaRPr lang="en-US" dirty="0"/>
+                    </a:p>
+                  </a:txBody>
+                  <a:tcPr/>
+                </a:tc>
+                <a:tc>
+                  <a:txBody>
+                    <a:bodyPr/>
+                    <a:lstStyle/>
+                    <a:p>
+                      <a:r>
+                        <a:rPr lang="en-US" dirty="0" smtClean="0"/>
+                        <a:t>Amount (INR)</a:t>
+                      </a:r>
+                      <a:endParaRPr lang="en-US" dirty="0"/>
+                    </a:p>
+                  </a:txBody>
+                  <a:tcPr/>
+                </a:tc>
+                <a:tc>
+                  <a:txBody>
+                    <a:bodyPr/>
+                    <a:lstStyle/>
+                    <a:p>
+                      <a:r>
+                        <a:rPr lang="en-US" dirty="0" smtClean="0"/>
+                        <a:t>Net</a:t>
+                      </a:r>
+                      <a:r>
+                        <a:rPr lang="en-US" baseline="0" dirty="0" smtClean="0"/>
+                        <a:t> Balance</a:t>
+                      </a:r>
+                      <a:endParaRPr lang="en-US" dirty="0"/>
+                    </a:p>
+                  </a:txBody>
+                  <a:tcPr/>
+                </a:tc>
+              </a:tr>
+              <a:tr h="370840">
+                <a:tc>
+                  <a:txBody>
+                    <a:bodyPr/>
+                    <a:lstStyle/>
+                    <a:p>
+                      <a:r>
+                        <a:rPr lang="en-US" dirty="0" smtClean="0"/>
+                        <a:t>1</a:t>
+                      </a:r>
+                      <a:endParaRPr lang="en-US" dirty="0"/>
+                    </a:p>
+                  </a:txBody>
+                  <a:tcPr/>
+                </a:tc>
+                <a:tc>
+                  <a:txBody>
+                    <a:bodyPr/>
+                    <a:lstStyle/>
+                    <a:p>
+                      <a:r>
+                        <a:rPr lang="en-US" dirty="0" smtClean="0"/>
+                        <a:t>12-Jan-2017</a:t>
+                      </a:r>
+                      <a:endParaRPr lang="en-US" dirty="0"/>
+                    </a:p>
+                  </a:txBody>
+                  <a:tcPr/>
+                </a:tc>
+                <a:tc>
+                  <a:txBody>
+                    <a:bodyPr/>
+                    <a:lstStyle/>
+                    <a:p>
+                      <a:r>
+                        <a:rPr lang="en-US" dirty="0" smtClean="0"/>
+                        <a:t>Dheeraj</a:t>
+                      </a:r>
+                      <a:endParaRPr lang="en-US" dirty="0"/>
+                    </a:p>
+                  </a:txBody>
+                  <a:tcPr/>
+                </a:tc>
+                <a:tc>
+                  <a:txBody>
+                    <a:bodyPr/>
+                    <a:lstStyle/>
+                    <a:p>
+                      <a:r>
+                        <a:rPr lang="en-US" dirty="0" smtClean="0"/>
+                        <a:t>Credit</a:t>
+                      </a:r>
+                      <a:endParaRPr lang="en-US" dirty="0"/>
+                    </a:p>
+                  </a:txBody>
+                  <a:tcPr/>
+                </a:tc>
+                <a:tc>
+                  <a:txBody>
+                    <a:bodyPr/>
+                    <a:lstStyle/>
+                    <a:p>
+                      <a:r>
+                        <a:rPr lang="en-US" dirty="0" smtClean="0"/>
+                        <a:t>18,000</a:t>
+                      </a:r>
+                      <a:endParaRPr lang="en-US" dirty="0"/>
+                    </a:p>
+                  </a:txBody>
+                  <a:tcPr/>
+                </a:tc>
+                <a:tc>
+                  <a:txBody>
+                    <a:bodyPr/>
+                    <a:lstStyle/>
+                    <a:p>
+                      <a:r>
+                        <a:rPr lang="en-US" dirty="0" smtClean="0"/>
+                        <a:t>28,000</a:t>
+                      </a:r>
+                      <a:endParaRPr lang="en-US" dirty="0"/>
+                    </a:p>
+                  </a:txBody>
+                  <a:tcPr/>
+                </a:tc>
+              </a:tr>
+              <a:tr h="370840">
+                <a:tc>
+                  <a:txBody>
+                    <a:bodyPr/>
+                    <a:lstStyle/>
+                    <a:p>
+                      <a:r>
+                        <a:rPr lang="en-US" dirty="0" smtClean="0"/>
+                        <a:t>2</a:t>
+                      </a:r>
+                      <a:endParaRPr lang="en-US" dirty="0"/>
+                    </a:p>
+                  </a:txBody>
+                  <a:tcPr/>
+                </a:tc>
+                <a:tc>
+                  <a:txBody>
+                    <a:bodyPr/>
+                    <a:lstStyle/>
+                    <a:p>
+                      <a:r>
+                        <a:rPr lang="en-US" dirty="0" smtClean="0"/>
+                        <a:t>15-Jan-2017</a:t>
+                      </a:r>
+                      <a:endParaRPr lang="en-US" dirty="0"/>
+                    </a:p>
+                  </a:txBody>
+                  <a:tcPr/>
+                </a:tc>
+                <a:tc>
+                  <a:txBody>
+                    <a:bodyPr/>
+                    <a:lstStyle/>
+                    <a:p>
+                      <a:r>
+                        <a:rPr lang="en-US" dirty="0" smtClean="0"/>
+                        <a:t>Prabhat</a:t>
+                      </a:r>
+                      <a:endParaRPr lang="en-US" dirty="0"/>
+                    </a:p>
+                  </a:txBody>
+                  <a:tcPr/>
+                </a:tc>
+                <a:tc>
+                  <a:txBody>
+                    <a:bodyPr/>
+                    <a:lstStyle/>
+                    <a:p>
+                      <a:r>
+                        <a:rPr lang="en-US" dirty="0" smtClean="0"/>
+                        <a:t>Debit</a:t>
+                      </a:r>
+                      <a:endParaRPr lang="en-US" dirty="0"/>
+                    </a:p>
+                  </a:txBody>
+                  <a:tcPr/>
+                </a:tc>
+                <a:tc>
+                  <a:txBody>
+                    <a:bodyPr/>
+                    <a:lstStyle/>
+                    <a:p>
+                      <a:r>
+                        <a:rPr lang="en-US" dirty="0" smtClean="0"/>
+                        <a:t>9,000</a:t>
+                      </a:r>
+                      <a:endParaRPr lang="en-US" dirty="0"/>
+                    </a:p>
+                  </a:txBody>
+                  <a:tcPr/>
+                </a:tc>
+                <a:tc>
+                  <a:txBody>
+                    <a:bodyPr/>
+                    <a:lstStyle/>
+                    <a:p>
+                      <a:r>
+                        <a:rPr lang="en-US" dirty="0" smtClean="0"/>
+                        <a:t>19,000</a:t>
+                      </a:r>
+                      <a:endParaRPr lang="en-US" dirty="0"/>
+                    </a:p>
+                  </a:txBody>
+                  <a:tcPr/>
+                </a:tc>
+              </a:tr>
+              <a:tr h="370840">
+                <a:tc>
+                  <a:txBody>
+                    <a:bodyPr/>
+                    <a:lstStyle/>
+                    <a:p>
+                      <a:r>
+                        <a:rPr lang="en-US" dirty="0" smtClean="0"/>
+                        <a:t>3</a:t>
+                      </a:r>
+                      <a:endParaRPr lang="en-US" dirty="0"/>
+                    </a:p>
+                  </a:txBody>
+                  <a:tcPr/>
+                </a:tc>
+                <a:tc>
+                  <a:txBody>
+                    <a:bodyPr/>
+                    <a:lstStyle/>
+                    <a:p>
+                      <a:r>
+                        <a:rPr lang="en-US" dirty="0" smtClean="0"/>
+                        <a:t>15-Jan-2017</a:t>
+                      </a:r>
+                      <a:endParaRPr lang="en-US" dirty="0"/>
+                    </a:p>
+                  </a:txBody>
+                  <a:tcPr/>
+                </a:tc>
+                <a:tc>
+                  <a:txBody>
+                    <a:bodyPr/>
+                    <a:lstStyle/>
+                    <a:p>
+                      <a:r>
+                        <a:rPr lang="en-US" dirty="0" smtClean="0"/>
+                        <a:t>Anil</a:t>
+                      </a:r>
+                      <a:endParaRPr lang="en-US" dirty="0"/>
+                    </a:p>
+                  </a:txBody>
+                  <a:tcPr/>
+                </a:tc>
+                <a:tc>
+                  <a:txBody>
+                    <a:bodyPr/>
+                    <a:lstStyle/>
+                    <a:p>
+                      <a:r>
+                        <a:rPr lang="en-US" dirty="0" smtClean="0"/>
+                        <a:t>Debit</a:t>
+                      </a:r>
+                      <a:endParaRPr lang="en-US" dirty="0"/>
+                    </a:p>
+                  </a:txBody>
+                  <a:tcPr/>
+                </a:tc>
+                <a:tc>
+                  <a:txBody>
+                    <a:bodyPr/>
+                    <a:lstStyle/>
+                    <a:p>
+                      <a:r>
+                        <a:rPr lang="en-US" dirty="0" smtClean="0"/>
+                        <a:t>5000</a:t>
+                      </a:r>
+                      <a:endParaRPr lang="en-US" dirty="0"/>
+                    </a:p>
+                  </a:txBody>
+                  <a:tcPr/>
+                </a:tc>
+                <a:tc>
+                  <a:txBody>
+                    <a:bodyPr/>
+                    <a:lstStyle/>
+                    <a:p>
+                      <a:r>
+                        <a:rPr lang="en-US" dirty="0" smtClean="0"/>
+                        <a:t>14,000</a:t>
+                      </a:r>
+                      <a:endParaRPr lang="en-US" dirty="0"/>
+                    </a:p>
+                  </a:txBody>
+                  <a:tcPr/>
+                </a:tc>
+              </a:tr>
+              <a:tr h="370840">
+                <a:tc>
+                  <a:txBody>
+                    <a:bodyPr/>
+                    <a:lstStyle/>
+                    <a:p>
+                      <a:r>
+                        <a:rPr lang="en-US" dirty="0" smtClean="0"/>
+                        <a:t>4</a:t>
+                      </a:r>
+                      <a:endParaRPr lang="en-US" dirty="0"/>
+                    </a:p>
+                  </a:txBody>
+                  <a:tcPr/>
+                </a:tc>
+                <a:tc>
+                  <a:txBody>
+                    <a:bodyPr/>
+                    <a:lstStyle/>
+                    <a:p>
+                      <a:r>
+                        <a:rPr lang="en-US" dirty="0" smtClean="0"/>
+                        <a:t>16-Jan-2017</a:t>
+                      </a:r>
+                      <a:endParaRPr lang="en-US" dirty="0"/>
+                    </a:p>
+                  </a:txBody>
+                  <a:tcPr/>
+                </a:tc>
+                <a:tc>
+                  <a:txBody>
+                    <a:bodyPr/>
+                    <a:lstStyle/>
+                    <a:p>
+                      <a:r>
+                        <a:rPr lang="en-US" dirty="0" smtClean="0"/>
+                        <a:t>Raghu</a:t>
+                      </a:r>
+                      <a:endParaRPr lang="en-US" dirty="0"/>
+                    </a:p>
+                  </a:txBody>
+                  <a:tcPr/>
+                </a:tc>
+                <a:tc>
+                  <a:txBody>
+                    <a:bodyPr/>
+                    <a:lstStyle/>
+                    <a:p>
+                      <a:r>
+                        <a:rPr lang="en-US" dirty="0" smtClean="0"/>
+                        <a:t>Credit</a:t>
+                      </a:r>
+                      <a:endParaRPr lang="en-US" dirty="0"/>
+                    </a:p>
+                  </a:txBody>
+                  <a:tcPr/>
+                </a:tc>
+                <a:tc>
+                  <a:txBody>
+                    <a:bodyPr/>
+                    <a:lstStyle/>
+                    <a:p>
+                      <a:r>
+                        <a:rPr lang="en-US" dirty="0" smtClean="0"/>
+                        <a:t>20,000</a:t>
+                      </a:r>
+                      <a:endParaRPr lang="en-US" dirty="0"/>
+                    </a:p>
+                  </a:txBody>
+                  <a:tcPr/>
+                </a:tc>
+                <a:tc>
+                  <a:txBody>
+                    <a:bodyPr/>
+                    <a:lstStyle/>
+                    <a:p>
+                      <a:r>
+                        <a:rPr lang="en-US" dirty="0" smtClean="0"/>
+                        <a:t>34,000</a:t>
+                      </a:r>
+                      <a:endParaRPr lang="en-US" dirty="0"/>
+                    </a:p>
+                  </a:txBody>
+                  <a:tcPr/>
+                </a:tc>
+              </a:tr>
+              <a:tr h="370840">
+                <a:tc>
+                  <a:txBody>
+                    <a:bodyPr/>
+                    <a:lstStyle/>
+                    <a:p>
+                      <a:r>
+                        <a:rPr lang="en-US" dirty="0" smtClean="0"/>
+                        <a:t>5</a:t>
+                      </a:r>
+                      <a:endParaRPr lang="en-US" dirty="0"/>
+                    </a:p>
+                  </a:txBody>
+                  <a:tcPr/>
+                </a:tc>
+                <a:tc>
+                  <a:txBody>
+                    <a:bodyPr/>
+                    <a:lstStyle/>
+                    <a:p>
+                      <a:r>
+                        <a:rPr lang="en-US" dirty="0" smtClean="0"/>
+                        <a:t>16-Jan-2017</a:t>
+                      </a:r>
+                      <a:endParaRPr lang="en-US" dirty="0"/>
+                    </a:p>
+                  </a:txBody>
+                  <a:tcPr/>
+                </a:tc>
+                <a:tc>
+                  <a:txBody>
+                    <a:bodyPr/>
+                    <a:lstStyle/>
+                    <a:p>
+                      <a:r>
+                        <a:rPr lang="en-US" dirty="0" smtClean="0"/>
+                        <a:t>Sunil</a:t>
+                      </a:r>
+                      <a:endParaRPr lang="en-US" dirty="0"/>
+                    </a:p>
+                  </a:txBody>
+                  <a:tcPr/>
+                </a:tc>
+                <a:tc>
+                  <a:txBody>
+                    <a:bodyPr/>
+                    <a:lstStyle/>
+                    <a:p>
+                      <a:r>
+                        <a:rPr lang="en-US" dirty="0" smtClean="0"/>
+                        <a:t>Debit</a:t>
+                      </a:r>
+                      <a:endParaRPr lang="en-US" dirty="0"/>
+                    </a:p>
+                  </a:txBody>
+                  <a:tcPr/>
+                </a:tc>
+                <a:tc>
+                  <a:txBody>
+                    <a:bodyPr/>
+                    <a:lstStyle/>
+                    <a:p>
+                      <a:r>
+                        <a:rPr lang="en-US" dirty="0" smtClean="0"/>
+                        <a:t>5000</a:t>
+                      </a:r>
+                      <a:endParaRPr lang="en-US" dirty="0"/>
+                    </a:p>
+                  </a:txBody>
+                  <a:tcPr/>
+                </a:tc>
+                <a:tc>
+                  <a:txBody>
+                    <a:bodyPr/>
+                    <a:lstStyle/>
+                    <a:p>
+                      <a:r>
+                        <a:rPr lang="en-US" dirty="0" smtClean="0"/>
+                        <a:t>29,000</a:t>
+                      </a:r>
+                      <a:endParaRPr lang="en-US" dirty="0"/>
+                    </a:p>
+                  </a:txBody>
+                  <a:tcPr/>
+                </a:tc>
+              </a:tr>
+              <a:tr h="370840">
+                <a:tc>
+                  <a:txBody>
+                    <a:bodyPr/>
+                    <a:lstStyle/>
+                    <a:p>
+                      <a:r>
+                        <a:rPr lang="en-US" dirty="0" smtClean="0"/>
+                        <a:t>6</a:t>
+                      </a:r>
+                      <a:endParaRPr lang="en-US" dirty="0"/>
+                    </a:p>
+                  </a:txBody>
+                  <a:tcPr/>
+                </a:tc>
+                <a:tc>
+                  <a:txBody>
+                    <a:bodyPr/>
+                    <a:lstStyle/>
+                    <a:p>
+                      <a:r>
+                        <a:rPr lang="en-US" dirty="0" smtClean="0"/>
+                        <a:t>17-Jan-2017</a:t>
+                      </a:r>
+                      <a:endParaRPr lang="en-US" dirty="0"/>
+                    </a:p>
+                  </a:txBody>
+                  <a:tcPr/>
+                </a:tc>
+                <a:tc>
+                  <a:txBody>
+                    <a:bodyPr/>
+                    <a:lstStyle/>
+                    <a:p>
+                      <a:r>
+                        <a:rPr lang="en-US" dirty="0" smtClean="0"/>
+                        <a:t>Facebook Ad</a:t>
+                      </a:r>
+                      <a:endParaRPr lang="en-US" dirty="0"/>
+                    </a:p>
+                  </a:txBody>
+                  <a:tcPr/>
+                </a:tc>
+                <a:tc>
+                  <a:txBody>
+                    <a:bodyPr/>
+                    <a:lstStyle/>
+                    <a:p>
+                      <a:r>
+                        <a:rPr lang="en-US" dirty="0" smtClean="0"/>
+                        <a:t>Debit</a:t>
+                      </a:r>
+                      <a:endParaRPr lang="en-US" dirty="0"/>
+                    </a:p>
+                  </a:txBody>
+                  <a:tcPr/>
+                </a:tc>
+                <a:tc>
+                  <a:txBody>
+                    <a:bodyPr/>
+                    <a:lstStyle/>
+                    <a:p>
+                      <a:r>
+                        <a:rPr lang="en-US" dirty="0" smtClean="0"/>
+                        <a:t>3200</a:t>
+                      </a:r>
+                      <a:endParaRPr lang="en-US" dirty="0"/>
+                    </a:p>
+                  </a:txBody>
+                  <a:tcPr/>
+                </a:tc>
+                <a:tc>
+                  <a:txBody>
+                    <a:bodyPr/>
+                    <a:lstStyle/>
+                    <a:p>
+                      <a:r>
+                        <a:rPr lang="en-US" dirty="0" smtClean="0"/>
+                        <a:t>25,800</a:t>
+                      </a:r>
+                      <a:endParaRPr lang="en-US" dirty="0"/>
+                    </a:p>
+                  </a:txBody>
+                  <a:tcPr/>
+                </a:tc>
+              </a:tr>
+            </a:tbl>
+          </a:graphicData>
+        </a:graphic>
+      </p:graphicFrame>
+      <p:sp>
+        <p:nvSpPr>
+          <p:cNvPr id="6" name="TextBox 5"/>
+          <p:cNvSpPr txBox="1"/>
+          <p:nvPr/>
+        </p:nvSpPr>
+        <p:spPr>
+          <a:xfrm>
+            <a:off x="146365" y="1074761"/>
+            <a:ext cx="1139827" cy="369332"/>
+          </a:xfrm>
+          <a:prstGeom prst="rect">
+            <a:avLst/>
+          </a:prstGeom>
+          <a:noFill/>
+          <a:ln>
+            <a:solidFill>
+              <a:schemeClr val="accent1"/>
+            </a:solidFill>
+          </a:ln>
+        </p:spPr>
+        <p:txBody>
+          <a:bodyPr wrap="square" rtlCol="0">
+            <a:spAutoFit/>
+          </a:bodyPr>
+          <a:lstStyle/>
+          <a:p>
+            <a:r>
+              <a:rPr lang="en-US" smtClean="0"/>
+              <a:t>From date</a:t>
+            </a:r>
+            <a:endParaRPr lang="en-US"/>
+          </a:p>
+        </p:txBody>
+      </p:sp>
+      <p:sp>
+        <p:nvSpPr>
+          <p:cNvPr id="7" name="TextBox 6"/>
+          <p:cNvSpPr txBox="1"/>
+          <p:nvPr/>
+        </p:nvSpPr>
+        <p:spPr>
+          <a:xfrm>
+            <a:off x="1471929" y="1074761"/>
+            <a:ext cx="1139827" cy="369332"/>
+          </a:xfrm>
+          <a:prstGeom prst="rect">
+            <a:avLst/>
+          </a:prstGeom>
+          <a:solidFill>
+            <a:schemeClr val="bg1"/>
+          </a:solidFill>
+          <a:ln>
+            <a:solidFill>
+              <a:schemeClr val="accent1"/>
+            </a:solidFill>
+          </a:ln>
+        </p:spPr>
+        <p:txBody>
+          <a:bodyPr wrap="square" rtlCol="0">
+            <a:spAutoFit/>
+          </a:bodyPr>
+          <a:lstStyle/>
+          <a:p>
+            <a:r>
+              <a:rPr lang="en-US" dirty="0" smtClean="0"/>
+              <a:t>To date</a:t>
+            </a:r>
+            <a:endParaRPr lang="en-US" dirty="0"/>
+          </a:p>
+        </p:txBody>
+      </p:sp>
+      <p:sp>
+        <p:nvSpPr>
+          <p:cNvPr id="8" name="Rounded Rectangle 7"/>
+          <p:cNvSpPr/>
+          <p:nvPr/>
+        </p:nvSpPr>
+        <p:spPr>
+          <a:xfrm>
+            <a:off x="2943192" y="1086043"/>
+            <a:ext cx="942975" cy="364479"/>
+          </a:xfrm>
+          <a:prstGeom prst="roundRect">
+            <a:avLst/>
+          </a:prstGeom>
+          <a:effectLst>
+            <a:outerShdw blurRad="50800" dist="76200" algn="l" rotWithShape="0">
+              <a:prstClr val="black">
+                <a:alpha val="40000"/>
+              </a:prstClr>
+            </a:outerShdw>
+          </a:effectLst>
+        </p:spPr>
+        <p:style>
+          <a:lnRef idx="2">
+            <a:schemeClr val="accent1">
+              <a:shade val="50000"/>
+            </a:schemeClr>
+          </a:lnRef>
+          <a:fillRef idx="1">
+            <a:schemeClr val="accent1"/>
+          </a:fillRef>
+          <a:effectRef idx="0">
+            <a:schemeClr val="accent1"/>
+          </a:effectRef>
+          <a:fontRef idx="minor">
+            <a:schemeClr val="lt1"/>
+          </a:fontRef>
+        </p:style>
+        <p:txBody>
+          <a:bodyPr rtlCol="0" anchor="ctr"/>
+          <a:lstStyle/>
+          <a:p>
+            <a:pPr algn="ctr"/>
+            <a:r>
+              <a:rPr lang="en-US" dirty="0" smtClean="0"/>
+              <a:t>Search</a:t>
+            </a:r>
+            <a:endParaRPr lang="en-US" dirty="0"/>
+          </a:p>
+        </p:txBody>
+      </p:sp>
+      <p:sp>
+        <p:nvSpPr>
+          <p:cNvPr id="9" name="TextBox 8"/>
+          <p:cNvSpPr txBox="1"/>
+          <p:nvPr/>
+        </p:nvSpPr>
+        <p:spPr>
+          <a:xfrm>
+            <a:off x="146365" y="1595797"/>
+            <a:ext cx="1879604" cy="369332"/>
+          </a:xfrm>
+          <a:prstGeom prst="rect">
+            <a:avLst/>
+          </a:prstGeom>
+          <a:noFill/>
+        </p:spPr>
+        <p:txBody>
+          <a:bodyPr wrap="square" rtlCol="0">
+            <a:spAutoFit/>
+          </a:bodyPr>
+          <a:lstStyle/>
+          <a:p>
+            <a:r>
+              <a:rPr lang="en-US" dirty="0" smtClean="0"/>
+              <a:t>Opening Balance :</a:t>
+            </a:r>
+            <a:endParaRPr lang="en-US" dirty="0"/>
+          </a:p>
+        </p:txBody>
+      </p:sp>
+      <p:sp>
+        <p:nvSpPr>
+          <p:cNvPr id="10" name="TextBox 9"/>
+          <p:cNvSpPr txBox="1"/>
+          <p:nvPr/>
+        </p:nvSpPr>
+        <p:spPr>
+          <a:xfrm>
+            <a:off x="1898965" y="1616804"/>
+            <a:ext cx="1879604" cy="369332"/>
+          </a:xfrm>
+          <a:prstGeom prst="rect">
+            <a:avLst/>
+          </a:prstGeom>
+          <a:noFill/>
+        </p:spPr>
+        <p:txBody>
+          <a:bodyPr wrap="square" rtlCol="0">
+            <a:spAutoFit/>
+          </a:bodyPr>
+          <a:lstStyle/>
+          <a:p>
+            <a:r>
+              <a:rPr lang="en-US" dirty="0" smtClean="0"/>
+              <a:t>10,000 INR</a:t>
+            </a:r>
+            <a:endParaRPr lang="en-US" dirty="0"/>
+          </a:p>
+        </p:txBody>
+      </p:sp>
+      <p:sp>
+        <p:nvSpPr>
+          <p:cNvPr id="11" name="TextBox 10"/>
+          <p:cNvSpPr txBox="1"/>
+          <p:nvPr/>
+        </p:nvSpPr>
+        <p:spPr>
+          <a:xfrm>
+            <a:off x="3829016" y="1647554"/>
+            <a:ext cx="1879604" cy="369332"/>
+          </a:xfrm>
+          <a:prstGeom prst="rect">
+            <a:avLst/>
+          </a:prstGeom>
+          <a:noFill/>
+        </p:spPr>
+        <p:txBody>
+          <a:bodyPr wrap="square" rtlCol="0">
+            <a:spAutoFit/>
+          </a:bodyPr>
+          <a:lstStyle/>
+          <a:p>
+            <a:r>
+              <a:rPr lang="en-US" dirty="0" smtClean="0"/>
+              <a:t>Closing Balance :</a:t>
+            </a:r>
+            <a:endParaRPr lang="en-US" dirty="0"/>
+          </a:p>
+        </p:txBody>
+      </p:sp>
+      <p:sp>
+        <p:nvSpPr>
+          <p:cNvPr id="12" name="TextBox 11"/>
+          <p:cNvSpPr txBox="1"/>
+          <p:nvPr/>
+        </p:nvSpPr>
+        <p:spPr>
+          <a:xfrm>
+            <a:off x="5581616" y="1668561"/>
+            <a:ext cx="1879604" cy="369332"/>
+          </a:xfrm>
+          <a:prstGeom prst="rect">
+            <a:avLst/>
+          </a:prstGeom>
+          <a:noFill/>
+        </p:spPr>
+        <p:txBody>
+          <a:bodyPr wrap="square" rtlCol="0">
+            <a:spAutoFit/>
+          </a:bodyPr>
+          <a:lstStyle/>
+          <a:p>
+            <a:r>
+              <a:rPr lang="en-US" dirty="0" smtClean="0"/>
+              <a:t>25,800 INR</a:t>
+            </a:r>
+            <a:endParaRPr lang="en-US" dirty="0"/>
+          </a:p>
+        </p:txBody>
+      </p:sp>
+      <p:sp>
+        <p:nvSpPr>
+          <p:cNvPr id="13" name="Rounded Rectangle 12"/>
+          <p:cNvSpPr/>
+          <p:nvPr/>
+        </p:nvSpPr>
+        <p:spPr>
+          <a:xfrm>
+            <a:off x="3778569" y="5131191"/>
+            <a:ext cx="1199513" cy="364479"/>
+          </a:xfrm>
+          <a:prstGeom prst="roundRect">
+            <a:avLst/>
+          </a:prstGeom>
+          <a:solidFill>
+            <a:schemeClr val="accent2"/>
+          </a:solidFill>
+          <a:effectLst>
+            <a:outerShdw blurRad="50800" dist="76200" dir="18900000" algn="bl" rotWithShape="0">
+              <a:prstClr val="black">
+                <a:alpha val="40000"/>
+              </a:prstClr>
+            </a:outerShdw>
+          </a:effectLst>
+        </p:spPr>
+        <p:style>
+          <a:lnRef idx="2">
+            <a:schemeClr val="accent1">
+              <a:shade val="50000"/>
+            </a:schemeClr>
+          </a:lnRef>
+          <a:fillRef idx="1">
+            <a:schemeClr val="accent1"/>
+          </a:fillRef>
+          <a:effectRef idx="0">
+            <a:schemeClr val="accent1"/>
+          </a:effectRef>
+          <a:fontRef idx="minor">
+            <a:schemeClr val="lt1"/>
+          </a:fontRef>
+        </p:style>
+        <p:txBody>
+          <a:bodyPr rtlCol="0" anchor="ctr"/>
+          <a:lstStyle/>
+          <a:p>
+            <a:pPr algn="ctr"/>
+            <a:r>
+              <a:rPr lang="en-US" dirty="0" smtClean="0"/>
+              <a:t>Download</a:t>
+            </a:r>
+            <a:endParaRPr lang="en-US" dirty="0" smtClean="0"/>
+          </a:p>
+        </p:txBody>
+      </p:sp>
+      <p:sp>
+        <p:nvSpPr>
+          <p:cNvPr id="15" name="Rounded Rectangle 14"/>
+          <p:cNvSpPr/>
+          <p:nvPr/>
+        </p:nvSpPr>
+        <p:spPr>
+          <a:xfrm>
+            <a:off x="215900" y="5113830"/>
+            <a:ext cx="2922905" cy="357188"/>
+          </a:xfrm>
+          <a:prstGeom prst="roundRect">
+            <a:avLst/>
+          </a:prstGeom>
+        </p:spPr>
+        <p:style>
+          <a:lnRef idx="2">
+            <a:schemeClr val="accent1">
+              <a:shade val="50000"/>
+            </a:schemeClr>
+          </a:lnRef>
+          <a:fillRef idx="1">
+            <a:schemeClr val="accent1"/>
+          </a:fillRef>
+          <a:effectRef idx="0">
+            <a:schemeClr val="accent1"/>
+          </a:effectRef>
+          <a:fontRef idx="minor">
+            <a:schemeClr val="lt1"/>
+          </a:fontRef>
+        </p:style>
+        <p:txBody>
+          <a:bodyPr rtlCol="0" anchor="ctr"/>
+          <a:lstStyle/>
+          <a:p>
+            <a:pPr algn="ctr"/>
+            <a:r>
+              <a:rPr lang="en-US" dirty="0" smtClean="0"/>
+              <a:t>|&lt;&lt;     &lt;&lt;   1 of 10    &gt;&gt;    &gt;&gt;|</a:t>
+            </a:r>
+            <a:endParaRPr lang="en-US" dirty="0"/>
+          </a:p>
+        </p:txBody>
+      </p:sp>
+      <p:graphicFrame>
+        <p:nvGraphicFramePr>
+          <p:cNvPr id="16" name="Table 15"/>
+          <p:cNvGraphicFramePr>
+            <a:graphicFrameLocks noGrp="1"/>
+          </p:cNvGraphicFramePr>
+          <p:nvPr>
+            <p:extLst>
+              <p:ext uri="{D42A27DB-BD31-4B8C-83A1-F6EECF244321}">
+                <p14:modId xmlns:p14="http://schemas.microsoft.com/office/powerpoint/2010/main" val="221862738"/>
+              </p:ext>
+            </p:extLst>
+          </p:nvPr>
+        </p:nvGraphicFramePr>
+        <p:xfrm>
+          <a:off x="8266684" y="2341340"/>
+          <a:ext cx="3416968" cy="1594842"/>
+        </p:xfrm>
+        <a:graphic>
+          <a:graphicData uri="http://schemas.openxmlformats.org/drawingml/2006/table">
+            <a:tbl>
+              <a:tblPr firstRow="1" bandRow="1">
+                <a:tableStyleId>{5C22544A-7EE6-4342-B048-85BDC9FD1C3A}</a:tableStyleId>
+              </a:tblPr>
+              <a:tblGrid>
+                <a:gridCol w="1878807"/>
+                <a:gridCol w="1538161"/>
+              </a:tblGrid>
+              <a:tr h="258985">
+                <a:tc>
+                  <a:txBody>
+                    <a:bodyPr/>
+                    <a:lstStyle/>
+                    <a:p>
+                      <a:r>
+                        <a:rPr lang="en-US" dirty="0" smtClean="0"/>
+                        <a:t>Description</a:t>
+                      </a:r>
+                      <a:endParaRPr lang="en-US" dirty="0"/>
+                    </a:p>
+                  </a:txBody>
+                  <a:tcPr/>
+                </a:tc>
+                <a:tc>
+                  <a:txBody>
+                    <a:bodyPr/>
+                    <a:lstStyle/>
+                    <a:p>
+                      <a:r>
+                        <a:rPr lang="en-US" dirty="0" smtClean="0"/>
+                        <a:t>Amount (INR)</a:t>
+                      </a:r>
+                      <a:endParaRPr lang="en-US" dirty="0"/>
+                    </a:p>
+                  </a:txBody>
+                  <a:tcPr/>
+                </a:tc>
+              </a:tr>
+              <a:tr h="409694">
+                <a:tc>
+                  <a:txBody>
+                    <a:bodyPr/>
+                    <a:lstStyle/>
+                    <a:p>
+                      <a:r>
+                        <a:rPr lang="en-US" dirty="0" smtClean="0"/>
+                        <a:t>Total Incoming</a:t>
+                      </a:r>
+                      <a:endParaRPr lang="en-US" dirty="0"/>
+                    </a:p>
+                  </a:txBody>
+                  <a:tcPr/>
+                </a:tc>
+                <a:tc>
+                  <a:txBody>
+                    <a:bodyPr/>
+                    <a:lstStyle/>
+                    <a:p>
+                      <a:r>
+                        <a:rPr lang="en-US" dirty="0" smtClean="0"/>
+                        <a:t>53,500</a:t>
+                      </a:r>
+                      <a:endParaRPr lang="en-US" dirty="0"/>
+                    </a:p>
+                  </a:txBody>
+                  <a:tcPr/>
+                </a:tc>
+              </a:tr>
+              <a:tr h="409694">
+                <a:tc>
+                  <a:txBody>
+                    <a:bodyPr/>
+                    <a:lstStyle/>
+                    <a:p>
+                      <a:r>
+                        <a:rPr lang="en-US" dirty="0" smtClean="0"/>
+                        <a:t>Total Outgoing</a:t>
+                      </a:r>
+                      <a:endParaRPr lang="en-US" dirty="0"/>
+                    </a:p>
+                  </a:txBody>
+                  <a:tcPr/>
+                </a:tc>
+                <a:tc>
+                  <a:txBody>
+                    <a:bodyPr/>
+                    <a:lstStyle/>
+                    <a:p>
+                      <a:r>
+                        <a:rPr lang="en-US" dirty="0" smtClean="0"/>
+                        <a:t>18,500</a:t>
+                      </a:r>
+                      <a:endParaRPr lang="en-US" dirty="0"/>
+                    </a:p>
+                  </a:txBody>
+                  <a:tcPr/>
+                </a:tc>
+              </a:tr>
+              <a:tr h="409694">
+                <a:tc>
+                  <a:txBody>
+                    <a:bodyPr/>
+                    <a:lstStyle/>
+                    <a:p>
+                      <a:r>
+                        <a:rPr lang="en-US" dirty="0" smtClean="0"/>
+                        <a:t>Balance</a:t>
+                      </a:r>
+                      <a:endParaRPr lang="en-US" dirty="0"/>
+                    </a:p>
+                  </a:txBody>
+                  <a:tcPr/>
+                </a:tc>
+                <a:tc>
+                  <a:txBody>
+                    <a:bodyPr/>
+                    <a:lstStyle/>
+                    <a:p>
+                      <a:r>
+                        <a:rPr lang="en-US" dirty="0" smtClean="0"/>
+                        <a:t>35,000</a:t>
+                      </a:r>
+                      <a:endParaRPr lang="en-US" dirty="0"/>
+                    </a:p>
+                  </a:txBody>
+                  <a:tcPr/>
+                </a:tc>
+              </a:tr>
+            </a:tbl>
+          </a:graphicData>
+        </a:graphic>
+      </p:graphicFrame>
+      <p:sp>
+        <p:nvSpPr>
+          <p:cNvPr id="17" name="Parallelogram 16"/>
+          <p:cNvSpPr/>
+          <p:nvPr/>
+        </p:nvSpPr>
+        <p:spPr>
+          <a:xfrm>
+            <a:off x="8551236" y="1771823"/>
+            <a:ext cx="2847864" cy="428625"/>
+          </a:xfrm>
+          <a:prstGeom prst="parallelogram">
+            <a:avLst/>
+          </a:prstGeom>
+        </p:spPr>
+        <p:style>
+          <a:lnRef idx="2">
+            <a:schemeClr val="accent1">
+              <a:shade val="50000"/>
+            </a:schemeClr>
+          </a:lnRef>
+          <a:fillRef idx="1">
+            <a:schemeClr val="accent1"/>
+          </a:fillRef>
+          <a:effectRef idx="0">
+            <a:schemeClr val="accent1"/>
+          </a:effectRef>
+          <a:fontRef idx="minor">
+            <a:schemeClr val="lt1"/>
+          </a:fontRef>
+        </p:style>
+        <p:txBody>
+          <a:bodyPr rtlCol="0" anchor="ctr"/>
+          <a:lstStyle/>
+          <a:p>
+            <a:pPr algn="ctr"/>
+            <a:r>
+              <a:rPr lang="en-US" b="1" dirty="0"/>
+              <a:t>S</a:t>
+            </a:r>
+            <a:r>
+              <a:rPr lang="en-US" b="1" dirty="0" smtClean="0"/>
+              <a:t>ummary</a:t>
+            </a:r>
+            <a:endParaRPr lang="en-US" b="1" dirty="0"/>
+          </a:p>
+        </p:txBody>
+      </p:sp>
+      <p:cxnSp>
+        <p:nvCxnSpPr>
+          <p:cNvPr id="19" name="Straight Connector 18"/>
+          <p:cNvCxnSpPr/>
+          <p:nvPr/>
+        </p:nvCxnSpPr>
+        <p:spPr>
+          <a:xfrm>
+            <a:off x="8124480" y="785813"/>
+            <a:ext cx="0" cy="6072187"/>
+          </a:xfrm>
+          <a:prstGeom prst="line">
+            <a:avLst/>
+          </a:prstGeom>
+          <a:ln w="28575"/>
+        </p:spPr>
+        <p:style>
+          <a:lnRef idx="1">
+            <a:schemeClr val="accent1"/>
+          </a:lnRef>
+          <a:fillRef idx="0">
+            <a:schemeClr val="accent1"/>
+          </a:fillRef>
+          <a:effectRef idx="0">
+            <a:schemeClr val="accent1"/>
+          </a:effectRef>
+          <a:fontRef idx="minor">
+            <a:schemeClr val="tx1"/>
+          </a:fontRef>
+        </p:style>
+      </p:cxnSp>
+    </p:spTree>
+    <p:extLst>
+      <p:ext uri="{BB962C8B-B14F-4D97-AF65-F5344CB8AC3E}">
+        <p14:creationId xmlns:p14="http://schemas.microsoft.com/office/powerpoint/2010/main" val="1824937698"/>
       </p:ext>
     </p:extLst>
   </p:cSld>
@@ -5030,4 +8767,265 @@
     </a:ext>
   </a:extLst>
 </a:theme>
+</file>
+
+<file path=ppt/theme/theme2.xml><?xml version="1.0" encoding="utf-8"?>
+<a:theme xmlns:a="http://schemas.openxmlformats.org/drawingml/2006/main" name="Office Theme">
+  <a:themeElements>
+    <a:clrScheme name="Office">
+      <a:dk1>
+        <a:sysClr val="windowText" lastClr="000000"/>
+      </a:dk1>
+      <a:lt1>
+        <a:sysClr val="window" lastClr="FFFFFF"/>
+      </a:lt1>
+      <a:dk2>
+        <a:srgbClr val="44546A"/>
+      </a:dk2>
+      <a:lt2>
+        <a:srgbClr val="E7E6E6"/>
+      </a:lt2>
+      <a:accent1>
+        <a:srgbClr val="5B9BD5"/>
+      </a:accent1>
+      <a:accent2>
+        <a:srgbClr val="ED7D31"/>
+      </a:accent2>
+      <a:accent3>
+        <a:srgbClr val="A5A5A5"/>
+      </a:accent3>
+      <a:accent4>
+        <a:srgbClr val="FFC000"/>
+      </a:accent4>
+      <a:accent5>
+        <a:srgbClr val="4472C4"/>
+      </a:accent5>
+      <a:accent6>
+        <a:srgbClr val="70AD47"/>
+      </a:accent6>
+      <a:hlink>
+        <a:srgbClr val="0563C1"/>
+      </a:hlink>
+      <a:folHlink>
+        <a:srgbClr val="954F72"/>
+      </a:folHlink>
+    </a:clrScheme>
+    <a:fontScheme name="Office">
+      <a:majorFont>
+        <a:latin typeface="Calibri Light" panose="020F0302020204030204"/>
+        <a:ea typeface=""/>
+        <a:cs typeface=""/>
+        <a:font script="Jpan" typeface="Yu Gothic Light"/>
+        <a:font script="Hang" typeface="맑은 고딕"/>
+        <a:font script="Hans" typeface="DengXian Light"/>
+        <a:font script="Hant" typeface="新細明體"/>
+        <a:font script="Arab" typeface="Times New Roman"/>
+        <a:font script="Hebr" typeface="Times New Roman"/>
+        <a:font script="Thai" typeface="Angsana New"/>
+        <a:font script="Ethi" typeface="Nyala"/>
+        <a:font script="Beng" typeface="Vrinda"/>
+        <a:font script="Gujr" typeface="Shruti"/>
+        <a:font script="Khmr" typeface="MoolBoran"/>
+        <a:font script="Knda" typeface="Tunga"/>
+        <a:font script="Guru" typeface="Raavi"/>
+        <a:font script="Cans" typeface="Euphemia"/>
+        <a:font script="Cher" typeface="Plantagenet Cherokee"/>
+        <a:font script="Yiii" typeface="Microsoft Yi Baiti"/>
+        <a:font script="Tibt" typeface="Microsoft Himalaya"/>
+        <a:font script="Thaa" typeface="MV Boli"/>
+        <a:font script="Deva" typeface="Mangal"/>
+        <a:font script="Telu" typeface="Gautami"/>
+        <a:font script="Taml" typeface="Latha"/>
+        <a:font script="Syrc" typeface="Estrangelo Edessa"/>
+        <a:font script="Orya" typeface="Kalinga"/>
+        <a:font script="Mlym" typeface="Kartika"/>
+        <a:font script="Laoo" typeface="DokChampa"/>
+        <a:font script="Sinh" typeface="Iskoola Pota"/>
+        <a:font script="Mong" typeface="Mongolian Baiti"/>
+        <a:font script="Viet" typeface="Times New Roman"/>
+        <a:font script="Uigh" typeface="Microsoft Uighur"/>
+        <a:font script="Geor" typeface="Sylfaen"/>
+      </a:majorFont>
+      <a:minorFont>
+        <a:latin typeface="Calibri" panose="020F0502020204030204"/>
+        <a:ea typeface=""/>
+        <a:cs typeface=""/>
+        <a:font script="Jpan" typeface="Yu Gothic"/>
+        <a:font script="Hang" typeface="맑은 고딕"/>
+        <a:font script="Hans" typeface="DengXian"/>
+        <a:font script="Hant" typeface="新細明體"/>
+        <a:font script="Arab" typeface="Arial"/>
+        <a:font script="Hebr" typeface="Arial"/>
+        <a:font script="Thai" typeface="Cordia New"/>
+        <a:font script="Ethi" typeface="Nyala"/>
+        <a:font script="Beng" typeface="Vrinda"/>
+        <a:font script="Gujr" typeface="Shruti"/>
+        <a:font script="Khmr" typeface="DaunPenh"/>
+        <a:font script="Knda" typeface="Tunga"/>
+        <a:font script="Guru" typeface="Raavi"/>
+        <a:font script="Cans" typeface="Euphemia"/>
+        <a:font script="Cher" typeface="Plantagenet Cherokee"/>
+        <a:font script="Yiii" typeface="Microsoft Yi Baiti"/>
+        <a:font script="Tibt" typeface="Microsoft Himalaya"/>
+        <a:font script="Thaa" typeface="MV Boli"/>
+        <a:font script="Deva" typeface="Mangal"/>
+        <a:font script="Telu" typeface="Gautami"/>
+        <a:font script="Taml" typeface="Latha"/>
+        <a:font script="Syrc" typeface="Estrangelo Edessa"/>
+        <a:font script="Orya" typeface="Kalinga"/>
+        <a:font script="Mlym" typeface="Kartika"/>
+        <a:font script="Laoo" typeface="DokChampa"/>
+        <a:font script="Sinh" typeface="Iskoola Pota"/>
+        <a:font script="Mong" typeface="Mongolian Baiti"/>
+        <a:font script="Viet" typeface="Arial"/>
+        <a:font script="Uigh" typeface="Microsoft Uighur"/>
+        <a:font script="Geor" typeface="Sylfaen"/>
+      </a:minorFont>
+    </a:fontScheme>
+    <a:fmtScheme name="Office">
+      <a:fillStyleLst>
+        <a:solidFill>
+          <a:schemeClr val="phClr"/>
+        </a:solidFill>
+        <a:gradFill rotWithShape="1">
+          <a:gsLst>
+            <a:gs pos="0">
+              <a:schemeClr val="phClr">
+                <a:lumMod val="110000"/>
+                <a:satMod val="105000"/>
+                <a:tint val="67000"/>
+              </a:schemeClr>
+            </a:gs>
+            <a:gs pos="50000">
+              <a:schemeClr val="phClr">
+                <a:lumMod val="105000"/>
+                <a:satMod val="103000"/>
+                <a:tint val="73000"/>
+              </a:schemeClr>
+            </a:gs>
+            <a:gs pos="100000">
+              <a:schemeClr val="phClr">
+                <a:lumMod val="105000"/>
+                <a:satMod val="109000"/>
+                <a:tint val="81000"/>
+              </a:schemeClr>
+            </a:gs>
+          </a:gsLst>
+          <a:lin ang="5400000" scaled="0"/>
+        </a:gradFill>
+        <a:gradFill rotWithShape="1">
+          <a:gsLst>
+            <a:gs pos="0">
+              <a:schemeClr val="phClr">
+                <a:satMod val="103000"/>
+                <a:lumMod val="102000"/>
+                <a:tint val="94000"/>
+              </a:schemeClr>
+            </a:gs>
+            <a:gs pos="50000">
+              <a:schemeClr val="phClr">
+                <a:satMod val="110000"/>
+                <a:lumMod val="100000"/>
+                <a:shade val="100000"/>
+              </a:schemeClr>
+            </a:gs>
+            <a:gs pos="100000">
+              <a:schemeClr val="phClr">
+                <a:lumMod val="99000"/>
+                <a:satMod val="120000"/>
+                <a:shade val="78000"/>
+              </a:schemeClr>
+            </a:gs>
+          </a:gsLst>
+          <a:lin ang="5400000" scaled="0"/>
+        </a:gradFill>
+      </a:fillStyleLst>
+      <a:lnStyleLst>
+        <a:ln w="6350" cap="flat" cmpd="sng" algn="ctr">
+          <a:solidFill>
+            <a:schemeClr val="phClr"/>
+          </a:solidFill>
+          <a:prstDash val="solid"/>
+          <a:miter lim="800000"/>
+        </a:ln>
+        <a:ln w="12700" cap="flat" cmpd="sng" algn="ctr">
+          <a:solidFill>
+            <a:schemeClr val="phClr"/>
+          </a:solidFill>
+          <a:prstDash val="solid"/>
+          <a:miter lim="800000"/>
+        </a:ln>
+        <a:ln w="19050" cap="flat" cmpd="sng" algn="ctr">
+          <a:solidFill>
+            <a:schemeClr val="phClr"/>
+          </a:solidFill>
+          <a:prstDash val="solid"/>
+          <a:miter lim="800000"/>
+        </a:ln>
+      </a:lnStyleLst>
+      <a:effectStyleLst>
+        <a:effectStyle>
+          <a:effectLst/>
+        </a:effectStyle>
+        <a:effectStyle>
+          <a:effectLst/>
+        </a:effectStyle>
+        <a:effectStyle>
+          <a:effectLst>
+            <a:outerShdw blurRad="57150" dist="19050" dir="5400000" algn="ctr" rotWithShape="0">
+              <a:srgbClr val="000000">
+                <a:alpha val="63000"/>
+              </a:srgbClr>
+            </a:outerShdw>
+          </a:effectLst>
+        </a:effectStyle>
+      </a:effectStyleLst>
+      <a:bgFillStyleLst>
+        <a:solidFill>
+          <a:schemeClr val="phClr"/>
+        </a:solidFill>
+        <a:solidFill>
+          <a:schemeClr val="phClr">
+            <a:tint val="95000"/>
+            <a:satMod val="170000"/>
+          </a:schemeClr>
+        </a:solidFill>
+        <a:gradFill rotWithShape="1">
+          <a:gsLst>
+            <a:gs pos="0">
+              <a:schemeClr val="phClr">
+                <a:tint val="93000"/>
+                <a:satMod val="150000"/>
+                <a:shade val="98000"/>
+                <a:lumMod val="102000"/>
+              </a:schemeClr>
+            </a:gs>
+            <a:gs pos="50000">
+              <a:schemeClr val="phClr">
+                <a:tint val="98000"/>
+                <a:satMod val="130000"/>
+                <a:shade val="90000"/>
+                <a:lumMod val="103000"/>
+              </a:schemeClr>
+            </a:gs>
+            <a:gs pos="100000">
+              <a:schemeClr val="phClr">
+                <a:shade val="63000"/>
+                <a:satMod val="120000"/>
+              </a:schemeClr>
+            </a:gs>
+          </a:gsLst>
+          <a:lin ang="5400000" scaled="0"/>
+        </a:gradFill>
+      </a:bgFillStyleLst>
+    </a:fmtScheme>
+  </a:themeElements>
+  <a:objectDefaults/>
+  <a:extraClrSchemeLst/>
+  <a:extLst>
+    <a:ext uri="{05A4C25C-085E-4340-85A3-A5531E510DB2}">
+      <thm15:themeFamily xmlns:thm15="http://schemas.microsoft.com/office/thememl/2012/main" name="Office Theme" id="{62F939B6-93AF-4DB8-9C6B-D6C7DFDC589F}" vid="{4A3C46E8-61CC-4603-A589-7422A47A8E4A}"/>
+    </a:ext>
+  </a:extLst>
+</a:theme>
 </file>
</xml_diff>

<commit_message>
Page Layout design updated
</commit_message>
<xml_diff>
--- a/docs/ConsultIT_Design.pptx
+++ b/docs/ConsultIT_Design.pptx
@@ -1,19 +1,20 @@
 
 <file path=ppt/presentation.xml><?xml version="1.0" encoding="utf-8"?>
-<p:presentation xmlns:a="http://schemas.openxmlformats.org/drawingml/2006/main" xmlns:r="http://schemas.openxmlformats.org/officeDocument/2006/relationships" xmlns:p="http://schemas.openxmlformats.org/presentationml/2006/main" saveSubsetFonts="1" autoCompressPictures="0">
+<p:presentation xmlns:a="http://schemas.openxmlformats.org/drawingml/2006/main" xmlns:r="http://schemas.openxmlformats.org/officeDocument/2006/relationships" xmlns:p="http://schemas.openxmlformats.org/presentationml/2006/main" autoCompressPictures="0">
   <p:sldMasterIdLst>
     <p:sldMasterId id="2147483648" r:id="rId1"/>
   </p:sldMasterIdLst>
   <p:notesMasterIdLst>
-    <p:notesMasterId r:id="rId8"/>
+    <p:notesMasterId r:id="rId10"/>
   </p:notesMasterIdLst>
   <p:sldIdLst>
-    <p:sldId id="256" r:id="rId2"/>
-    <p:sldId id="257" r:id="rId3"/>
-    <p:sldId id="258" r:id="rId4"/>
-    <p:sldId id="261" r:id="rId5"/>
-    <p:sldId id="259" r:id="rId6"/>
-    <p:sldId id="260" r:id="rId7"/>
+    <p:sldId id="256" r:id="rId3"/>
+    <p:sldId id="257" r:id="rId4"/>
+    <p:sldId id="258" r:id="rId5"/>
+    <p:sldId id="261" r:id="rId6"/>
+    <p:sldId id="259" r:id="rId7"/>
+    <p:sldId id="260" r:id="rId8"/>
+    <p:sldId id="264" r:id="rId9"/>
   </p:sldIdLst>
   <p:sldSz cx="12192000" cy="6858000"/>
   <p:notesSz cx="6858000" cy="9144000"/>
@@ -112,11 +113,6 @@
       </a:defRPr>
     </a:lvl9pPr>
   </p:defaultTextStyle>
-  <p:extLst>
-    <p:ext uri="{EFAFB233-063F-42B5-8137-9DF3F51BA10A}">
-      <p15:sldGuideLst xmlns:p15="http://schemas.microsoft.com/office/powerpoint/2012/main"/>
-    </p:ext>
-  </p:extLst>
 </p:presentation>
 </file>
 
@@ -202,7 +198,6 @@
           <a:p>
             <a:fld id="{EC9F1B14-44F9-3D40-9367-CFF318082B84}" type="datetimeFigureOut">
               <a:rPr lang="en-US" smtClean="0"/>
-              <a:t>4/17/17</a:t>
             </a:fld>
             <a:endParaRPr lang="en-US"/>
           </a:p>
@@ -269,6 +264,7 @@
               <a:rPr lang="en-US" smtClean="0"/>
               <a:t>Click to edit Master text styles</a:t>
             </a:r>
+            <a:endParaRPr lang="en-US" smtClean="0"/>
           </a:p>
           <a:p>
             <a:pPr lvl="1"/>
@@ -276,6 +272,7 @@
               <a:rPr lang="en-US" smtClean="0"/>
               <a:t>Second level</a:t>
             </a:r>
+            <a:endParaRPr lang="en-US" smtClean="0"/>
           </a:p>
           <a:p>
             <a:pPr lvl="2"/>
@@ -283,6 +280,7 @@
               <a:rPr lang="en-US" smtClean="0"/>
               <a:t>Third level</a:t>
             </a:r>
+            <a:endParaRPr lang="en-US" smtClean="0"/>
           </a:p>
           <a:p>
             <a:pPr lvl="3"/>
@@ -290,6 +288,7 @@
               <a:rPr lang="en-US" smtClean="0"/>
               <a:t>Fourth level</a:t>
             </a:r>
+            <a:endParaRPr lang="en-US" smtClean="0"/>
           </a:p>
           <a:p>
             <a:pPr lvl="4"/>
@@ -361,18 +360,12 @@
           <a:p>
             <a:fld id="{184EF0CD-D548-524B-8ABE-D09CFCF1F990}" type="slidenum">
               <a:rPr lang="en-US" smtClean="0"/>
-              <a:t>‹#›</a:t>
             </a:fld>
             <a:endParaRPr lang="en-US"/>
           </a:p>
         </p:txBody>
       </p:sp>
     </p:spTree>
-    <p:extLst>
-      <p:ext uri="{BB962C8B-B14F-4D97-AF65-F5344CB8AC3E}">
-        <p14:creationId xmlns:p14="http://schemas.microsoft.com/office/powerpoint/2010/main" val="1811010709"/>
-      </p:ext>
-    </p:extLst>
   </p:cSld>
   <p:clrMap bg1="lt1" tx1="dk1" bg2="lt2" tx2="dk2" accent1="accent1" accent2="accent2" accent3="accent3" accent4="accent4" accent5="accent5" accent6="accent6" hlink="hlink" folHlink="folHlink"/>
   <p:notesStyle>
@@ -601,7 +594,6 @@
           <a:p>
             <a:fld id="{7B81F7FC-1D4B-EF44-A2A8-D8586FF49797}" type="datetimeFigureOut">
               <a:rPr lang="en-US" smtClean="0"/>
-              <a:t>4/17/17</a:t>
             </a:fld>
             <a:endParaRPr lang="en-US"/>
           </a:p>
@@ -643,18 +635,12 @@
           <a:p>
             <a:fld id="{279E574A-9CBA-6A4D-8557-47F956990F41}" type="slidenum">
               <a:rPr lang="en-US" smtClean="0"/>
-              <a:t>‹#›</a:t>
             </a:fld>
             <a:endParaRPr lang="en-US"/>
           </a:p>
         </p:txBody>
       </p:sp>
     </p:spTree>
-    <p:extLst>
-      <p:ext uri="{BB962C8B-B14F-4D97-AF65-F5344CB8AC3E}">
-        <p14:creationId xmlns:p14="http://schemas.microsoft.com/office/powerpoint/2010/main" val="1124133321"/>
-      </p:ext>
-    </p:extLst>
   </p:cSld>
   <p:clrMapOvr>
     <a:masterClrMapping/>
@@ -722,6 +708,7 @@
               <a:rPr lang="en-US" smtClean="0"/>
               <a:t>Click to edit Master text styles</a:t>
             </a:r>
+            <a:endParaRPr lang="en-US" smtClean="0"/>
           </a:p>
           <a:p>
             <a:pPr lvl="1"/>
@@ -729,6 +716,7 @@
               <a:rPr lang="en-US" smtClean="0"/>
               <a:t>Second level</a:t>
             </a:r>
+            <a:endParaRPr lang="en-US" smtClean="0"/>
           </a:p>
           <a:p>
             <a:pPr lvl="2"/>
@@ -736,6 +724,7 @@
               <a:rPr lang="en-US" smtClean="0"/>
               <a:t>Third level</a:t>
             </a:r>
+            <a:endParaRPr lang="en-US" smtClean="0"/>
           </a:p>
           <a:p>
             <a:pPr lvl="3"/>
@@ -743,6 +732,7 @@
               <a:rPr lang="en-US" smtClean="0"/>
               <a:t>Fourth level</a:t>
             </a:r>
+            <a:endParaRPr lang="en-US" smtClean="0"/>
           </a:p>
           <a:p>
             <a:pPr lvl="4"/>
@@ -771,7 +761,6 @@
           <a:p>
             <a:fld id="{7B81F7FC-1D4B-EF44-A2A8-D8586FF49797}" type="datetimeFigureOut">
               <a:rPr lang="en-US" smtClean="0"/>
-              <a:t>4/17/17</a:t>
             </a:fld>
             <a:endParaRPr lang="en-US"/>
           </a:p>
@@ -813,18 +802,12 @@
           <a:p>
             <a:fld id="{279E574A-9CBA-6A4D-8557-47F956990F41}" type="slidenum">
               <a:rPr lang="en-US" smtClean="0"/>
-              <a:t>‹#›</a:t>
             </a:fld>
             <a:endParaRPr lang="en-US"/>
           </a:p>
         </p:txBody>
       </p:sp>
     </p:spTree>
-    <p:extLst>
-      <p:ext uri="{BB962C8B-B14F-4D97-AF65-F5344CB8AC3E}">
-        <p14:creationId xmlns:p14="http://schemas.microsoft.com/office/powerpoint/2010/main" val="1366818855"/>
-      </p:ext>
-    </p:extLst>
   </p:cSld>
   <p:clrMapOvr>
     <a:masterClrMapping/>
@@ -902,6 +885,7 @@
               <a:rPr lang="en-US" smtClean="0"/>
               <a:t>Click to edit Master text styles</a:t>
             </a:r>
+            <a:endParaRPr lang="en-US" smtClean="0"/>
           </a:p>
           <a:p>
             <a:pPr lvl="1"/>
@@ -909,6 +893,7 @@
               <a:rPr lang="en-US" smtClean="0"/>
               <a:t>Second level</a:t>
             </a:r>
+            <a:endParaRPr lang="en-US" smtClean="0"/>
           </a:p>
           <a:p>
             <a:pPr lvl="2"/>
@@ -916,6 +901,7 @@
               <a:rPr lang="en-US" smtClean="0"/>
               <a:t>Third level</a:t>
             </a:r>
+            <a:endParaRPr lang="en-US" smtClean="0"/>
           </a:p>
           <a:p>
             <a:pPr lvl="3"/>
@@ -923,6 +909,7 @@
               <a:rPr lang="en-US" smtClean="0"/>
               <a:t>Fourth level</a:t>
             </a:r>
+            <a:endParaRPr lang="en-US" smtClean="0"/>
           </a:p>
           <a:p>
             <a:pPr lvl="4"/>
@@ -951,7 +938,6 @@
           <a:p>
             <a:fld id="{7B81F7FC-1D4B-EF44-A2A8-D8586FF49797}" type="datetimeFigureOut">
               <a:rPr lang="en-US" smtClean="0"/>
-              <a:t>4/17/17</a:t>
             </a:fld>
             <a:endParaRPr lang="en-US"/>
           </a:p>
@@ -993,18 +979,12 @@
           <a:p>
             <a:fld id="{279E574A-9CBA-6A4D-8557-47F956990F41}" type="slidenum">
               <a:rPr lang="en-US" smtClean="0"/>
-              <a:t>‹#›</a:t>
             </a:fld>
             <a:endParaRPr lang="en-US"/>
           </a:p>
         </p:txBody>
       </p:sp>
     </p:spTree>
-    <p:extLst>
-      <p:ext uri="{BB962C8B-B14F-4D97-AF65-F5344CB8AC3E}">
-        <p14:creationId xmlns:p14="http://schemas.microsoft.com/office/powerpoint/2010/main" val="491924026"/>
-      </p:ext>
-    </p:extLst>
   </p:cSld>
   <p:clrMapOvr>
     <a:masterClrMapping/>
@@ -1072,6 +1052,7 @@
               <a:rPr lang="en-US" smtClean="0"/>
               <a:t>Click to edit Master text styles</a:t>
             </a:r>
+            <a:endParaRPr lang="en-US" smtClean="0"/>
           </a:p>
           <a:p>
             <a:pPr lvl="1"/>
@@ -1079,6 +1060,7 @@
               <a:rPr lang="en-US" smtClean="0"/>
               <a:t>Second level</a:t>
             </a:r>
+            <a:endParaRPr lang="en-US" smtClean="0"/>
           </a:p>
           <a:p>
             <a:pPr lvl="2"/>
@@ -1086,6 +1068,7 @@
               <a:rPr lang="en-US" smtClean="0"/>
               <a:t>Third level</a:t>
             </a:r>
+            <a:endParaRPr lang="en-US" smtClean="0"/>
           </a:p>
           <a:p>
             <a:pPr lvl="3"/>
@@ -1093,6 +1076,7 @@
               <a:rPr lang="en-US" smtClean="0"/>
               <a:t>Fourth level</a:t>
             </a:r>
+            <a:endParaRPr lang="en-US" smtClean="0"/>
           </a:p>
           <a:p>
             <a:pPr lvl="4"/>
@@ -1121,7 +1105,6 @@
           <a:p>
             <a:fld id="{7B81F7FC-1D4B-EF44-A2A8-D8586FF49797}" type="datetimeFigureOut">
               <a:rPr lang="en-US" smtClean="0"/>
-              <a:t>4/17/17</a:t>
             </a:fld>
             <a:endParaRPr lang="en-US"/>
           </a:p>
@@ -1163,18 +1146,12 @@
           <a:p>
             <a:fld id="{279E574A-9CBA-6A4D-8557-47F956990F41}" type="slidenum">
               <a:rPr lang="en-US" smtClean="0"/>
-              <a:t>‹#›</a:t>
             </a:fld>
             <a:endParaRPr lang="en-US"/>
           </a:p>
         </p:txBody>
       </p:sp>
     </p:spTree>
-    <p:extLst>
-      <p:ext uri="{BB962C8B-B14F-4D97-AF65-F5344CB8AC3E}">
-        <p14:creationId xmlns:p14="http://schemas.microsoft.com/office/powerpoint/2010/main" val="1895083388"/>
-      </p:ext>
-    </p:extLst>
   </p:cSld>
   <p:clrMapOvr>
     <a:masterClrMapping/>
@@ -1347,6 +1324,7 @@
               <a:rPr lang="en-US" smtClean="0"/>
               <a:t>Click to edit Master text styles</a:t>
             </a:r>
+            <a:endParaRPr lang="en-US" smtClean="0"/>
           </a:p>
         </p:txBody>
       </p:sp>
@@ -1367,7 +1345,6 @@
           <a:p>
             <a:fld id="{7B81F7FC-1D4B-EF44-A2A8-D8586FF49797}" type="datetimeFigureOut">
               <a:rPr lang="en-US" smtClean="0"/>
-              <a:t>4/17/17</a:t>
             </a:fld>
             <a:endParaRPr lang="en-US"/>
           </a:p>
@@ -1409,18 +1386,12 @@
           <a:p>
             <a:fld id="{279E574A-9CBA-6A4D-8557-47F956990F41}" type="slidenum">
               <a:rPr lang="en-US" smtClean="0"/>
-              <a:t>‹#›</a:t>
             </a:fld>
             <a:endParaRPr lang="en-US"/>
           </a:p>
         </p:txBody>
       </p:sp>
     </p:spTree>
-    <p:extLst>
-      <p:ext uri="{BB962C8B-B14F-4D97-AF65-F5344CB8AC3E}">
-        <p14:creationId xmlns:p14="http://schemas.microsoft.com/office/powerpoint/2010/main" val="1336533459"/>
-      </p:ext>
-    </p:extLst>
   </p:cSld>
   <p:clrMapOvr>
     <a:masterClrMapping/>
@@ -1493,6 +1464,7 @@
               <a:rPr lang="en-US" smtClean="0"/>
               <a:t>Click to edit Master text styles</a:t>
             </a:r>
+            <a:endParaRPr lang="en-US" smtClean="0"/>
           </a:p>
           <a:p>
             <a:pPr lvl="1"/>
@@ -1500,6 +1472,7 @@
               <a:rPr lang="en-US" smtClean="0"/>
               <a:t>Second level</a:t>
             </a:r>
+            <a:endParaRPr lang="en-US" smtClean="0"/>
           </a:p>
           <a:p>
             <a:pPr lvl="2"/>
@@ -1507,6 +1480,7 @@
               <a:rPr lang="en-US" smtClean="0"/>
               <a:t>Third level</a:t>
             </a:r>
+            <a:endParaRPr lang="en-US" smtClean="0"/>
           </a:p>
           <a:p>
             <a:pPr lvl="3"/>
@@ -1514,6 +1488,7 @@
               <a:rPr lang="en-US" smtClean="0"/>
               <a:t>Fourth level</a:t>
             </a:r>
+            <a:endParaRPr lang="en-US" smtClean="0"/>
           </a:p>
           <a:p>
             <a:pPr lvl="4"/>
@@ -1550,6 +1525,7 @@
               <a:rPr lang="en-US" smtClean="0"/>
               <a:t>Click to edit Master text styles</a:t>
             </a:r>
+            <a:endParaRPr lang="en-US" smtClean="0"/>
           </a:p>
           <a:p>
             <a:pPr lvl="1"/>
@@ -1557,6 +1533,7 @@
               <a:rPr lang="en-US" smtClean="0"/>
               <a:t>Second level</a:t>
             </a:r>
+            <a:endParaRPr lang="en-US" smtClean="0"/>
           </a:p>
           <a:p>
             <a:pPr lvl="2"/>
@@ -1564,6 +1541,7 @@
               <a:rPr lang="en-US" smtClean="0"/>
               <a:t>Third level</a:t>
             </a:r>
+            <a:endParaRPr lang="en-US" smtClean="0"/>
           </a:p>
           <a:p>
             <a:pPr lvl="3"/>
@@ -1571,6 +1549,7 @@
               <a:rPr lang="en-US" smtClean="0"/>
               <a:t>Fourth level</a:t>
             </a:r>
+            <a:endParaRPr lang="en-US" smtClean="0"/>
           </a:p>
           <a:p>
             <a:pPr lvl="4"/>
@@ -1599,7 +1578,6 @@
           <a:p>
             <a:fld id="{7B81F7FC-1D4B-EF44-A2A8-D8586FF49797}" type="datetimeFigureOut">
               <a:rPr lang="en-US" smtClean="0"/>
-              <a:t>4/17/17</a:t>
             </a:fld>
             <a:endParaRPr lang="en-US"/>
           </a:p>
@@ -1641,18 +1619,12 @@
           <a:p>
             <a:fld id="{279E574A-9CBA-6A4D-8557-47F956990F41}" type="slidenum">
               <a:rPr lang="en-US" smtClean="0"/>
-              <a:t>‹#›</a:t>
             </a:fld>
             <a:endParaRPr lang="en-US"/>
           </a:p>
         </p:txBody>
       </p:sp>
     </p:spTree>
-    <p:extLst>
-      <p:ext uri="{BB962C8B-B14F-4D97-AF65-F5344CB8AC3E}">
-        <p14:creationId xmlns:p14="http://schemas.microsoft.com/office/powerpoint/2010/main" val="438897793"/>
-      </p:ext>
-    </p:extLst>
   </p:cSld>
   <p:clrMapOvr>
     <a:masterClrMapping/>
@@ -1767,6 +1739,7 @@
               <a:rPr lang="en-US" smtClean="0"/>
               <a:t>Click to edit Master text styles</a:t>
             </a:r>
+            <a:endParaRPr lang="en-US" smtClean="0"/>
           </a:p>
         </p:txBody>
       </p:sp>
@@ -1795,6 +1768,7 @@
               <a:rPr lang="en-US" smtClean="0"/>
               <a:t>Click to edit Master text styles</a:t>
             </a:r>
+            <a:endParaRPr lang="en-US" smtClean="0"/>
           </a:p>
           <a:p>
             <a:pPr lvl="1"/>
@@ -1802,6 +1776,7 @@
               <a:rPr lang="en-US" smtClean="0"/>
               <a:t>Second level</a:t>
             </a:r>
+            <a:endParaRPr lang="en-US" smtClean="0"/>
           </a:p>
           <a:p>
             <a:pPr lvl="2"/>
@@ -1809,6 +1784,7 @@
               <a:rPr lang="en-US" smtClean="0"/>
               <a:t>Third level</a:t>
             </a:r>
+            <a:endParaRPr lang="en-US" smtClean="0"/>
           </a:p>
           <a:p>
             <a:pPr lvl="3"/>
@@ -1816,6 +1792,7 @@
               <a:rPr lang="en-US" smtClean="0"/>
               <a:t>Fourth level</a:t>
             </a:r>
+            <a:endParaRPr lang="en-US" smtClean="0"/>
           </a:p>
           <a:p>
             <a:pPr lvl="4"/>
@@ -1889,6 +1866,7 @@
               <a:rPr lang="en-US" smtClean="0"/>
               <a:t>Click to edit Master text styles</a:t>
             </a:r>
+            <a:endParaRPr lang="en-US" smtClean="0"/>
           </a:p>
         </p:txBody>
       </p:sp>
@@ -1917,6 +1895,7 @@
               <a:rPr lang="en-US" smtClean="0"/>
               <a:t>Click to edit Master text styles</a:t>
             </a:r>
+            <a:endParaRPr lang="en-US" smtClean="0"/>
           </a:p>
           <a:p>
             <a:pPr lvl="1"/>
@@ -1924,6 +1903,7 @@
               <a:rPr lang="en-US" smtClean="0"/>
               <a:t>Second level</a:t>
             </a:r>
+            <a:endParaRPr lang="en-US" smtClean="0"/>
           </a:p>
           <a:p>
             <a:pPr lvl="2"/>
@@ -1931,6 +1911,7 @@
               <a:rPr lang="en-US" smtClean="0"/>
               <a:t>Third level</a:t>
             </a:r>
+            <a:endParaRPr lang="en-US" smtClean="0"/>
           </a:p>
           <a:p>
             <a:pPr lvl="3"/>
@@ -1938,6 +1919,7 @@
               <a:rPr lang="en-US" smtClean="0"/>
               <a:t>Fourth level</a:t>
             </a:r>
+            <a:endParaRPr lang="en-US" smtClean="0"/>
           </a:p>
           <a:p>
             <a:pPr lvl="4"/>
@@ -1966,7 +1948,6 @@
           <a:p>
             <a:fld id="{7B81F7FC-1D4B-EF44-A2A8-D8586FF49797}" type="datetimeFigureOut">
               <a:rPr lang="en-US" smtClean="0"/>
-              <a:t>4/17/17</a:t>
             </a:fld>
             <a:endParaRPr lang="en-US"/>
           </a:p>
@@ -2008,18 +1989,12 @@
           <a:p>
             <a:fld id="{279E574A-9CBA-6A4D-8557-47F956990F41}" type="slidenum">
               <a:rPr lang="en-US" smtClean="0"/>
-              <a:t>‹#›</a:t>
             </a:fld>
             <a:endParaRPr lang="en-US"/>
           </a:p>
         </p:txBody>
       </p:sp>
     </p:spTree>
-    <p:extLst>
-      <p:ext uri="{BB962C8B-B14F-4D97-AF65-F5344CB8AC3E}">
-        <p14:creationId xmlns:p14="http://schemas.microsoft.com/office/powerpoint/2010/main" val="2096363153"/>
-      </p:ext>
-    </p:extLst>
   </p:cSld>
   <p:clrMapOvr>
     <a:masterClrMapping/>
@@ -2084,7 +2059,6 @@
           <a:p>
             <a:fld id="{7B81F7FC-1D4B-EF44-A2A8-D8586FF49797}" type="datetimeFigureOut">
               <a:rPr lang="en-US" smtClean="0"/>
-              <a:t>4/17/17</a:t>
             </a:fld>
             <a:endParaRPr lang="en-US"/>
           </a:p>
@@ -2126,18 +2100,12 @@
           <a:p>
             <a:fld id="{279E574A-9CBA-6A4D-8557-47F956990F41}" type="slidenum">
               <a:rPr lang="en-US" smtClean="0"/>
-              <a:t>‹#›</a:t>
             </a:fld>
             <a:endParaRPr lang="en-US"/>
           </a:p>
         </p:txBody>
       </p:sp>
     </p:spTree>
-    <p:extLst>
-      <p:ext uri="{BB962C8B-B14F-4D97-AF65-F5344CB8AC3E}">
-        <p14:creationId xmlns:p14="http://schemas.microsoft.com/office/powerpoint/2010/main" val="1958799789"/>
-      </p:ext>
-    </p:extLst>
   </p:cSld>
   <p:clrMapOvr>
     <a:masterClrMapping/>
@@ -2179,7 +2147,6 @@
           <a:p>
             <a:fld id="{7B81F7FC-1D4B-EF44-A2A8-D8586FF49797}" type="datetimeFigureOut">
               <a:rPr lang="en-US" smtClean="0"/>
-              <a:t>4/17/17</a:t>
             </a:fld>
             <a:endParaRPr lang="en-US"/>
           </a:p>
@@ -2221,18 +2188,12 @@
           <a:p>
             <a:fld id="{279E574A-9CBA-6A4D-8557-47F956990F41}" type="slidenum">
               <a:rPr lang="en-US" smtClean="0"/>
-              <a:t>‹#›</a:t>
             </a:fld>
             <a:endParaRPr lang="en-US"/>
           </a:p>
         </p:txBody>
       </p:sp>
     </p:spTree>
-    <p:extLst>
-      <p:ext uri="{BB962C8B-B14F-4D97-AF65-F5344CB8AC3E}">
-        <p14:creationId xmlns:p14="http://schemas.microsoft.com/office/powerpoint/2010/main" val="623745213"/>
-      </p:ext>
-    </p:extLst>
   </p:cSld>
   <p:clrMapOvr>
     <a:masterClrMapping/>
@@ -2342,6 +2303,7 @@
               <a:rPr lang="en-US" smtClean="0"/>
               <a:t>Click to edit Master text styles</a:t>
             </a:r>
+            <a:endParaRPr lang="en-US" smtClean="0"/>
           </a:p>
           <a:p>
             <a:pPr lvl="1"/>
@@ -2349,6 +2311,7 @@
               <a:rPr lang="en-US" smtClean="0"/>
               <a:t>Second level</a:t>
             </a:r>
+            <a:endParaRPr lang="en-US" smtClean="0"/>
           </a:p>
           <a:p>
             <a:pPr lvl="2"/>
@@ -2356,6 +2319,7 @@
               <a:rPr lang="en-US" smtClean="0"/>
               <a:t>Third level</a:t>
             </a:r>
+            <a:endParaRPr lang="en-US" smtClean="0"/>
           </a:p>
           <a:p>
             <a:pPr lvl="3"/>
@@ -2363,6 +2327,7 @@
               <a:rPr lang="en-US" smtClean="0"/>
               <a:t>Fourth level</a:t>
             </a:r>
+            <a:endParaRPr lang="en-US" smtClean="0"/>
           </a:p>
           <a:p>
             <a:pPr lvl="4"/>
@@ -2436,6 +2401,7 @@
               <a:rPr lang="en-US" smtClean="0"/>
               <a:t>Click to edit Master text styles</a:t>
             </a:r>
+            <a:endParaRPr lang="en-US" smtClean="0"/>
           </a:p>
         </p:txBody>
       </p:sp>
@@ -2456,7 +2422,6 @@
           <a:p>
             <a:fld id="{7B81F7FC-1D4B-EF44-A2A8-D8586FF49797}" type="datetimeFigureOut">
               <a:rPr lang="en-US" smtClean="0"/>
-              <a:t>4/17/17</a:t>
             </a:fld>
             <a:endParaRPr lang="en-US"/>
           </a:p>
@@ -2498,18 +2463,12 @@
           <a:p>
             <a:fld id="{279E574A-9CBA-6A4D-8557-47F956990F41}" type="slidenum">
               <a:rPr lang="en-US" smtClean="0"/>
-              <a:t>‹#›</a:t>
             </a:fld>
             <a:endParaRPr lang="en-US"/>
           </a:p>
         </p:txBody>
       </p:sp>
     </p:spTree>
-    <p:extLst>
-      <p:ext uri="{BB962C8B-B14F-4D97-AF65-F5344CB8AC3E}">
-        <p14:creationId xmlns:p14="http://schemas.microsoft.com/office/powerpoint/2010/main" val="1418113884"/>
-      </p:ext>
-    </p:extLst>
   </p:cSld>
   <p:clrMapOvr>
     <a:masterClrMapping/>
@@ -2689,6 +2648,7 @@
               <a:rPr lang="en-US" smtClean="0"/>
               <a:t>Click to edit Master text styles</a:t>
             </a:r>
+            <a:endParaRPr lang="en-US" smtClean="0"/>
           </a:p>
         </p:txBody>
       </p:sp>
@@ -2709,7 +2669,6 @@
           <a:p>
             <a:fld id="{7B81F7FC-1D4B-EF44-A2A8-D8586FF49797}" type="datetimeFigureOut">
               <a:rPr lang="en-US" smtClean="0"/>
-              <a:t>4/17/17</a:t>
             </a:fld>
             <a:endParaRPr lang="en-US"/>
           </a:p>
@@ -2751,18 +2710,12 @@
           <a:p>
             <a:fld id="{279E574A-9CBA-6A4D-8557-47F956990F41}" type="slidenum">
               <a:rPr lang="en-US" smtClean="0"/>
-              <a:t>‹#›</a:t>
             </a:fld>
             <a:endParaRPr lang="en-US"/>
           </a:p>
         </p:txBody>
       </p:sp>
     </p:spTree>
-    <p:extLst>
-      <p:ext uri="{BB962C8B-B14F-4D97-AF65-F5344CB8AC3E}">
-        <p14:creationId xmlns:p14="http://schemas.microsoft.com/office/powerpoint/2010/main" val="1466533982"/>
-      </p:ext>
-    </p:extLst>
   </p:cSld>
   <p:clrMapOvr>
     <a:masterClrMapping/>
@@ -2855,6 +2808,7 @@
               <a:rPr lang="en-US" smtClean="0"/>
               <a:t>Click to edit Master text styles</a:t>
             </a:r>
+            <a:endParaRPr lang="en-US" smtClean="0"/>
           </a:p>
           <a:p>
             <a:pPr lvl="1"/>
@@ -2862,6 +2816,7 @@
               <a:rPr lang="en-US" smtClean="0"/>
               <a:t>Second level</a:t>
             </a:r>
+            <a:endParaRPr lang="en-US" smtClean="0"/>
           </a:p>
           <a:p>
             <a:pPr lvl="2"/>
@@ -2869,6 +2824,7 @@
               <a:rPr lang="en-US" smtClean="0"/>
               <a:t>Third level</a:t>
             </a:r>
+            <a:endParaRPr lang="en-US" smtClean="0"/>
           </a:p>
           <a:p>
             <a:pPr lvl="3"/>
@@ -2876,6 +2832,7 @@
               <a:rPr lang="en-US" smtClean="0"/>
               <a:t>Fourth level</a:t>
             </a:r>
+            <a:endParaRPr lang="en-US" smtClean="0"/>
           </a:p>
           <a:p>
             <a:pPr lvl="4"/>
@@ -2922,7 +2879,6 @@
           <a:p>
             <a:fld id="{7B81F7FC-1D4B-EF44-A2A8-D8586FF49797}" type="datetimeFigureOut">
               <a:rPr lang="en-US" smtClean="0"/>
-              <a:t>4/17/17</a:t>
             </a:fld>
             <a:endParaRPr lang="en-US"/>
           </a:p>
@@ -3000,18 +2956,12 @@
           <a:p>
             <a:fld id="{279E574A-9CBA-6A4D-8557-47F956990F41}" type="slidenum">
               <a:rPr lang="en-US" smtClean="0"/>
-              <a:t>‹#›</a:t>
             </a:fld>
             <a:endParaRPr lang="en-US"/>
           </a:p>
         </p:txBody>
       </p:sp>
     </p:spTree>
-    <p:extLst>
-      <p:ext uri="{BB962C8B-B14F-4D97-AF65-F5344CB8AC3E}">
-        <p14:creationId xmlns:p14="http://schemas.microsoft.com/office/powerpoint/2010/main" val="195559833"/>
-      </p:ext>
-    </p:extLst>
   </p:cSld>
   <p:clrMap bg1="lt1" tx1="dk1" bg2="lt2" tx2="dk2" accent1="accent1" accent2="accent2" accent3="accent3" accent4="accent4" accent5="accent5" accent6="accent6" hlink="hlink" folHlink="folHlink"/>
   <p:sldLayoutIdLst>
@@ -3055,7 +3005,7 @@
         <a:spcBef>
           <a:spcPts val="1000"/>
         </a:spcBef>
-        <a:buFont typeface="Arial"/>
+        <a:buFont typeface="Arial" panose="020B0604020202020204"/>
         <a:buChar char="•"/>
         <a:defRPr sz="2800" kern="1200">
           <a:solidFill>
@@ -3073,7 +3023,7 @@
         <a:spcBef>
           <a:spcPts val="500"/>
         </a:spcBef>
-        <a:buFont typeface="Arial"/>
+        <a:buFont typeface="Arial" panose="020B0604020202020204"/>
         <a:buChar char="•"/>
         <a:defRPr sz="2400" kern="1200">
           <a:solidFill>
@@ -3091,7 +3041,7 @@
         <a:spcBef>
           <a:spcPts val="500"/>
         </a:spcBef>
-        <a:buFont typeface="Arial"/>
+        <a:buFont typeface="Arial" panose="020B0604020202020204"/>
         <a:buChar char="•"/>
         <a:defRPr sz="2000" kern="1200">
           <a:solidFill>
@@ -3109,7 +3059,7 @@
         <a:spcBef>
           <a:spcPts val="500"/>
         </a:spcBef>
-        <a:buFont typeface="Arial"/>
+        <a:buFont typeface="Arial" panose="020B0604020202020204"/>
         <a:buChar char="•"/>
         <a:defRPr sz="1800" kern="1200">
           <a:solidFill>
@@ -3127,7 +3077,7 @@
         <a:spcBef>
           <a:spcPts val="500"/>
         </a:spcBef>
-        <a:buFont typeface="Arial"/>
+        <a:buFont typeface="Arial" panose="020B0604020202020204"/>
         <a:buChar char="•"/>
         <a:defRPr sz="1800" kern="1200">
           <a:solidFill>
@@ -3145,7 +3095,7 @@
         <a:spcBef>
           <a:spcPts val="500"/>
         </a:spcBef>
-        <a:buFont typeface="Arial"/>
+        <a:buFont typeface="Arial" panose="020B0604020202020204"/>
         <a:buChar char="•"/>
         <a:defRPr sz="1800" kern="1200">
           <a:solidFill>
@@ -3163,7 +3113,7 @@
         <a:spcBef>
           <a:spcPts val="500"/>
         </a:spcBef>
-        <a:buFont typeface="Arial"/>
+        <a:buFont typeface="Arial" panose="020B0604020202020204"/>
         <a:buChar char="•"/>
         <a:defRPr sz="1800" kern="1200">
           <a:solidFill>
@@ -3181,7 +3131,7 @@
         <a:spcBef>
           <a:spcPts val="500"/>
         </a:spcBef>
-        <a:buFont typeface="Arial"/>
+        <a:buFont typeface="Arial" panose="020B0604020202020204"/>
         <a:buChar char="•"/>
         <a:defRPr sz="1800" kern="1200">
           <a:solidFill>
@@ -3199,7 +3149,7 @@
         <a:spcBef>
           <a:spcPts val="500"/>
         </a:spcBef>
-        <a:buFont typeface="Arial"/>
+        <a:buFont typeface="Arial" panose="020B0604020202020204"/>
         <a:buChar char="•"/>
         <a:defRPr sz="1800" kern="1200">
           <a:solidFill>
@@ -3333,13 +3283,7 @@
           <p:cNvGraphicFramePr>
             <a:graphicFrameLocks noGrp="1"/>
           </p:cNvGraphicFramePr>
-          <p:nvPr>
-            <p:extLst>
-              <p:ext uri="{D42A27DB-BD31-4B8C-83A1-F6EECF244321}">
-                <p14:modId xmlns:p14="http://schemas.microsoft.com/office/powerpoint/2010/main" val="304431285"/>
-              </p:ext>
-            </p:extLst>
-          </p:nvPr>
+          <p:nvPr/>
         </p:nvGraphicFramePr>
         <p:xfrm>
           <a:off x="655527" y="2300977"/>
@@ -3451,13 +3395,13 @@
                         <a:buSzTx/>
                         <a:buFontTx/>
                         <a:buNone/>
-                        <a:tabLst/>
                         <a:defRPr/>
                       </a:pPr>
                       <a:r>
                         <a:rPr lang="en-US" dirty="0" smtClean="0"/>
                         <a:t>Date of Onboard</a:t>
                       </a:r>
+                      <a:endParaRPr lang="en-US" dirty="0" smtClean="0"/>
                     </a:p>
                   </a:txBody>
                   <a:tcPr/>
@@ -3557,6 +3501,7 @@
                         <a:rPr lang="en-US" dirty="0" smtClean="0"/>
                         <a:t>JAVA</a:t>
                       </a:r>
+                      <a:endParaRPr lang="en-US" dirty="0" smtClean="0"/>
                     </a:p>
                     <a:p>
                       <a:r>
@@ -4098,6 +4043,7 @@
               <a:rPr lang="en-US" dirty="0" smtClean="0"/>
               <a:t>Onboard New</a:t>
             </a:r>
+            <a:endParaRPr lang="en-US" dirty="0" smtClean="0"/>
           </a:p>
         </p:txBody>
       </p:sp>
@@ -4324,11 +4270,6 @@
         </p:txBody>
       </p:sp>
     </p:spTree>
-    <p:extLst>
-      <p:ext uri="{BB962C8B-B14F-4D97-AF65-F5344CB8AC3E}">
-        <p14:creationId xmlns:p14="http://schemas.microsoft.com/office/powerpoint/2010/main" val="2102547679"/>
-      </p:ext>
-    </p:extLst>
   </p:cSld>
   <p:clrMapOvr>
     <a:masterClrMapping/>
@@ -5128,6 +5069,7 @@
               <a:rPr lang="en-US" dirty="0" smtClean="0"/>
               <a:t>Close</a:t>
             </a:r>
+            <a:endParaRPr lang="en-US" dirty="0" smtClean="0"/>
           </a:p>
         </p:txBody>
       </p:sp>
@@ -5243,11 +5185,6 @@
         </p:txBody>
       </p:sp>
     </p:spTree>
-    <p:extLst>
-      <p:ext uri="{BB962C8B-B14F-4D97-AF65-F5344CB8AC3E}">
-        <p14:creationId xmlns:p14="http://schemas.microsoft.com/office/powerpoint/2010/main" val="570629000"/>
-      </p:ext>
-    </p:extLst>
   </p:cSld>
   <p:clrMapOvr>
     <a:masterClrMapping/>
@@ -5312,6 +5249,7 @@
               <a:rPr lang="en-US" sz="4800" dirty="0" smtClean="0"/>
               <a:t>Out going Financial Log</a:t>
             </a:r>
+            <a:endParaRPr lang="en-US" sz="4800" dirty="0" smtClean="0"/>
           </a:p>
         </p:txBody>
       </p:sp>
@@ -5321,13 +5259,7 @@
           <p:cNvGraphicFramePr>
             <a:graphicFrameLocks noGrp="1"/>
           </p:cNvGraphicFramePr>
-          <p:nvPr>
-            <p:extLst>
-              <p:ext uri="{D42A27DB-BD31-4B8C-83A1-F6EECF244321}">
-                <p14:modId xmlns:p14="http://schemas.microsoft.com/office/powerpoint/2010/main" val="76169774"/>
-              </p:ext>
-            </p:extLst>
-          </p:nvPr>
+          <p:nvPr/>
         </p:nvGraphicFramePr>
         <p:xfrm>
           <a:off x="331779" y="1981146"/>
@@ -5412,11 +5344,7 @@
                     <a:p>
                       <a:r>
                         <a:rPr lang="en-US" dirty="0" smtClean="0"/>
-                        <a:t>A/c </a:t>
-                      </a:r>
-                      <a:r>
-                        <a:rPr lang="en-US" dirty="0" smtClean="0"/>
-                        <a:t>Name</a:t>
+                        <a:t>A/c Name</a:t>
                       </a:r>
                       <a:endParaRPr lang="en-US" dirty="0"/>
                     </a:p>
@@ -6013,13 +5941,7 @@
           <p:cNvGraphicFramePr>
             <a:graphicFrameLocks noGrp="1"/>
           </p:cNvGraphicFramePr>
-          <p:nvPr>
-            <p:extLst>
-              <p:ext uri="{D42A27DB-BD31-4B8C-83A1-F6EECF244321}">
-                <p14:modId xmlns:p14="http://schemas.microsoft.com/office/powerpoint/2010/main" val="2018860538"/>
-              </p:ext>
-            </p:extLst>
-          </p:nvPr>
+          <p:nvPr/>
         </p:nvGraphicFramePr>
         <p:xfrm>
           <a:off x="8901118" y="1981146"/>
@@ -6223,6 +6145,7 @@
               <a:rPr lang="en-US" b="1" dirty="0" smtClean="0"/>
               <a:t>Add Expense</a:t>
             </a:r>
+            <a:endParaRPr lang="en-US" b="1" dirty="0" smtClean="0"/>
           </a:p>
         </p:txBody>
       </p:sp>
@@ -6463,11 +6386,6 @@
         </p:txBody>
       </p:sp>
     </p:spTree>
-    <p:extLst>
-      <p:ext uri="{BB962C8B-B14F-4D97-AF65-F5344CB8AC3E}">
-        <p14:creationId xmlns:p14="http://schemas.microsoft.com/office/powerpoint/2010/main" val="961234509"/>
-      </p:ext>
-    </p:extLst>
   </p:cSld>
   <p:clrMapOvr>
     <a:masterClrMapping/>
@@ -7076,6 +6994,7 @@
               <a:rPr lang="en-US" dirty="0" smtClean="0"/>
               <a:t>Close</a:t>
             </a:r>
+            <a:endParaRPr lang="en-US" dirty="0" smtClean="0"/>
           </a:p>
         </p:txBody>
       </p:sp>
@@ -7194,11 +7113,6 @@
         </p:txBody>
       </p:sp>
     </p:spTree>
-    <p:extLst>
-      <p:ext uri="{BB962C8B-B14F-4D97-AF65-F5344CB8AC3E}">
-        <p14:creationId xmlns:p14="http://schemas.microsoft.com/office/powerpoint/2010/main" val="1780586769"/>
-      </p:ext>
-    </p:extLst>
   </p:cSld>
   <p:clrMapOvr>
     <a:masterClrMapping/>
@@ -7263,6 +7177,7 @@
               <a:rPr lang="en-US" sz="4800" dirty="0" smtClean="0"/>
               <a:t>In Coming Financial Log</a:t>
             </a:r>
+            <a:endParaRPr lang="en-US" sz="4800" dirty="0" smtClean="0"/>
           </a:p>
         </p:txBody>
       </p:sp>
@@ -7272,13 +7187,7 @@
           <p:cNvGraphicFramePr>
             <a:graphicFrameLocks noGrp="1"/>
           </p:cNvGraphicFramePr>
-          <p:nvPr>
-            <p:extLst>
-              <p:ext uri="{D42A27DB-BD31-4B8C-83A1-F6EECF244321}">
-                <p14:modId xmlns:p14="http://schemas.microsoft.com/office/powerpoint/2010/main" val="1988332721"/>
-              </p:ext>
-            </p:extLst>
-          </p:nvPr>
+          <p:nvPr/>
         </p:nvGraphicFramePr>
         <p:xfrm>
           <a:off x="431798" y="1981146"/>
@@ -7845,13 +7754,7 @@
           <p:cNvGraphicFramePr>
             <a:graphicFrameLocks noGrp="1"/>
           </p:cNvGraphicFramePr>
-          <p:nvPr>
-            <p:extLst>
-              <p:ext uri="{D42A27DB-BD31-4B8C-83A1-F6EECF244321}">
-                <p14:modId xmlns:p14="http://schemas.microsoft.com/office/powerpoint/2010/main" val="1997472798"/>
-              </p:ext>
-            </p:extLst>
-          </p:nvPr>
+          <p:nvPr/>
         </p:nvGraphicFramePr>
         <p:xfrm>
           <a:off x="7743824" y="1981146"/>
@@ -8173,15 +8076,11 @@
               <a:rPr lang="en-US" b="1" dirty="0" smtClean="0"/>
               <a:t>Add Income</a:t>
             </a:r>
+            <a:endParaRPr lang="en-US" b="1" dirty="0" smtClean="0"/>
           </a:p>
         </p:txBody>
       </p:sp>
     </p:spTree>
-    <p:extLst>
-      <p:ext uri="{BB962C8B-B14F-4D97-AF65-F5344CB8AC3E}">
-        <p14:creationId xmlns:p14="http://schemas.microsoft.com/office/powerpoint/2010/main" val="585405247"/>
-      </p:ext>
-    </p:extLst>
   </p:cSld>
   <p:clrMapOvr>
     <a:masterClrMapping/>
@@ -8246,6 +8145,7 @@
               <a:rPr lang="en-US" sz="4800" dirty="0" smtClean="0"/>
               <a:t>Balance Sheet</a:t>
             </a:r>
+            <a:endParaRPr lang="en-US" sz="4800" dirty="0" smtClean="0"/>
           </a:p>
         </p:txBody>
       </p:sp>
@@ -8255,13 +8155,7 @@
           <p:cNvGraphicFramePr>
             <a:graphicFrameLocks noGrp="1"/>
           </p:cNvGraphicFramePr>
-          <p:nvPr>
-            <p:extLst>
-              <p:ext uri="{D42A27DB-BD31-4B8C-83A1-F6EECF244321}">
-                <p14:modId xmlns:p14="http://schemas.microsoft.com/office/powerpoint/2010/main" val="87860515"/>
-              </p:ext>
-            </p:extLst>
-          </p:nvPr>
+          <p:nvPr/>
         </p:nvGraphicFramePr>
         <p:xfrm>
           <a:off x="160621" y="2341340"/>
@@ -9188,6 +9082,7 @@
               <a:rPr lang="en-US" dirty="0" smtClean="0"/>
               <a:t>Download</a:t>
             </a:r>
+            <a:endParaRPr lang="en-US" dirty="0" smtClean="0"/>
           </a:p>
         </p:txBody>
       </p:sp>
@@ -9241,13 +9136,7 @@
           <p:cNvGraphicFramePr>
             <a:graphicFrameLocks noGrp="1"/>
           </p:cNvGraphicFramePr>
-          <p:nvPr>
-            <p:extLst>
-              <p:ext uri="{D42A27DB-BD31-4B8C-83A1-F6EECF244321}">
-                <p14:modId xmlns:p14="http://schemas.microsoft.com/office/powerpoint/2010/main" val="221862738"/>
-              </p:ext>
-            </p:extLst>
-          </p:nvPr>
+          <p:nvPr/>
         </p:nvGraphicFramePr>
         <p:xfrm>
           <a:off x="8266684" y="2341340"/>
@@ -9467,11 +9356,801 @@
         </p:style>
       </p:cxnSp>
     </p:spTree>
-    <p:extLst>
-      <p:ext uri="{BB962C8B-B14F-4D97-AF65-F5344CB8AC3E}">
-        <p14:creationId xmlns:p14="http://schemas.microsoft.com/office/powerpoint/2010/main" val="1824937698"/>
-      </p:ext>
-    </p:extLst>
+  </p:cSld>
+  <p:clrMapOvr>
+    <a:masterClrMapping/>
+  </p:clrMapOvr>
+</p:sld>
+</file>
+
+<file path=ppt/slides/slide7.xml><?xml version="1.0" encoding="utf-8"?>
+<p:sld xmlns:a="http://schemas.openxmlformats.org/drawingml/2006/main" xmlns:r="http://schemas.openxmlformats.org/officeDocument/2006/relationships" xmlns:p="http://schemas.openxmlformats.org/presentationml/2006/main">
+  <p:cSld>
+    <p:spTree>
+      <p:nvGrpSpPr>
+        <p:cNvPr id="1" name=""/>
+        <p:cNvGrpSpPr/>
+        <p:nvPr/>
+      </p:nvGrpSpPr>
+      <p:grpSpPr/>
+      <p:sp>
+        <p:nvSpPr>
+          <p:cNvPr id="4" name="Rectangle 3"/>
+          <p:cNvSpPr/>
+          <p:nvPr/>
+        </p:nvSpPr>
+        <p:spPr>
+          <a:xfrm>
+            <a:off x="0" y="727075"/>
+            <a:ext cx="1892300" cy="5741670"/>
+          </a:xfrm>
+          <a:prstGeom prst="rect">
+            <a:avLst/>
+          </a:prstGeom>
+          <a:solidFill>
+            <a:schemeClr val="accent4">
+              <a:lumMod val="75000"/>
+              <a:alpha val="37000"/>
+            </a:schemeClr>
+          </a:solidFill>
+          <a:ln>
+            <a:noFill/>
+          </a:ln>
+        </p:spPr>
+        <p:style>
+          <a:lnRef idx="2">
+            <a:schemeClr val="accent1">
+              <a:shade val="50000"/>
+            </a:schemeClr>
+          </a:lnRef>
+          <a:fillRef idx="1">
+            <a:schemeClr val="accent1"/>
+          </a:fillRef>
+          <a:effectRef idx="0">
+            <a:schemeClr val="accent1"/>
+          </a:effectRef>
+          <a:fontRef idx="minor">
+            <a:schemeClr val="lt1"/>
+          </a:fontRef>
+        </p:style>
+        <p:txBody>
+          <a:bodyPr rtlCol="0" anchor="ctr"/>
+          <a:p>
+            <a:pPr algn="r"/>
+            <a:endParaRPr lang="en-US" sz="2000" u="sng" dirty="0" smtClean="0"/>
+          </a:p>
+        </p:txBody>
+      </p:sp>
+      <p:sp>
+        <p:nvSpPr>
+          <p:cNvPr id="17" name="Rounded Rectangle 16"/>
+          <p:cNvSpPr/>
+          <p:nvPr/>
+        </p:nvSpPr>
+        <p:spPr>
+          <a:xfrm>
+            <a:off x="158115" y="1569085"/>
+            <a:ext cx="1576070" cy="454660"/>
+          </a:xfrm>
+          <a:prstGeom prst="roundRect">
+            <a:avLst/>
+          </a:prstGeom>
+          <a:gradFill>
+            <a:gsLst>
+              <a:gs pos="0">
+                <a:srgbClr val="FBFB11"/>
+              </a:gs>
+              <a:gs pos="100000">
+                <a:srgbClr val="838309"/>
+              </a:gs>
+            </a:gsLst>
+            <a:lin ang="5400000" scaled="0"/>
+          </a:gradFill>
+          <a:effectLst>
+            <a:outerShdw blurRad="50800" dist="76200" dir="18900000" algn="bl" rotWithShape="0">
+              <a:prstClr val="black">
+                <a:alpha val="40000"/>
+              </a:prstClr>
+            </a:outerShdw>
+          </a:effectLst>
+        </p:spPr>
+        <p:style>
+          <a:lnRef idx="2">
+            <a:schemeClr val="accent1">
+              <a:shade val="50000"/>
+            </a:schemeClr>
+          </a:lnRef>
+          <a:fillRef idx="1">
+            <a:schemeClr val="accent1"/>
+          </a:fillRef>
+          <a:effectRef idx="0">
+            <a:schemeClr val="accent1"/>
+          </a:effectRef>
+          <a:fontRef idx="minor">
+            <a:schemeClr val="lt1"/>
+          </a:fontRef>
+        </p:style>
+        <p:txBody>
+          <a:bodyPr rtlCol="0" anchor="ctr"/>
+          <a:p>
+            <a:pPr algn="ctr"/>
+            <a:r>
+              <a:rPr lang="en-US" b="1" dirty="0" smtClean="0">
+                <a:solidFill>
+                  <a:schemeClr val="accent5"/>
+                </a:solidFill>
+              </a:rPr>
+              <a:t>Home</a:t>
+            </a:r>
+            <a:endParaRPr lang="en-US" b="1" dirty="0" smtClean="0">
+              <a:solidFill>
+                <a:schemeClr val="accent5"/>
+              </a:solidFill>
+            </a:endParaRPr>
+          </a:p>
+        </p:txBody>
+      </p:sp>
+      <p:sp>
+        <p:nvSpPr>
+          <p:cNvPr id="11" name="Rounded Rectangle 10"/>
+          <p:cNvSpPr/>
+          <p:nvPr/>
+        </p:nvSpPr>
+        <p:spPr>
+          <a:xfrm>
+            <a:off x="158115" y="2179955"/>
+            <a:ext cx="1576070" cy="454660"/>
+          </a:xfrm>
+          <a:prstGeom prst="roundRect">
+            <a:avLst/>
+          </a:prstGeom>
+          <a:gradFill>
+            <a:gsLst>
+              <a:gs pos="100000">
+                <a:srgbClr val="FBFB11"/>
+              </a:gs>
+              <a:gs pos="100000">
+                <a:srgbClr val="838309"/>
+              </a:gs>
+            </a:gsLst>
+            <a:lin ang="4800000" scaled="0"/>
+          </a:gradFill>
+          <a:effectLst>
+            <a:outerShdw blurRad="50800" dist="76200" dir="18900000" algn="bl" rotWithShape="0">
+              <a:prstClr val="black">
+                <a:alpha val="40000"/>
+              </a:prstClr>
+            </a:outerShdw>
+          </a:effectLst>
+        </p:spPr>
+        <p:style>
+          <a:lnRef idx="2">
+            <a:schemeClr val="accent1">
+              <a:shade val="50000"/>
+            </a:schemeClr>
+          </a:lnRef>
+          <a:fillRef idx="1">
+            <a:schemeClr val="accent1"/>
+          </a:fillRef>
+          <a:effectRef idx="0">
+            <a:schemeClr val="accent1"/>
+          </a:effectRef>
+          <a:fontRef idx="minor">
+            <a:schemeClr val="lt1"/>
+          </a:fontRef>
+        </p:style>
+        <p:txBody>
+          <a:bodyPr rtlCol="0" anchor="ctr"/>
+          <a:p>
+            <a:pPr algn="ctr"/>
+            <a:r>
+              <a:rPr lang="en-US" b="1" dirty="0" smtClean="0">
+                <a:solidFill>
+                  <a:schemeClr val="accent5"/>
+                </a:solidFill>
+              </a:rPr>
+              <a:t>On-board</a:t>
+            </a:r>
+            <a:endParaRPr lang="en-US" b="1" dirty="0" smtClean="0">
+              <a:solidFill>
+                <a:schemeClr val="accent5"/>
+              </a:solidFill>
+            </a:endParaRPr>
+          </a:p>
+        </p:txBody>
+      </p:sp>
+      <p:sp>
+        <p:nvSpPr>
+          <p:cNvPr id="12" name="Rounded Rectangle 11"/>
+          <p:cNvSpPr/>
+          <p:nvPr/>
+        </p:nvSpPr>
+        <p:spPr>
+          <a:xfrm>
+            <a:off x="158115" y="2783840"/>
+            <a:ext cx="1576070" cy="454660"/>
+          </a:xfrm>
+          <a:prstGeom prst="roundRect">
+            <a:avLst/>
+          </a:prstGeom>
+          <a:gradFill>
+            <a:gsLst>
+              <a:gs pos="0">
+                <a:srgbClr val="FBFB11"/>
+              </a:gs>
+              <a:gs pos="100000">
+                <a:srgbClr val="838309"/>
+              </a:gs>
+            </a:gsLst>
+            <a:lin ang="5400000" scaled="0"/>
+          </a:gradFill>
+          <a:effectLst>
+            <a:outerShdw blurRad="50800" dist="76200" dir="18900000" algn="bl" rotWithShape="0">
+              <a:prstClr val="black">
+                <a:alpha val="40000"/>
+              </a:prstClr>
+            </a:outerShdw>
+          </a:effectLst>
+        </p:spPr>
+        <p:style>
+          <a:lnRef idx="2">
+            <a:schemeClr val="accent1">
+              <a:shade val="50000"/>
+            </a:schemeClr>
+          </a:lnRef>
+          <a:fillRef idx="1">
+            <a:schemeClr val="accent1"/>
+          </a:fillRef>
+          <a:effectRef idx="0">
+            <a:schemeClr val="accent1"/>
+          </a:effectRef>
+          <a:fontRef idx="minor">
+            <a:schemeClr val="lt1"/>
+          </a:fontRef>
+        </p:style>
+        <p:txBody>
+          <a:bodyPr rtlCol="0" anchor="ctr"/>
+          <a:p>
+            <a:pPr algn="ctr"/>
+            <a:r>
+              <a:rPr lang="en-US" b="1" dirty="0" smtClean="0">
+                <a:solidFill>
+                  <a:schemeClr val="accent5"/>
+                </a:solidFill>
+              </a:rPr>
+              <a:t>Finance</a:t>
+            </a:r>
+            <a:endParaRPr lang="en-US" b="1" dirty="0" smtClean="0">
+              <a:solidFill>
+                <a:schemeClr val="accent5"/>
+              </a:solidFill>
+            </a:endParaRPr>
+          </a:p>
+        </p:txBody>
+      </p:sp>
+      <p:sp>
+        <p:nvSpPr>
+          <p:cNvPr id="13" name="Rounded Rectangle 12"/>
+          <p:cNvSpPr/>
+          <p:nvPr/>
+        </p:nvSpPr>
+        <p:spPr>
+          <a:xfrm>
+            <a:off x="158115" y="3404235"/>
+            <a:ext cx="1576070" cy="454660"/>
+          </a:xfrm>
+          <a:prstGeom prst="roundRect">
+            <a:avLst/>
+          </a:prstGeom>
+          <a:gradFill>
+            <a:gsLst>
+              <a:gs pos="0">
+                <a:srgbClr val="FBFB11"/>
+              </a:gs>
+              <a:gs pos="100000">
+                <a:srgbClr val="838309"/>
+              </a:gs>
+            </a:gsLst>
+            <a:lin ang="5400000" scaled="0"/>
+          </a:gradFill>
+          <a:effectLst>
+            <a:outerShdw blurRad="50800" dist="76200" dir="18900000" algn="bl" rotWithShape="0">
+              <a:prstClr val="black">
+                <a:alpha val="40000"/>
+              </a:prstClr>
+            </a:outerShdw>
+          </a:effectLst>
+        </p:spPr>
+        <p:style>
+          <a:lnRef idx="2">
+            <a:schemeClr val="accent1">
+              <a:shade val="50000"/>
+            </a:schemeClr>
+          </a:lnRef>
+          <a:fillRef idx="1">
+            <a:schemeClr val="accent1"/>
+          </a:fillRef>
+          <a:effectRef idx="0">
+            <a:schemeClr val="accent1"/>
+          </a:effectRef>
+          <a:fontRef idx="minor">
+            <a:schemeClr val="lt1"/>
+          </a:fontRef>
+        </p:style>
+        <p:txBody>
+          <a:bodyPr rtlCol="0" anchor="ctr"/>
+          <a:p>
+            <a:pPr algn="ctr"/>
+            <a:r>
+              <a:rPr lang="en-US" b="1" dirty="0" smtClean="0">
+                <a:solidFill>
+                  <a:schemeClr val="accent5"/>
+                </a:solidFill>
+              </a:rPr>
+              <a:t>Report</a:t>
+            </a:r>
+            <a:endParaRPr lang="en-US" b="1" dirty="0" smtClean="0">
+              <a:solidFill>
+                <a:schemeClr val="accent5"/>
+              </a:solidFill>
+            </a:endParaRPr>
+          </a:p>
+        </p:txBody>
+      </p:sp>
+      <p:sp>
+        <p:nvSpPr>
+          <p:cNvPr id="14" name="Rectangle 13"/>
+          <p:cNvSpPr/>
+          <p:nvPr/>
+        </p:nvSpPr>
+        <p:spPr>
+          <a:xfrm>
+            <a:off x="-5715" y="-14605"/>
+            <a:ext cx="12202795" cy="741680"/>
+          </a:xfrm>
+          <a:prstGeom prst="rect">
+            <a:avLst/>
+          </a:prstGeom>
+          <a:solidFill>
+            <a:schemeClr val="accent4">
+              <a:lumMod val="75000"/>
+              <a:alpha val="56000"/>
+            </a:schemeClr>
+          </a:solidFill>
+          <a:ln>
+            <a:noFill/>
+          </a:ln>
+        </p:spPr>
+        <p:style>
+          <a:lnRef idx="2">
+            <a:schemeClr val="accent1">
+              <a:shade val="50000"/>
+            </a:schemeClr>
+          </a:lnRef>
+          <a:fillRef idx="1">
+            <a:schemeClr val="accent1"/>
+          </a:fillRef>
+          <a:effectRef idx="0">
+            <a:schemeClr val="accent1"/>
+          </a:effectRef>
+          <a:fontRef idx="minor">
+            <a:schemeClr val="lt1"/>
+          </a:fontRef>
+        </p:style>
+        <p:txBody>
+          <a:bodyPr rtlCol="0" anchor="ctr"/>
+          <a:p>
+            <a:pPr algn="r"/>
+            <a:endParaRPr lang="en-US" b="1" u="sng" dirty="0" smtClean="0">
+              <a:solidFill>
+                <a:srgbClr val="FF0000"/>
+              </a:solidFill>
+            </a:endParaRPr>
+          </a:p>
+        </p:txBody>
+      </p:sp>
+      <p:pic>
+        <p:nvPicPr>
+          <p:cNvPr id="2" name="Content Placeholder 1"/>
+          <p:cNvPicPr>
+            <a:picLocks noChangeAspect="1"/>
+          </p:cNvPicPr>
+          <p:nvPr>
+            <p:ph sz="half" idx="1"/>
+          </p:nvPr>
+        </p:nvPicPr>
+        <p:blipFill>
+          <a:blip r:embed="rId1"/>
+          <a:stretch>
+            <a:fillRect/>
+          </a:stretch>
+        </p:blipFill>
+        <p:spPr>
+          <a:xfrm>
+            <a:off x="1887220" y="1122045"/>
+            <a:ext cx="10309860" cy="5346700"/>
+          </a:xfrm>
+          <a:prstGeom prst="rect">
+            <a:avLst/>
+          </a:prstGeom>
+          <a:ln>
+            <a:noFill/>
+          </a:ln>
+        </p:spPr>
+      </p:pic>
+      <p:pic>
+        <p:nvPicPr>
+          <p:cNvPr id="5" name="Content Placeholder 4" descr="logo"/>
+          <p:cNvPicPr>
+            <a:picLocks noChangeAspect="1"/>
+          </p:cNvPicPr>
+          <p:nvPr>
+            <p:ph sz="half" idx="2"/>
+          </p:nvPr>
+        </p:nvPicPr>
+        <p:blipFill>
+          <a:blip r:embed="rId2"/>
+          <a:stretch>
+            <a:fillRect/>
+          </a:stretch>
+        </p:blipFill>
+        <p:spPr>
+          <a:xfrm>
+            <a:off x="525145" y="26035"/>
+            <a:ext cx="784225" cy="642620"/>
+          </a:xfrm>
+          <a:prstGeom prst="rect">
+            <a:avLst/>
+          </a:prstGeom>
+        </p:spPr>
+      </p:pic>
+      <p:sp>
+        <p:nvSpPr>
+          <p:cNvPr id="7" name="Snip Single Corner Rectangle 6"/>
+          <p:cNvSpPr/>
+          <p:nvPr/>
+        </p:nvSpPr>
+        <p:spPr>
+          <a:xfrm>
+            <a:off x="1906905" y="727075"/>
+            <a:ext cx="1269365" cy="394335"/>
+          </a:xfrm>
+          <a:prstGeom prst="snip1Rect">
+            <a:avLst/>
+          </a:prstGeom>
+          <a:gradFill>
+            <a:gsLst>
+              <a:gs pos="100000">
+                <a:srgbClr val="FBFB11"/>
+              </a:gs>
+              <a:gs pos="100000">
+                <a:srgbClr val="838309"/>
+              </a:gs>
+            </a:gsLst>
+            <a:lin ang="5400000"/>
+          </a:gradFill>
+        </p:spPr>
+        <p:style>
+          <a:lnRef idx="2">
+            <a:schemeClr val="accent1">
+              <a:shade val="50000"/>
+            </a:schemeClr>
+          </a:lnRef>
+          <a:fillRef idx="1">
+            <a:schemeClr val="accent1"/>
+          </a:fillRef>
+          <a:effectRef idx="0">
+            <a:schemeClr val="accent1"/>
+          </a:effectRef>
+          <a:fontRef idx="minor">
+            <a:schemeClr val="lt1"/>
+          </a:fontRef>
+        </p:style>
+        <p:txBody>
+          <a:bodyPr rtlCol="0" anchor="ctr"/>
+          <a:p>
+            <a:pPr algn="ctr"/>
+            <a:r>
+              <a:rPr lang="en-US" b="1">
+                <a:solidFill>
+                  <a:schemeClr val="accent5"/>
+                </a:solidFill>
+              </a:rPr>
+              <a:t>Consultant</a:t>
+            </a:r>
+            <a:endParaRPr lang="en-US" b="1">
+              <a:solidFill>
+                <a:schemeClr val="accent5"/>
+              </a:solidFill>
+            </a:endParaRPr>
+          </a:p>
+        </p:txBody>
+      </p:sp>
+      <p:sp>
+        <p:nvSpPr>
+          <p:cNvPr id="9" name="Snip Single Corner Rectangle 8"/>
+          <p:cNvSpPr/>
+          <p:nvPr/>
+        </p:nvSpPr>
+        <p:spPr>
+          <a:xfrm>
+            <a:off x="3188335" y="727075"/>
+            <a:ext cx="1269365" cy="394335"/>
+          </a:xfrm>
+          <a:prstGeom prst="snip1Rect">
+            <a:avLst/>
+          </a:prstGeom>
+          <a:gradFill>
+            <a:gsLst>
+              <a:gs pos="0">
+                <a:srgbClr val="FBFB11"/>
+              </a:gs>
+              <a:gs pos="100000">
+                <a:srgbClr val="838309"/>
+              </a:gs>
+            </a:gsLst>
+            <a:lin ang="5400000"/>
+          </a:gradFill>
+        </p:spPr>
+        <p:style>
+          <a:lnRef idx="2">
+            <a:schemeClr val="accent1">
+              <a:shade val="50000"/>
+            </a:schemeClr>
+          </a:lnRef>
+          <a:fillRef idx="1">
+            <a:schemeClr val="accent1"/>
+          </a:fillRef>
+          <a:effectRef idx="0">
+            <a:schemeClr val="accent1"/>
+          </a:effectRef>
+          <a:fontRef idx="minor">
+            <a:schemeClr val="lt1"/>
+          </a:fontRef>
+        </p:style>
+        <p:txBody>
+          <a:bodyPr rtlCol="0" anchor="ctr"/>
+          <a:p>
+            <a:pPr algn="ctr"/>
+            <a:r>
+              <a:rPr lang="en-US" b="1">
+                <a:solidFill>
+                  <a:schemeClr val="accent5"/>
+                </a:solidFill>
+              </a:rPr>
+              <a:t>Client</a:t>
+            </a:r>
+            <a:endParaRPr lang="en-US" b="1">
+              <a:solidFill>
+                <a:schemeClr val="accent5"/>
+              </a:solidFill>
+            </a:endParaRPr>
+          </a:p>
+        </p:txBody>
+      </p:sp>
+      <p:sp>
+        <p:nvSpPr>
+          <p:cNvPr id="10" name="Rectangle 9"/>
+          <p:cNvSpPr/>
+          <p:nvPr/>
+        </p:nvSpPr>
+        <p:spPr>
+          <a:xfrm>
+            <a:off x="4443095" y="727075"/>
+            <a:ext cx="7759700" cy="394335"/>
+          </a:xfrm>
+          <a:prstGeom prst="rect">
+            <a:avLst/>
+          </a:prstGeom>
+          <a:solidFill>
+            <a:schemeClr val="accent4">
+              <a:lumMod val="75000"/>
+              <a:alpha val="37000"/>
+            </a:schemeClr>
+          </a:solidFill>
+          <a:ln>
+            <a:noFill/>
+          </a:ln>
+        </p:spPr>
+        <p:style>
+          <a:lnRef idx="2">
+            <a:schemeClr val="accent1">
+              <a:shade val="50000"/>
+            </a:schemeClr>
+          </a:lnRef>
+          <a:fillRef idx="1">
+            <a:schemeClr val="accent1"/>
+          </a:fillRef>
+          <a:effectRef idx="0">
+            <a:schemeClr val="accent1"/>
+          </a:effectRef>
+          <a:fontRef idx="minor">
+            <a:schemeClr val="lt1"/>
+          </a:fontRef>
+        </p:style>
+        <p:txBody>
+          <a:bodyPr rtlCol="0" anchor="ctr"/>
+          <a:p>
+            <a:pPr algn="r"/>
+            <a:endParaRPr lang="en-US" sz="2000" u="sng" dirty="0" smtClean="0"/>
+          </a:p>
+        </p:txBody>
+      </p:sp>
+      <p:sp>
+        <p:nvSpPr>
+          <p:cNvPr id="18" name="Rounded Rectangle 17"/>
+          <p:cNvSpPr/>
+          <p:nvPr/>
+        </p:nvSpPr>
+        <p:spPr>
+          <a:xfrm>
+            <a:off x="11061700" y="201930"/>
+            <a:ext cx="942340" cy="364490"/>
+          </a:xfrm>
+          <a:prstGeom prst="roundRect">
+            <a:avLst/>
+          </a:prstGeom>
+          <a:solidFill>
+            <a:schemeClr val="accent2"/>
+          </a:solidFill>
+          <a:effectLst/>
+        </p:spPr>
+        <p:style>
+          <a:lnRef idx="2">
+            <a:schemeClr val="accent1">
+              <a:shade val="50000"/>
+            </a:schemeClr>
+          </a:lnRef>
+          <a:fillRef idx="1">
+            <a:schemeClr val="accent1"/>
+          </a:fillRef>
+          <a:effectRef idx="0">
+            <a:schemeClr val="accent1"/>
+          </a:effectRef>
+          <a:fontRef idx="minor">
+            <a:schemeClr val="lt1"/>
+          </a:fontRef>
+        </p:style>
+        <p:txBody>
+          <a:bodyPr rtlCol="0" anchor="ctr"/>
+          <a:p>
+            <a:pPr algn="ctr"/>
+            <a:r>
+              <a:rPr lang="en-US" b="1" dirty="0" smtClean="0"/>
+              <a:t>Logout</a:t>
+            </a:r>
+            <a:endParaRPr lang="en-US" b="1" dirty="0" smtClean="0"/>
+          </a:p>
+        </p:txBody>
+      </p:sp>
+      <p:sp>
+        <p:nvSpPr>
+          <p:cNvPr id="19" name="Text Box 18"/>
+          <p:cNvSpPr txBox="1"/>
+          <p:nvPr/>
+        </p:nvSpPr>
+        <p:spPr>
+          <a:xfrm>
+            <a:off x="3309620" y="35560"/>
+            <a:ext cx="5917565" cy="583565"/>
+          </a:xfrm>
+          <a:prstGeom prst="rect">
+            <a:avLst/>
+          </a:prstGeom>
+          <a:noFill/>
+        </p:spPr>
+        <p:txBody>
+          <a:bodyPr wrap="square" rtlCol="0">
+            <a:spAutoFit/>
+          </a:bodyPr>
+          <a:p>
+            <a:r>
+              <a:rPr lang="en-US" sz="3200" b="1">
+                <a:ln w="9525" cmpd="sng">
+                  <a:solidFill>
+                    <a:schemeClr val="accent1"/>
+                  </a:solidFill>
+                  <a:prstDash val="solid"/>
+                </a:ln>
+                <a:solidFill>
+                  <a:srgbClr val="70AD47">
+                    <a:tint val="1000"/>
+                  </a:srgbClr>
+                </a:solidFill>
+                <a:effectLst>
+                  <a:glow rad="38100">
+                    <a:schemeClr val="accent1">
+                      <a:alpha val="40000"/>
+                    </a:schemeClr>
+                  </a:glow>
+                </a:effectLst>
+              </a:rPr>
+              <a:t>Consult-it Enterprise Platform</a:t>
+            </a:r>
+            <a:endParaRPr lang="en-US" sz="3200" b="1">
+              <a:ln w="9525" cmpd="sng">
+                <a:solidFill>
+                  <a:schemeClr val="accent1"/>
+                </a:solidFill>
+                <a:prstDash val="solid"/>
+              </a:ln>
+              <a:solidFill>
+                <a:srgbClr val="70AD47">
+                  <a:tint val="1000"/>
+                </a:srgbClr>
+              </a:solidFill>
+              <a:effectLst>
+                <a:glow rad="38100">
+                  <a:schemeClr val="accent1">
+                    <a:alpha val="40000"/>
+                  </a:schemeClr>
+                </a:glow>
+              </a:effectLst>
+            </a:endParaRPr>
+          </a:p>
+        </p:txBody>
+      </p:sp>
+      <p:sp>
+        <p:nvSpPr>
+          <p:cNvPr id="21" name="Rectangle 20"/>
+          <p:cNvSpPr/>
+          <p:nvPr/>
+        </p:nvSpPr>
+        <p:spPr>
+          <a:xfrm>
+            <a:off x="-5715" y="6468745"/>
+            <a:ext cx="12202795" cy="392430"/>
+          </a:xfrm>
+          <a:prstGeom prst="rect">
+            <a:avLst/>
+          </a:prstGeom>
+          <a:solidFill>
+            <a:schemeClr val="accent4">
+              <a:lumMod val="75000"/>
+              <a:alpha val="56000"/>
+            </a:schemeClr>
+          </a:solidFill>
+          <a:ln>
+            <a:noFill/>
+          </a:ln>
+        </p:spPr>
+        <p:style>
+          <a:lnRef idx="2">
+            <a:schemeClr val="accent1">
+              <a:shade val="50000"/>
+            </a:schemeClr>
+          </a:lnRef>
+          <a:fillRef idx="1">
+            <a:schemeClr val="accent1"/>
+          </a:fillRef>
+          <a:effectRef idx="0">
+            <a:schemeClr val="accent1"/>
+          </a:effectRef>
+          <a:fontRef idx="minor">
+            <a:schemeClr val="lt1"/>
+          </a:fontRef>
+        </p:style>
+        <p:txBody>
+          <a:bodyPr rtlCol="0" anchor="ctr"/>
+          <a:p>
+            <a:pPr algn="r"/>
+            <a:r>
+              <a:rPr lang="en-US" b="1" dirty="0" smtClean="0">
+                <a:solidFill>
+                  <a:srgbClr val="FF0000"/>
+                </a:solidFill>
+              </a:rPr>
+              <a:t>Date : 20th April 2017</a:t>
+            </a:r>
+            <a:endParaRPr lang="en-US" b="1" dirty="0" smtClean="0">
+              <a:solidFill>
+                <a:srgbClr val="FF0000"/>
+              </a:solidFill>
+            </a:endParaRPr>
+          </a:p>
+        </p:txBody>
+      </p:sp>
+    </p:spTree>
   </p:cSld>
   <p:clrMapOvr>
     <a:masterClrMapping/>
@@ -9522,7 +10201,7 @@
     </a:clrScheme>
     <a:fontScheme name="Office">
       <a:majorFont>
-        <a:latin typeface="Calibri Light" panose="020F0302020204030204"/>
+        <a:latin typeface="Calibri Light"/>
         <a:ea typeface=""/>
         <a:cs typeface=""/>
         <a:font script="Jpan" typeface="Yu Gothic Light"/>
@@ -9557,7 +10236,7 @@
         <a:font script="Geor" typeface="Sylfaen"/>
       </a:majorFont>
       <a:minorFont>
-        <a:latin typeface="Calibri" panose="020F0502020204030204"/>
+        <a:latin typeface="Calibri"/>
         <a:ea typeface=""/>
         <a:cs typeface=""/>
         <a:font script="Jpan" typeface="Yu Gothic"/>
@@ -9730,8 +10409,6 @@
       </a:bgFillStyleLst>
     </a:fmtScheme>
   </a:themeElements>
-  <a:objectDefaults/>
-  <a:extraClrSchemeLst/>
   <a:extLst>
     <a:ext uri="{05A4C25C-085E-4340-85A3-A5531E510DB2}">
       <thm15:themeFamily xmlns:thm15="http://schemas.microsoft.com/office/thememl/2012/main" name="Office Theme" id="{62F939B6-93AF-4DB8-9C6B-D6C7DFDC589F}" vid="{4A3C46E8-61CC-4603-A589-7422A47A8E4A}"/>
@@ -9783,7 +10460,7 @@
     </a:clrScheme>
     <a:fontScheme name="Office">
       <a:majorFont>
-        <a:latin typeface="Calibri Light" panose="020F0302020204030204"/>
+        <a:latin typeface="Calibri Light"/>
         <a:ea typeface=""/>
         <a:cs typeface=""/>
         <a:font script="Jpan" typeface="Yu Gothic Light"/>
@@ -9818,7 +10495,7 @@
         <a:font script="Geor" typeface="Sylfaen"/>
       </a:majorFont>
       <a:minorFont>
-        <a:latin typeface="Calibri" panose="020F0502020204030204"/>
+        <a:latin typeface="Calibri"/>
         <a:ea typeface=""/>
         <a:cs typeface=""/>
         <a:font script="Jpan" typeface="Yu Gothic"/>
@@ -9991,8 +10668,6 @@
       </a:bgFillStyleLst>
     </a:fmtScheme>
   </a:themeElements>
-  <a:objectDefaults/>
-  <a:extraClrSchemeLst/>
   <a:extLst>
     <a:ext uri="{05A4C25C-085E-4340-85A3-A5531E510DB2}">
       <thm15:themeFamily xmlns:thm15="http://schemas.microsoft.com/office/thememl/2012/main" name="Office Theme" id="{62F939B6-93AF-4DB8-9C6B-D6C7DFDC589F}" vid="{4A3C46E8-61CC-4603-A589-7422A47A8E4A}"/>

</xml_diff>